<commit_message>
Minor changes: typo fix
</commit_message>
<xml_diff>
--- a/Mini-Project/GroupK.pptx
+++ b/Mini-Project/GroupK.pptx
@@ -111,6 +111,11 @@
       </a:defRPr>
     </a:lvl9pPr>
   </p:defaultTextStyle>
+  <p:extLst>
+    <p:ext uri="{EFAFB233-063F-42B5-8137-9DF3F51BA10A}">
+      <p15:sldGuideLst xmlns:p15="http://schemas.microsoft.com/office/powerpoint/2012/main"/>
+    </p:ext>
+  </p:extLst>
 </p:presentation>
 </file>
 
@@ -192,7 +197,7 @@
           <a:noFill/>
           <a:extLst>
             <a:ext uri="{909E8E84-426E-40dd-AFC4-6F175D3DCCD1}">
-              <a14:hiddenFill xmlns:a14="http://schemas.microsoft.com/office/drawing/2010/main" xmlns="">
+              <a14:hiddenFill xmlns="" xmlns:a14="http://schemas.microsoft.com/office/drawing/2010/main">
                 <a:solidFill>
                   <a:srgbClr val="FFFFFF"/>
                 </a:solidFill>
@@ -252,7 +257,7 @@
             </a:ln>
             <a:extLst>
               <a:ext uri="{91240B29-F687-4f45-9708-019B960494DF}">
-                <a14:hiddenLine xmlns:a14="http://schemas.microsoft.com/office/drawing/2010/main" xmlns="" w="9525">
+                <a14:hiddenLine xmlns="" xmlns:a14="http://schemas.microsoft.com/office/drawing/2010/main" w="9525">
                   <a:solidFill>
                     <a:srgbClr val="000000"/>
                   </a:solidFill>
@@ -349,7 +354,7 @@
             </a:ln>
             <a:extLst>
               <a:ext uri="{91240B29-F687-4f45-9708-019B960494DF}">
-                <a14:hiddenLine xmlns:a14="http://schemas.microsoft.com/office/drawing/2010/main" xmlns="" w="9525">
+                <a14:hiddenLine xmlns="" xmlns:a14="http://schemas.microsoft.com/office/drawing/2010/main" w="9525">
                   <a:solidFill>
                     <a:srgbClr val="000000"/>
                   </a:solidFill>
@@ -446,7 +451,7 @@
             </a:ln>
             <a:extLst>
               <a:ext uri="{91240B29-F687-4f45-9708-019B960494DF}">
-                <a14:hiddenLine xmlns:a14="http://schemas.microsoft.com/office/drawing/2010/main" xmlns="" w="9525">
+                <a14:hiddenLine xmlns="" xmlns:a14="http://schemas.microsoft.com/office/drawing/2010/main" w="9525">
                   <a:solidFill>
                     <a:srgbClr val="000000"/>
                   </a:solidFill>
@@ -487,7 +492,7 @@
             </a:ln>
             <a:extLst>
               <a:ext uri="{91240B29-F687-4f45-9708-019B960494DF}">
-                <a14:hiddenLine xmlns:a14="http://schemas.microsoft.com/office/drawing/2010/main" xmlns="" w="9525">
+                <a14:hiddenLine xmlns="" xmlns:a14="http://schemas.microsoft.com/office/drawing/2010/main" w="9525">
                   <a:solidFill>
                     <a:srgbClr val="000000"/>
                   </a:solidFill>
@@ -584,7 +589,7 @@
             </a:ln>
             <a:extLst>
               <a:ext uri="{91240B29-F687-4f45-9708-019B960494DF}">
-                <a14:hiddenLine xmlns:a14="http://schemas.microsoft.com/office/drawing/2010/main" xmlns="" w="9525">
+                <a14:hiddenLine xmlns="" xmlns:a14="http://schemas.microsoft.com/office/drawing/2010/main" w="9525">
                   <a:solidFill>
                     <a:srgbClr val="000000"/>
                   </a:solidFill>
@@ -653,7 +658,7 @@
             </a:ln>
             <a:extLst>
               <a:ext uri="{91240B29-F687-4f45-9708-019B960494DF}">
-                <a14:hiddenLine xmlns:a14="http://schemas.microsoft.com/office/drawing/2010/main" xmlns="" w="9525">
+                <a14:hiddenLine xmlns="" xmlns:a14="http://schemas.microsoft.com/office/drawing/2010/main" w="9525">
                   <a:solidFill>
                     <a:srgbClr val="000000"/>
                   </a:solidFill>
@@ -722,7 +727,7 @@
             </a:ln>
             <a:extLst>
               <a:ext uri="{91240B29-F687-4f45-9708-019B960494DF}">
-                <a14:hiddenLine xmlns:a14="http://schemas.microsoft.com/office/drawing/2010/main" xmlns="" w="9525">
+                <a14:hiddenLine xmlns="" xmlns:a14="http://schemas.microsoft.com/office/drawing/2010/main" w="9525">
                   <a:solidFill>
                     <a:srgbClr val="000000"/>
                   </a:solidFill>
@@ -819,7 +824,7 @@
             </a:ln>
             <a:extLst>
               <a:ext uri="{91240B29-F687-4f45-9708-019B960494DF}">
-                <a14:hiddenLine xmlns:a14="http://schemas.microsoft.com/office/drawing/2010/main" xmlns="" w="9525">
+                <a14:hiddenLine xmlns="" xmlns:a14="http://schemas.microsoft.com/office/drawing/2010/main" w="9525">
                   <a:solidFill>
                     <a:srgbClr val="000000"/>
                   </a:solidFill>
@@ -888,7 +893,7 @@
             </a:ln>
             <a:extLst>
               <a:ext uri="{91240B29-F687-4f45-9708-019B960494DF}">
-                <a14:hiddenLine xmlns:a14="http://schemas.microsoft.com/office/drawing/2010/main" xmlns="" w="9525">
+                <a14:hiddenLine xmlns="" xmlns:a14="http://schemas.microsoft.com/office/drawing/2010/main" w="9525">
                   <a:solidFill>
                     <a:srgbClr val="000000"/>
                   </a:solidFill>
@@ -957,7 +962,7 @@
             </a:ln>
             <a:extLst>
               <a:ext uri="{91240B29-F687-4f45-9708-019B960494DF}">
-                <a14:hiddenLine xmlns:a14="http://schemas.microsoft.com/office/drawing/2010/main" xmlns="" w="9525">
+                <a14:hiddenLine xmlns="" xmlns:a14="http://schemas.microsoft.com/office/drawing/2010/main" w="9525">
                   <a:solidFill>
                     <a:srgbClr val="000000"/>
                   </a:solidFill>
@@ -1054,7 +1059,7 @@
             </a:ln>
             <a:extLst>
               <a:ext uri="{91240B29-F687-4f45-9708-019B960494DF}">
-                <a14:hiddenLine xmlns:a14="http://schemas.microsoft.com/office/drawing/2010/main" xmlns="" w="9525">
+                <a14:hiddenLine xmlns="" xmlns:a14="http://schemas.microsoft.com/office/drawing/2010/main" w="9525">
                   <a:solidFill>
                     <a:srgbClr val="000000"/>
                   </a:solidFill>
@@ -1151,7 +1156,7 @@
             </a:ln>
             <a:extLst>
               <a:ext uri="{91240B29-F687-4f45-9708-019B960494DF}">
-                <a14:hiddenLine xmlns:a14="http://schemas.microsoft.com/office/drawing/2010/main" xmlns="" w="9525">
+                <a14:hiddenLine xmlns="" xmlns:a14="http://schemas.microsoft.com/office/drawing/2010/main" w="9525">
                   <a:solidFill>
                     <a:srgbClr val="000000"/>
                   </a:solidFill>
@@ -1220,7 +1225,7 @@
             </a:ln>
             <a:extLst>
               <a:ext uri="{91240B29-F687-4f45-9708-019B960494DF}">
-                <a14:hiddenLine xmlns:a14="http://schemas.microsoft.com/office/drawing/2010/main" xmlns="" w="9525">
+                <a14:hiddenLine xmlns="" xmlns:a14="http://schemas.microsoft.com/office/drawing/2010/main" w="9525">
                   <a:solidFill>
                     <a:srgbClr val="000000"/>
                   </a:solidFill>
@@ -1337,7 +1342,7 @@
             </a:ln>
             <a:extLst>
               <a:ext uri="{91240B29-F687-4f45-9708-019B960494DF}">
-                <a14:hiddenLine xmlns:a14="http://schemas.microsoft.com/office/drawing/2010/main" xmlns="" w="9525">
+                <a14:hiddenLine xmlns="" xmlns:a14="http://schemas.microsoft.com/office/drawing/2010/main" w="9525">
                   <a:solidFill>
                     <a:srgbClr val="000000"/>
                   </a:solidFill>
@@ -1406,7 +1411,7 @@
             </a:ln>
             <a:extLst>
               <a:ext uri="{91240B29-F687-4f45-9708-019B960494DF}">
-                <a14:hiddenLine xmlns:a14="http://schemas.microsoft.com/office/drawing/2010/main" xmlns="" w="9525">
+                <a14:hiddenLine xmlns="" xmlns:a14="http://schemas.microsoft.com/office/drawing/2010/main" w="9525">
                   <a:solidFill>
                     <a:srgbClr val="000000"/>
                   </a:solidFill>
@@ -1503,7 +1508,7 @@
             </a:ln>
             <a:extLst>
               <a:ext uri="{91240B29-F687-4f45-9708-019B960494DF}">
-                <a14:hiddenLine xmlns:a14="http://schemas.microsoft.com/office/drawing/2010/main" xmlns="" w="9525">
+                <a14:hiddenLine xmlns="" xmlns:a14="http://schemas.microsoft.com/office/drawing/2010/main" w="9525">
                   <a:solidFill>
                     <a:srgbClr val="000000"/>
                   </a:solidFill>
@@ -1600,7 +1605,7 @@
             </a:ln>
             <a:extLst>
               <a:ext uri="{91240B29-F687-4f45-9708-019B960494DF}">
-                <a14:hiddenLine xmlns:a14="http://schemas.microsoft.com/office/drawing/2010/main" xmlns="" w="9525">
+                <a14:hiddenLine xmlns="" xmlns:a14="http://schemas.microsoft.com/office/drawing/2010/main" w="9525">
                   <a:solidFill>
                     <a:srgbClr val="000000"/>
                   </a:solidFill>
@@ -1669,7 +1674,7 @@
             </a:ln>
             <a:extLst>
               <a:ext uri="{91240B29-F687-4f45-9708-019B960494DF}">
-                <a14:hiddenLine xmlns:a14="http://schemas.microsoft.com/office/drawing/2010/main" xmlns="" w="9525">
+                <a14:hiddenLine xmlns="" xmlns:a14="http://schemas.microsoft.com/office/drawing/2010/main" w="9525">
                   <a:solidFill>
                     <a:srgbClr val="000000"/>
                   </a:solidFill>
@@ -1766,7 +1771,7 @@
             </a:ln>
             <a:extLst>
               <a:ext uri="{91240B29-F687-4f45-9708-019B960494DF}">
-                <a14:hiddenLine xmlns:a14="http://schemas.microsoft.com/office/drawing/2010/main" xmlns="" w="9525">
+                <a14:hiddenLine xmlns="" xmlns:a14="http://schemas.microsoft.com/office/drawing/2010/main" w="9525">
                   <a:solidFill>
                     <a:srgbClr val="000000"/>
                   </a:solidFill>
@@ -1863,7 +1868,7 @@
             </a:ln>
             <a:extLst>
               <a:ext uri="{91240B29-F687-4f45-9708-019B960494DF}">
-                <a14:hiddenLine xmlns:a14="http://schemas.microsoft.com/office/drawing/2010/main" xmlns="" w="9525">
+                <a14:hiddenLine xmlns="" xmlns:a14="http://schemas.microsoft.com/office/drawing/2010/main" w="9525">
                   <a:solidFill>
                     <a:srgbClr val="000000"/>
                   </a:solidFill>
@@ -1926,7 +1931,7 @@
             </a:ln>
             <a:extLst>
               <a:ext uri="{91240B29-F687-4f45-9708-019B960494DF}">
-                <a14:hiddenLine xmlns:a14="http://schemas.microsoft.com/office/drawing/2010/main" xmlns="" w="9525">
+                <a14:hiddenLine xmlns="" xmlns:a14="http://schemas.microsoft.com/office/drawing/2010/main" w="9525">
                   <a:solidFill>
                     <a:srgbClr val="000000"/>
                   </a:solidFill>
@@ -2023,7 +2028,7 @@
             </a:ln>
             <a:extLst>
               <a:ext uri="{91240B29-F687-4f45-9708-019B960494DF}">
-                <a14:hiddenLine xmlns:a14="http://schemas.microsoft.com/office/drawing/2010/main" xmlns="" w="9525">
+                <a14:hiddenLine xmlns="" xmlns:a14="http://schemas.microsoft.com/office/drawing/2010/main" w="9525">
                   <a:solidFill>
                     <a:srgbClr val="000000"/>
                   </a:solidFill>
@@ -2086,7 +2091,7 @@
             </a:ln>
             <a:extLst>
               <a:ext uri="{91240B29-F687-4f45-9708-019B960494DF}">
-                <a14:hiddenLine xmlns:a14="http://schemas.microsoft.com/office/drawing/2010/main" xmlns="" w="9525">
+                <a14:hiddenLine xmlns="" xmlns:a14="http://schemas.microsoft.com/office/drawing/2010/main" w="9525">
                   <a:solidFill>
                     <a:srgbClr val="000000"/>
                   </a:solidFill>
@@ -2183,7 +2188,7 @@
             </a:ln>
             <a:extLst>
               <a:ext uri="{91240B29-F687-4f45-9708-019B960494DF}">
-                <a14:hiddenLine xmlns:a14="http://schemas.microsoft.com/office/drawing/2010/main" xmlns="" w="9525">
+                <a14:hiddenLine xmlns="" xmlns:a14="http://schemas.microsoft.com/office/drawing/2010/main" w="9525">
                   <a:solidFill>
                     <a:srgbClr val="000000"/>
                   </a:solidFill>
@@ -2258,7 +2263,7 @@
             </a:ln>
             <a:extLst>
               <a:ext uri="{91240B29-F687-4f45-9708-019B960494DF}">
-                <a14:hiddenLine xmlns:a14="http://schemas.microsoft.com/office/drawing/2010/main" xmlns="" w="9525">
+                <a14:hiddenLine xmlns="" xmlns:a14="http://schemas.microsoft.com/office/drawing/2010/main" w="9525">
                   <a:solidFill>
                     <a:srgbClr val="000000"/>
                   </a:solidFill>
@@ -2355,7 +2360,7 @@
             </a:ln>
             <a:extLst>
               <a:ext uri="{91240B29-F687-4f45-9708-019B960494DF}">
-                <a14:hiddenLine xmlns:a14="http://schemas.microsoft.com/office/drawing/2010/main" xmlns="" w="9525">
+                <a14:hiddenLine xmlns="" xmlns:a14="http://schemas.microsoft.com/office/drawing/2010/main" w="9525">
                   <a:solidFill>
                     <a:srgbClr val="000000"/>
                   </a:solidFill>
@@ -2430,7 +2435,7 @@
             </a:ln>
             <a:extLst>
               <a:ext uri="{91240B29-F687-4f45-9708-019B960494DF}">
-                <a14:hiddenLine xmlns:a14="http://schemas.microsoft.com/office/drawing/2010/main" xmlns="" w="9525">
+                <a14:hiddenLine xmlns="" xmlns:a14="http://schemas.microsoft.com/office/drawing/2010/main" w="9525">
                   <a:solidFill>
                     <a:srgbClr val="000000"/>
                   </a:solidFill>
@@ -2527,7 +2532,7 @@
             </a:ln>
             <a:extLst>
               <a:ext uri="{91240B29-F687-4f45-9708-019B960494DF}">
-                <a14:hiddenLine xmlns:a14="http://schemas.microsoft.com/office/drawing/2010/main" xmlns="" w="9525">
+                <a14:hiddenLine xmlns="" xmlns:a14="http://schemas.microsoft.com/office/drawing/2010/main" w="9525">
                   <a:solidFill>
                     <a:srgbClr val="000000"/>
                   </a:solidFill>
@@ -2568,7 +2573,7 @@
             </a:ln>
             <a:extLst>
               <a:ext uri="{91240B29-F687-4f45-9708-019B960494DF}">
-                <a14:hiddenLine xmlns:a14="http://schemas.microsoft.com/office/drawing/2010/main" xmlns="" w="9525">
+                <a14:hiddenLine xmlns="" xmlns:a14="http://schemas.microsoft.com/office/drawing/2010/main" w="9525">
                   <a:solidFill>
                     <a:srgbClr val="000000"/>
                   </a:solidFill>
@@ -2665,7 +2670,7 @@
             </a:ln>
             <a:extLst>
               <a:ext uri="{91240B29-F687-4f45-9708-019B960494DF}">
-                <a14:hiddenLine xmlns:a14="http://schemas.microsoft.com/office/drawing/2010/main" xmlns="" w="9525">
+                <a14:hiddenLine xmlns="" xmlns:a14="http://schemas.microsoft.com/office/drawing/2010/main" w="9525">
                   <a:solidFill>
                     <a:srgbClr val="000000"/>
                   </a:solidFill>
@@ -2734,7 +2739,7 @@
             </a:ln>
             <a:extLst>
               <a:ext uri="{91240B29-F687-4f45-9708-019B960494DF}">
-                <a14:hiddenLine xmlns:a14="http://schemas.microsoft.com/office/drawing/2010/main" xmlns="" w="9525">
+                <a14:hiddenLine xmlns="" xmlns:a14="http://schemas.microsoft.com/office/drawing/2010/main" w="9525">
                   <a:solidFill>
                     <a:srgbClr val="000000"/>
                   </a:solidFill>
@@ -2803,7 +2808,7 @@
             </a:ln>
             <a:extLst>
               <a:ext uri="{91240B29-F687-4f45-9708-019B960494DF}">
-                <a14:hiddenLine xmlns:a14="http://schemas.microsoft.com/office/drawing/2010/main" xmlns="" w="9525">
+                <a14:hiddenLine xmlns="" xmlns:a14="http://schemas.microsoft.com/office/drawing/2010/main" w="9525">
                   <a:solidFill>
                     <a:srgbClr val="000000"/>
                   </a:solidFill>
@@ -2900,7 +2905,7 @@
             </a:ln>
             <a:extLst>
               <a:ext uri="{91240B29-F687-4f45-9708-019B960494DF}">
-                <a14:hiddenLine xmlns:a14="http://schemas.microsoft.com/office/drawing/2010/main" xmlns="" w="9525">
+                <a14:hiddenLine xmlns="" xmlns:a14="http://schemas.microsoft.com/office/drawing/2010/main" w="9525">
                   <a:solidFill>
                     <a:srgbClr val="000000"/>
                   </a:solidFill>
@@ -2975,7 +2980,7 @@
             </a:ln>
             <a:extLst>
               <a:ext uri="{91240B29-F687-4f45-9708-019B960494DF}">
-                <a14:hiddenLine xmlns:a14="http://schemas.microsoft.com/office/drawing/2010/main" xmlns="" w="9525">
+                <a14:hiddenLine xmlns="" xmlns:a14="http://schemas.microsoft.com/office/drawing/2010/main" w="9525">
                   <a:solidFill>
                     <a:srgbClr val="000000"/>
                   </a:solidFill>
@@ -3044,7 +3049,7 @@
             </a:ln>
             <a:extLst>
               <a:ext uri="{91240B29-F687-4f45-9708-019B960494DF}">
-                <a14:hiddenLine xmlns:a14="http://schemas.microsoft.com/office/drawing/2010/main" xmlns="" w="9525">
+                <a14:hiddenLine xmlns="" xmlns:a14="http://schemas.microsoft.com/office/drawing/2010/main" w="9525">
                   <a:solidFill>
                     <a:srgbClr val="000000"/>
                   </a:solidFill>
@@ -3141,7 +3146,7 @@
             </a:ln>
             <a:extLst>
               <a:ext uri="{91240B29-F687-4f45-9708-019B960494DF}">
-                <a14:hiddenLine xmlns:a14="http://schemas.microsoft.com/office/drawing/2010/main" xmlns="" w="9525">
+                <a14:hiddenLine xmlns="" xmlns:a14="http://schemas.microsoft.com/office/drawing/2010/main" w="9525">
                   <a:solidFill>
                     <a:srgbClr val="000000"/>
                   </a:solidFill>
@@ -3210,7 +3215,7 @@
             </a:ln>
             <a:extLst>
               <a:ext uri="{91240B29-F687-4f45-9708-019B960494DF}">
-                <a14:hiddenLine xmlns:a14="http://schemas.microsoft.com/office/drawing/2010/main" xmlns="" w="9525">
+                <a14:hiddenLine xmlns="" xmlns:a14="http://schemas.microsoft.com/office/drawing/2010/main" w="9525">
                   <a:solidFill>
                     <a:srgbClr val="000000"/>
                   </a:solidFill>
@@ -3307,7 +3312,7 @@
             </a:ln>
             <a:extLst>
               <a:ext uri="{91240B29-F687-4f45-9708-019B960494DF}">
-                <a14:hiddenLine xmlns:a14="http://schemas.microsoft.com/office/drawing/2010/main" xmlns="" w="9525">
+                <a14:hiddenLine xmlns="" xmlns:a14="http://schemas.microsoft.com/office/drawing/2010/main" w="9525">
                   <a:solidFill>
                     <a:srgbClr val="000000"/>
                   </a:solidFill>
@@ -3376,7 +3381,7 @@
             </a:ln>
             <a:extLst>
               <a:ext uri="{91240B29-F687-4f45-9708-019B960494DF}">
-                <a14:hiddenLine xmlns:a14="http://schemas.microsoft.com/office/drawing/2010/main" xmlns="" w="9525">
+                <a14:hiddenLine xmlns="" xmlns:a14="http://schemas.microsoft.com/office/drawing/2010/main" w="9525">
                   <a:solidFill>
                     <a:srgbClr val="000000"/>
                   </a:solidFill>
@@ -3473,7 +3478,7 @@
             </a:ln>
             <a:extLst>
               <a:ext uri="{91240B29-F687-4f45-9708-019B960494DF}">
-                <a14:hiddenLine xmlns:a14="http://schemas.microsoft.com/office/drawing/2010/main" xmlns="" w="9525">
+                <a14:hiddenLine xmlns="" xmlns:a14="http://schemas.microsoft.com/office/drawing/2010/main" w="9525">
                   <a:solidFill>
                     <a:srgbClr val="000000"/>
                   </a:solidFill>
@@ -3514,7 +3519,7 @@
             </a:ln>
             <a:extLst>
               <a:ext uri="{91240B29-F687-4f45-9708-019B960494DF}">
-                <a14:hiddenLine xmlns:a14="http://schemas.microsoft.com/office/drawing/2010/main" xmlns="" w="9525">
+                <a14:hiddenLine xmlns="" xmlns:a14="http://schemas.microsoft.com/office/drawing/2010/main" w="9525">
                   <a:solidFill>
                     <a:srgbClr val="000000"/>
                   </a:solidFill>
@@ -3586,7 +3591,7 @@
             </a:ln>
             <a:extLst>
               <a:ext uri="{91240B29-F687-4f45-9708-019B960494DF}">
-                <a14:hiddenLine xmlns:a14="http://schemas.microsoft.com/office/drawing/2010/main" xmlns="" w="9525">
+                <a14:hiddenLine xmlns="" xmlns:a14="http://schemas.microsoft.com/office/drawing/2010/main" w="9525">
                   <a:solidFill>
                     <a:srgbClr val="000000"/>
                   </a:solidFill>
@@ -3683,7 +3688,7 @@
             </a:ln>
             <a:extLst>
               <a:ext uri="{91240B29-F687-4f45-9708-019B960494DF}">
-                <a14:hiddenLine xmlns:a14="http://schemas.microsoft.com/office/drawing/2010/main" xmlns="" w="9525">
+                <a14:hiddenLine xmlns="" xmlns:a14="http://schemas.microsoft.com/office/drawing/2010/main" w="9525">
                   <a:solidFill>
                     <a:srgbClr val="000000"/>
                   </a:solidFill>
@@ -3752,7 +3757,7 @@
             </a:ln>
             <a:extLst>
               <a:ext uri="{91240B29-F687-4f45-9708-019B960494DF}">
-                <a14:hiddenLine xmlns:a14="http://schemas.microsoft.com/office/drawing/2010/main" xmlns="" w="9525">
+                <a14:hiddenLine xmlns="" xmlns:a14="http://schemas.microsoft.com/office/drawing/2010/main" w="9525">
                   <a:solidFill>
                     <a:srgbClr val="000000"/>
                   </a:solidFill>
@@ -3849,7 +3854,7 @@
             </a:ln>
             <a:extLst>
               <a:ext uri="{91240B29-F687-4f45-9708-019B960494DF}">
-                <a14:hiddenLine xmlns:a14="http://schemas.microsoft.com/office/drawing/2010/main" xmlns="" w="9525">
+                <a14:hiddenLine xmlns="" xmlns:a14="http://schemas.microsoft.com/office/drawing/2010/main" w="9525">
                   <a:solidFill>
                     <a:srgbClr val="000000"/>
                   </a:solidFill>
@@ -3946,7 +3951,7 @@
             </a:ln>
             <a:extLst>
               <a:ext uri="{91240B29-F687-4f45-9708-019B960494DF}">
-                <a14:hiddenLine xmlns:a14="http://schemas.microsoft.com/office/drawing/2010/main" xmlns="" w="9525">
+                <a14:hiddenLine xmlns="" xmlns:a14="http://schemas.microsoft.com/office/drawing/2010/main" w="9525">
                   <a:solidFill>
                     <a:srgbClr val="000000"/>
                   </a:solidFill>
@@ -4018,7 +4023,7 @@
             </a:ln>
             <a:extLst>
               <a:ext uri="{91240B29-F687-4f45-9708-019B960494DF}">
-                <a14:hiddenLine xmlns:a14="http://schemas.microsoft.com/office/drawing/2010/main" xmlns="" w="9525">
+                <a14:hiddenLine xmlns="" xmlns:a14="http://schemas.microsoft.com/office/drawing/2010/main" w="9525">
                   <a:solidFill>
                     <a:srgbClr val="000000"/>
                   </a:solidFill>
@@ -4087,7 +4092,7 @@
             </a:ln>
             <a:extLst>
               <a:ext uri="{91240B29-F687-4f45-9708-019B960494DF}">
-                <a14:hiddenLine xmlns:a14="http://schemas.microsoft.com/office/drawing/2010/main" xmlns="" w="9525">
+                <a14:hiddenLine xmlns="" xmlns:a14="http://schemas.microsoft.com/office/drawing/2010/main" w="9525">
                   <a:solidFill>
                     <a:srgbClr val="000000"/>
                   </a:solidFill>
@@ -4184,7 +4189,7 @@
             </a:ln>
             <a:extLst>
               <a:ext uri="{91240B29-F687-4f45-9708-019B960494DF}">
-                <a14:hiddenLine xmlns:a14="http://schemas.microsoft.com/office/drawing/2010/main" xmlns="" w="9525">
+                <a14:hiddenLine xmlns="" xmlns:a14="http://schemas.microsoft.com/office/drawing/2010/main" w="9525">
                   <a:solidFill>
                     <a:srgbClr val="000000"/>
                   </a:solidFill>
@@ -4281,7 +4286,7 @@
             </a:ln>
             <a:extLst>
               <a:ext uri="{91240B29-F687-4f45-9708-019B960494DF}">
-                <a14:hiddenLine xmlns:a14="http://schemas.microsoft.com/office/drawing/2010/main" xmlns="" w="9525">
+                <a14:hiddenLine xmlns="" xmlns:a14="http://schemas.microsoft.com/office/drawing/2010/main" w="9525">
                   <a:solidFill>
                     <a:srgbClr val="000000"/>
                   </a:solidFill>
@@ -4350,7 +4355,7 @@
             </a:ln>
             <a:extLst>
               <a:ext uri="{91240B29-F687-4f45-9708-019B960494DF}">
-                <a14:hiddenLine xmlns:a14="http://schemas.microsoft.com/office/drawing/2010/main" xmlns="" w="9525">
+                <a14:hiddenLine xmlns="" xmlns:a14="http://schemas.microsoft.com/office/drawing/2010/main" w="9525">
                   <a:solidFill>
                     <a:srgbClr val="000000"/>
                   </a:solidFill>
@@ -4477,7 +4482,7 @@
             </a:ln>
             <a:extLst>
               <a:ext uri="{91240B29-F687-4f45-9708-019B960494DF}">
-                <a14:hiddenLine xmlns:a14="http://schemas.microsoft.com/office/drawing/2010/main" xmlns="" w="9525">
+                <a14:hiddenLine xmlns="" xmlns:a14="http://schemas.microsoft.com/office/drawing/2010/main" w="9525">
                   <a:solidFill>
                     <a:srgbClr val="000000"/>
                   </a:solidFill>
@@ -4552,7 +4557,7 @@
             </a:ln>
             <a:extLst>
               <a:ext uri="{91240B29-F687-4f45-9708-019B960494DF}">
-                <a14:hiddenLine xmlns:a14="http://schemas.microsoft.com/office/drawing/2010/main" xmlns="" w="9525">
+                <a14:hiddenLine xmlns="" xmlns:a14="http://schemas.microsoft.com/office/drawing/2010/main" w="9525">
                   <a:solidFill>
                     <a:srgbClr val="000000"/>
                   </a:solidFill>
@@ -4649,7 +4654,7 @@
             </a:ln>
             <a:extLst>
               <a:ext uri="{91240B29-F687-4f45-9708-019B960494DF}">
-                <a14:hiddenLine xmlns:a14="http://schemas.microsoft.com/office/drawing/2010/main" xmlns="" w="9525">
+                <a14:hiddenLine xmlns="" xmlns:a14="http://schemas.microsoft.com/office/drawing/2010/main" w="9525">
                   <a:solidFill>
                     <a:srgbClr val="000000"/>
                   </a:solidFill>
@@ -4796,7 +4801,7 @@
           <a:p>
             <a:fld id="{C7CC04FB-86A9-4518-B68C-513A8C480987}" type="datetimeFigureOut">
               <a:rPr lang="it-IT" smtClean="0"/>
-              <a:t>23/12/2025</a:t>
+              <a:t>13/01/2026</a:t>
             </a:fld>
             <a:endParaRPr lang="it-IT"/>
           </a:p>
@@ -4848,7 +4853,7 @@
           <a:p>
             <a:fld id="{53989CFC-89DE-4F17-B3B6-DFC80C736B18}" type="slidenum">
               <a:rPr lang="it-IT" smtClean="0"/>
-              <a:t>‹N›</a:t>
+              <a:t>‹#›</a:t>
             </a:fld>
             <a:endParaRPr lang="it-IT"/>
           </a:p>
@@ -5063,7 +5068,7 @@
           <a:p>
             <a:fld id="{C7CC04FB-86A9-4518-B68C-513A8C480987}" type="datetimeFigureOut">
               <a:rPr lang="it-IT" smtClean="0"/>
-              <a:t>23/12/2025</a:t>
+              <a:t>13/01/2026</a:t>
             </a:fld>
             <a:endParaRPr lang="it-IT"/>
           </a:p>
@@ -5105,7 +5110,7 @@
           <a:p>
             <a:fld id="{53989CFC-89DE-4F17-B3B6-DFC80C736B18}" type="slidenum">
               <a:rPr lang="it-IT" smtClean="0"/>
-              <a:t>‹N›</a:t>
+              <a:t>‹#›</a:t>
             </a:fld>
             <a:endParaRPr lang="it-IT"/>
           </a:p>
@@ -5259,7 +5264,7 @@
           <a:p>
             <a:fld id="{C7CC04FB-86A9-4518-B68C-513A8C480987}" type="datetimeFigureOut">
               <a:rPr lang="it-IT" smtClean="0"/>
-              <a:t>23/12/2025</a:t>
+              <a:t>13/01/2026</a:t>
             </a:fld>
             <a:endParaRPr lang="it-IT"/>
           </a:p>
@@ -5301,7 +5306,7 @@
           <a:p>
             <a:fld id="{53989CFC-89DE-4F17-B3B6-DFC80C736B18}" type="slidenum">
               <a:rPr lang="it-IT" smtClean="0"/>
-              <a:t>‹N›</a:t>
+              <a:t>‹#›</a:t>
             </a:fld>
             <a:endParaRPr lang="it-IT"/>
           </a:p>
@@ -5522,7 +5527,7 @@
           <a:p>
             <a:fld id="{C7CC04FB-86A9-4518-B68C-513A8C480987}" type="datetimeFigureOut">
               <a:rPr lang="it-IT" smtClean="0"/>
-              <a:t>23/12/2025</a:t>
+              <a:t>13/01/2026</a:t>
             </a:fld>
             <a:endParaRPr lang="it-IT"/>
           </a:p>
@@ -5564,7 +5569,7 @@
           <a:p>
             <a:fld id="{53989CFC-89DE-4F17-B3B6-DFC80C736B18}" type="slidenum">
               <a:rPr lang="it-IT" smtClean="0"/>
-              <a:t>‹N›</a:t>
+              <a:t>‹#›</a:t>
             </a:fld>
             <a:endParaRPr lang="it-IT"/>
           </a:p>
@@ -5956,7 +5961,7 @@
           <a:p>
             <a:fld id="{C7CC04FB-86A9-4518-B68C-513A8C480987}" type="datetimeFigureOut">
               <a:rPr lang="it-IT" smtClean="0"/>
-              <a:t>23/12/2025</a:t>
+              <a:t>13/01/2026</a:t>
             </a:fld>
             <a:endParaRPr lang="it-IT"/>
           </a:p>
@@ -5998,7 +6003,7 @@
           <a:p>
             <a:fld id="{53989CFC-89DE-4F17-B3B6-DFC80C736B18}" type="slidenum">
               <a:rPr lang="it-IT" smtClean="0"/>
-              <a:t>‹N›</a:t>
+              <a:t>‹#›</a:t>
             </a:fld>
             <a:endParaRPr lang="it-IT"/>
           </a:p>
@@ -6502,7 +6507,7 @@
           <a:p>
             <a:fld id="{C7CC04FB-86A9-4518-B68C-513A8C480987}" type="datetimeFigureOut">
               <a:rPr lang="it-IT" smtClean="0"/>
-              <a:t>23/12/2025</a:t>
+              <a:t>13/01/2026</a:t>
             </a:fld>
             <a:endParaRPr lang="it-IT"/>
           </a:p>
@@ -6544,7 +6549,7 @@
           <a:p>
             <a:fld id="{53989CFC-89DE-4F17-B3B6-DFC80C736B18}" type="slidenum">
               <a:rPr lang="it-IT" smtClean="0"/>
-              <a:t>‹N›</a:t>
+              <a:t>‹#›</a:t>
             </a:fld>
             <a:endParaRPr lang="it-IT"/>
           </a:p>
@@ -7222,7 +7227,7 @@
           <a:p>
             <a:fld id="{C7CC04FB-86A9-4518-B68C-513A8C480987}" type="datetimeFigureOut">
               <a:rPr lang="it-IT" smtClean="0"/>
-              <a:t>23/12/2025</a:t>
+              <a:t>13/01/2026</a:t>
             </a:fld>
             <a:endParaRPr lang="it-IT"/>
           </a:p>
@@ -7264,7 +7269,7 @@
           <a:p>
             <a:fld id="{53989CFC-89DE-4F17-B3B6-DFC80C736B18}" type="slidenum">
               <a:rPr lang="it-IT" smtClean="0"/>
-              <a:t>‹N›</a:t>
+              <a:t>‹#›</a:t>
             </a:fld>
             <a:endParaRPr lang="it-IT"/>
           </a:p>
@@ -7392,7 +7397,7 @@
           <a:p>
             <a:fld id="{C7CC04FB-86A9-4518-B68C-513A8C480987}" type="datetimeFigureOut">
               <a:rPr lang="it-IT" smtClean="0"/>
-              <a:t>23/12/2025</a:t>
+              <a:t>13/01/2026</a:t>
             </a:fld>
             <a:endParaRPr lang="it-IT"/>
           </a:p>
@@ -7434,7 +7439,7 @@
           <a:p>
             <a:fld id="{53989CFC-89DE-4F17-B3B6-DFC80C736B18}" type="slidenum">
               <a:rPr lang="it-IT" smtClean="0"/>
-              <a:t>‹N›</a:t>
+              <a:t>‹#›</a:t>
             </a:fld>
             <a:endParaRPr lang="it-IT"/>
           </a:p>
@@ -7572,7 +7577,7 @@
           <a:p>
             <a:fld id="{C7CC04FB-86A9-4518-B68C-513A8C480987}" type="datetimeFigureOut">
               <a:rPr lang="it-IT" smtClean="0"/>
-              <a:t>23/12/2025</a:t>
+              <a:t>13/01/2026</a:t>
             </a:fld>
             <a:endParaRPr lang="it-IT"/>
           </a:p>
@@ -7614,7 +7619,7 @@
           <a:p>
             <a:fld id="{53989CFC-89DE-4F17-B3B6-DFC80C736B18}" type="slidenum">
               <a:rPr lang="it-IT" smtClean="0"/>
-              <a:t>‹N›</a:t>
+              <a:t>‹#›</a:t>
             </a:fld>
             <a:endParaRPr lang="it-IT"/>
           </a:p>
@@ -7742,7 +7747,7 @@
           <a:p>
             <a:fld id="{C7CC04FB-86A9-4518-B68C-513A8C480987}" type="datetimeFigureOut">
               <a:rPr lang="it-IT" smtClean="0"/>
-              <a:t>23/12/2025</a:t>
+              <a:t>13/01/2026</a:t>
             </a:fld>
             <a:endParaRPr lang="it-IT"/>
           </a:p>
@@ -7784,7 +7789,7 @@
           <a:p>
             <a:fld id="{53989CFC-89DE-4F17-B3B6-DFC80C736B18}" type="slidenum">
               <a:rPr lang="it-IT" smtClean="0"/>
-              <a:t>‹N›</a:t>
+              <a:t>‹#›</a:t>
             </a:fld>
             <a:endParaRPr lang="it-IT"/>
           </a:p>
@@ -7992,7 +7997,7 @@
           <a:p>
             <a:fld id="{C7CC04FB-86A9-4518-B68C-513A8C480987}" type="datetimeFigureOut">
               <a:rPr lang="it-IT" smtClean="0"/>
-              <a:t>23/12/2025</a:t>
+              <a:t>13/01/2026</a:t>
             </a:fld>
             <a:endParaRPr lang="it-IT"/>
           </a:p>
@@ -8034,7 +8039,7 @@
           <a:p>
             <a:fld id="{53989CFC-89DE-4F17-B3B6-DFC80C736B18}" type="slidenum">
               <a:rPr lang="it-IT" smtClean="0"/>
-              <a:t>‹N›</a:t>
+              <a:t>‹#›</a:t>
             </a:fld>
             <a:endParaRPr lang="it-IT"/>
           </a:p>
@@ -8224,7 +8229,7 @@
           <a:p>
             <a:fld id="{C7CC04FB-86A9-4518-B68C-513A8C480987}" type="datetimeFigureOut">
               <a:rPr lang="it-IT" smtClean="0"/>
-              <a:t>23/12/2025</a:t>
+              <a:t>13/01/2026</a:t>
             </a:fld>
             <a:endParaRPr lang="it-IT"/>
           </a:p>
@@ -8266,7 +8271,7 @@
           <a:p>
             <a:fld id="{53989CFC-89DE-4F17-B3B6-DFC80C736B18}" type="slidenum">
               <a:rPr lang="it-IT" smtClean="0"/>
-              <a:t>‹N›</a:t>
+              <a:t>‹#›</a:t>
             </a:fld>
             <a:endParaRPr lang="it-IT"/>
           </a:p>
@@ -8605,7 +8610,7 @@
           <a:p>
             <a:fld id="{C7CC04FB-86A9-4518-B68C-513A8C480987}" type="datetimeFigureOut">
               <a:rPr lang="it-IT" smtClean="0"/>
-              <a:t>23/12/2025</a:t>
+              <a:t>13/01/2026</a:t>
             </a:fld>
             <a:endParaRPr lang="it-IT"/>
           </a:p>
@@ -8647,7 +8652,7 @@
           <a:p>
             <a:fld id="{53989CFC-89DE-4F17-B3B6-DFC80C736B18}" type="slidenum">
               <a:rPr lang="it-IT" smtClean="0"/>
-              <a:t>‹N›</a:t>
+              <a:t>‹#›</a:t>
             </a:fld>
             <a:endParaRPr lang="it-IT"/>
           </a:p>
@@ -8723,7 +8728,7 @@
           <a:p>
             <a:fld id="{C7CC04FB-86A9-4518-B68C-513A8C480987}" type="datetimeFigureOut">
               <a:rPr lang="it-IT" smtClean="0"/>
-              <a:t>23/12/2025</a:t>
+              <a:t>13/01/2026</a:t>
             </a:fld>
             <a:endParaRPr lang="it-IT"/>
           </a:p>
@@ -8765,7 +8770,7 @@
           <a:p>
             <a:fld id="{53989CFC-89DE-4F17-B3B6-DFC80C736B18}" type="slidenum">
               <a:rPr lang="it-IT" smtClean="0"/>
-              <a:t>‹N›</a:t>
+              <a:t>‹#›</a:t>
             </a:fld>
             <a:endParaRPr lang="it-IT"/>
           </a:p>
@@ -8818,7 +8823,7 @@
           <a:p>
             <a:fld id="{C7CC04FB-86A9-4518-B68C-513A8C480987}" type="datetimeFigureOut">
               <a:rPr lang="it-IT" smtClean="0"/>
-              <a:t>23/12/2025</a:t>
+              <a:t>13/01/2026</a:t>
             </a:fld>
             <a:endParaRPr lang="it-IT"/>
           </a:p>
@@ -8860,7 +8865,7 @@
           <a:p>
             <a:fld id="{53989CFC-89DE-4F17-B3B6-DFC80C736B18}" type="slidenum">
               <a:rPr lang="it-IT" smtClean="0"/>
-              <a:t>‹N›</a:t>
+              <a:t>‹#›</a:t>
             </a:fld>
             <a:endParaRPr lang="it-IT"/>
           </a:p>
@@ -9067,7 +9072,7 @@
           <a:p>
             <a:fld id="{C7CC04FB-86A9-4518-B68C-513A8C480987}" type="datetimeFigureOut">
               <a:rPr lang="it-IT" smtClean="0"/>
-              <a:t>23/12/2025</a:t>
+              <a:t>13/01/2026</a:t>
             </a:fld>
             <a:endParaRPr lang="it-IT"/>
           </a:p>
@@ -9109,7 +9114,7 @@
           <a:p>
             <a:fld id="{53989CFC-89DE-4F17-B3B6-DFC80C736B18}" type="slidenum">
               <a:rPr lang="it-IT" smtClean="0"/>
-              <a:t>‹N›</a:t>
+              <a:t>‹#›</a:t>
             </a:fld>
             <a:endParaRPr lang="it-IT"/>
           </a:p>
@@ -9347,7 +9352,7 @@
           <a:p>
             <a:fld id="{C7CC04FB-86A9-4518-B68C-513A8C480987}" type="datetimeFigureOut">
               <a:rPr lang="it-IT" smtClean="0"/>
-              <a:t>23/12/2025</a:t>
+              <a:t>13/01/2026</a:t>
             </a:fld>
             <a:endParaRPr lang="it-IT"/>
           </a:p>
@@ -9389,7 +9394,7 @@
           <a:p>
             <a:fld id="{53989CFC-89DE-4F17-B3B6-DFC80C736B18}" type="slidenum">
               <a:rPr lang="it-IT" smtClean="0"/>
-              <a:t>‹N›</a:t>
+              <a:t>‹#›</a:t>
             </a:fld>
             <a:endParaRPr lang="it-IT"/>
           </a:p>
@@ -9463,7 +9468,7 @@
           <a:noFill/>
           <a:extLst>
             <a:ext uri="{909E8E84-426E-40dd-AFC4-6F175D3DCCD1}">
-              <a14:hiddenFill xmlns:a14="http://schemas.microsoft.com/office/drawing/2010/main" xmlns="">
+              <a14:hiddenFill xmlns="" xmlns:a14="http://schemas.microsoft.com/office/drawing/2010/main">
                 <a:solidFill>
                   <a:srgbClr val="FFFFFF"/>
                 </a:solidFill>
@@ -9537,7 +9542,7 @@
               </a:ln>
               <a:extLst>
                 <a:ext uri="{91240B29-F687-4f45-9708-019B960494DF}">
-                  <a14:hiddenLine xmlns:a14="http://schemas.microsoft.com/office/drawing/2010/main" xmlns="" w="9525">
+                  <a14:hiddenLine xmlns="" xmlns:a14="http://schemas.microsoft.com/office/drawing/2010/main" w="9525">
                     <a:solidFill>
                       <a:srgbClr val="000000"/>
                     </a:solidFill>
@@ -9634,7 +9639,7 @@
               </a:ln>
               <a:extLst>
                 <a:ext uri="{91240B29-F687-4f45-9708-019B960494DF}">
-                  <a14:hiddenLine xmlns:a14="http://schemas.microsoft.com/office/drawing/2010/main" xmlns="" w="9525">
+                  <a14:hiddenLine xmlns="" xmlns:a14="http://schemas.microsoft.com/office/drawing/2010/main" w="9525">
                     <a:solidFill>
                       <a:srgbClr val="000000"/>
                     </a:solidFill>
@@ -9731,7 +9736,7 @@
               </a:ln>
               <a:extLst>
                 <a:ext uri="{91240B29-F687-4f45-9708-019B960494DF}">
-                  <a14:hiddenLine xmlns:a14="http://schemas.microsoft.com/office/drawing/2010/main" xmlns="" w="9525">
+                  <a14:hiddenLine xmlns="" xmlns:a14="http://schemas.microsoft.com/office/drawing/2010/main" w="9525">
                     <a:solidFill>
                       <a:srgbClr val="000000"/>
                     </a:solidFill>
@@ -9800,7 +9805,7 @@
               </a:ln>
               <a:extLst>
                 <a:ext uri="{91240B29-F687-4f45-9708-019B960494DF}">
-                  <a14:hiddenLine xmlns:a14="http://schemas.microsoft.com/office/drawing/2010/main" xmlns="" w="9525">
+                  <a14:hiddenLine xmlns="" xmlns:a14="http://schemas.microsoft.com/office/drawing/2010/main" w="9525">
                     <a:solidFill>
                       <a:srgbClr val="000000"/>
                     </a:solidFill>
@@ -9897,7 +9902,7 @@
               </a:ln>
               <a:extLst>
                 <a:ext uri="{91240B29-F687-4f45-9708-019B960494DF}">
-                  <a14:hiddenLine xmlns:a14="http://schemas.microsoft.com/office/drawing/2010/main" xmlns="" w="9525">
+                  <a14:hiddenLine xmlns="" xmlns:a14="http://schemas.microsoft.com/office/drawing/2010/main" w="9525">
                     <a:solidFill>
                       <a:srgbClr val="000000"/>
                     </a:solidFill>
@@ -9966,7 +9971,7 @@
               </a:ln>
               <a:extLst>
                 <a:ext uri="{91240B29-F687-4f45-9708-019B960494DF}">
-                  <a14:hiddenLine xmlns:a14="http://schemas.microsoft.com/office/drawing/2010/main" xmlns="" w="9525">
+                  <a14:hiddenLine xmlns="" xmlns:a14="http://schemas.microsoft.com/office/drawing/2010/main" w="9525">
                     <a:solidFill>
                       <a:srgbClr val="000000"/>
                     </a:solidFill>
@@ -10035,7 +10040,7 @@
               </a:ln>
               <a:extLst>
                 <a:ext uri="{91240B29-F687-4f45-9708-019B960494DF}">
-                  <a14:hiddenLine xmlns:a14="http://schemas.microsoft.com/office/drawing/2010/main" xmlns="" w="9525">
+                  <a14:hiddenLine xmlns="" xmlns:a14="http://schemas.microsoft.com/office/drawing/2010/main" w="9525">
                     <a:solidFill>
                       <a:srgbClr val="000000"/>
                     </a:solidFill>
@@ -10132,7 +10137,7 @@
               </a:ln>
               <a:extLst>
                 <a:ext uri="{91240B29-F687-4f45-9708-019B960494DF}">
-                  <a14:hiddenLine xmlns:a14="http://schemas.microsoft.com/office/drawing/2010/main" xmlns="" w="9525">
+                  <a14:hiddenLine xmlns="" xmlns:a14="http://schemas.microsoft.com/office/drawing/2010/main" w="9525">
                     <a:solidFill>
                       <a:srgbClr val="000000"/>
                     </a:solidFill>
@@ -10229,7 +10234,7 @@
               </a:ln>
               <a:extLst>
                 <a:ext uri="{91240B29-F687-4f45-9708-019B960494DF}">
-                  <a14:hiddenLine xmlns:a14="http://schemas.microsoft.com/office/drawing/2010/main" xmlns="" w="9525">
+                  <a14:hiddenLine xmlns="" xmlns:a14="http://schemas.microsoft.com/office/drawing/2010/main" w="9525">
                     <a:solidFill>
                       <a:srgbClr val="000000"/>
                     </a:solidFill>
@@ -10298,7 +10303,7 @@
               </a:ln>
               <a:extLst>
                 <a:ext uri="{91240B29-F687-4f45-9708-019B960494DF}">
-                  <a14:hiddenLine xmlns:a14="http://schemas.microsoft.com/office/drawing/2010/main" xmlns="" w="9525">
+                  <a14:hiddenLine xmlns="" xmlns:a14="http://schemas.microsoft.com/office/drawing/2010/main" w="9525">
                     <a:solidFill>
                       <a:srgbClr val="000000"/>
                     </a:solidFill>
@@ -10415,7 +10420,7 @@
               </a:ln>
               <a:extLst>
                 <a:ext uri="{91240B29-F687-4f45-9708-019B960494DF}">
-                  <a14:hiddenLine xmlns:a14="http://schemas.microsoft.com/office/drawing/2010/main" xmlns="" w="9525">
+                  <a14:hiddenLine xmlns="" xmlns:a14="http://schemas.microsoft.com/office/drawing/2010/main" w="9525">
                     <a:solidFill>
                       <a:srgbClr val="000000"/>
                     </a:solidFill>
@@ -10513,7 +10518,7 @@
               </a:ln>
               <a:extLst>
                 <a:ext uri="{91240B29-F687-4f45-9708-019B960494DF}">
-                  <a14:hiddenLine xmlns:a14="http://schemas.microsoft.com/office/drawing/2010/main" xmlns="" w="9525">
+                  <a14:hiddenLine xmlns="" xmlns:a14="http://schemas.microsoft.com/office/drawing/2010/main" w="9525">
                     <a:solidFill>
                       <a:srgbClr val="000000"/>
                     </a:solidFill>
@@ -10582,7 +10587,7 @@
               </a:ln>
               <a:extLst>
                 <a:ext uri="{91240B29-F687-4f45-9708-019B960494DF}">
-                  <a14:hiddenLine xmlns:a14="http://schemas.microsoft.com/office/drawing/2010/main" xmlns="" w="9525">
+                  <a14:hiddenLine xmlns="" xmlns:a14="http://schemas.microsoft.com/office/drawing/2010/main" w="9525">
                     <a:solidFill>
                       <a:srgbClr val="000000"/>
                     </a:solidFill>
@@ -10651,7 +10656,7 @@
               </a:ln>
               <a:extLst>
                 <a:ext uri="{91240B29-F687-4f45-9708-019B960494DF}">
-                  <a14:hiddenLine xmlns:a14="http://schemas.microsoft.com/office/drawing/2010/main" xmlns="" w="9525">
+                  <a14:hiddenLine xmlns="" xmlns:a14="http://schemas.microsoft.com/office/drawing/2010/main" w="9525">
                     <a:solidFill>
                       <a:srgbClr val="000000"/>
                     </a:solidFill>
@@ -10748,7 +10753,7 @@
               </a:ln>
               <a:extLst>
                 <a:ext uri="{91240B29-F687-4f45-9708-019B960494DF}">
-                  <a14:hiddenLine xmlns:a14="http://schemas.microsoft.com/office/drawing/2010/main" xmlns="" w="9525">
+                  <a14:hiddenLine xmlns="" xmlns:a14="http://schemas.microsoft.com/office/drawing/2010/main" w="9525">
                     <a:solidFill>
                       <a:srgbClr val="000000"/>
                     </a:solidFill>
@@ -10789,7 +10794,7 @@
               </a:ln>
               <a:extLst>
                 <a:ext uri="{91240B29-F687-4f45-9708-019B960494DF}">
-                  <a14:hiddenLine xmlns:a14="http://schemas.microsoft.com/office/drawing/2010/main" xmlns="" w="9525">
+                  <a14:hiddenLine xmlns="" xmlns:a14="http://schemas.microsoft.com/office/drawing/2010/main" w="9525">
                     <a:solidFill>
                       <a:srgbClr val="000000"/>
                     </a:solidFill>
@@ -10861,7 +10866,7 @@
               </a:ln>
               <a:extLst>
                 <a:ext uri="{91240B29-F687-4f45-9708-019B960494DF}">
-                  <a14:hiddenLine xmlns:a14="http://schemas.microsoft.com/office/drawing/2010/main" xmlns="" w="9525">
+                  <a14:hiddenLine xmlns="" xmlns:a14="http://schemas.microsoft.com/office/drawing/2010/main" w="9525">
                     <a:solidFill>
                       <a:srgbClr val="000000"/>
                     </a:solidFill>
@@ -10958,7 +10963,7 @@
               </a:ln>
               <a:extLst>
                 <a:ext uri="{91240B29-F687-4f45-9708-019B960494DF}">
-                  <a14:hiddenLine xmlns:a14="http://schemas.microsoft.com/office/drawing/2010/main" xmlns="" w="9525">
+                  <a14:hiddenLine xmlns="" xmlns:a14="http://schemas.microsoft.com/office/drawing/2010/main" w="9525">
                     <a:solidFill>
                       <a:srgbClr val="000000"/>
                     </a:solidFill>
@@ -11027,7 +11032,7 @@
               </a:ln>
               <a:extLst>
                 <a:ext uri="{91240B29-F687-4f45-9708-019B960494DF}">
-                  <a14:hiddenLine xmlns:a14="http://schemas.microsoft.com/office/drawing/2010/main" xmlns="" w="9525">
+                  <a14:hiddenLine xmlns="" xmlns:a14="http://schemas.microsoft.com/office/drawing/2010/main" w="9525">
                     <a:solidFill>
                       <a:srgbClr val="000000"/>
                     </a:solidFill>
@@ -11124,7 +11129,7 @@
               </a:ln>
               <a:extLst>
                 <a:ext uri="{91240B29-F687-4f45-9708-019B960494DF}">
-                  <a14:hiddenLine xmlns:a14="http://schemas.microsoft.com/office/drawing/2010/main" xmlns="" w="9525">
+                  <a14:hiddenLine xmlns="" xmlns:a14="http://schemas.microsoft.com/office/drawing/2010/main" w="9525">
                     <a:solidFill>
                       <a:srgbClr val="000000"/>
                     </a:solidFill>
@@ -11196,7 +11201,7 @@
               </a:ln>
               <a:extLst>
                 <a:ext uri="{91240B29-F687-4f45-9708-019B960494DF}">
-                  <a14:hiddenLine xmlns:a14="http://schemas.microsoft.com/office/drawing/2010/main" xmlns="" w="9525">
+                  <a14:hiddenLine xmlns="" xmlns:a14="http://schemas.microsoft.com/office/drawing/2010/main" w="9525">
                     <a:solidFill>
                       <a:srgbClr val="000000"/>
                     </a:solidFill>
@@ -11265,7 +11270,7 @@
               </a:ln>
               <a:extLst>
                 <a:ext uri="{91240B29-F687-4f45-9708-019B960494DF}">
-                  <a14:hiddenLine xmlns:a14="http://schemas.microsoft.com/office/drawing/2010/main" xmlns="" w="9525">
+                  <a14:hiddenLine xmlns="" xmlns:a14="http://schemas.microsoft.com/office/drawing/2010/main" w="9525">
                     <a:solidFill>
                       <a:srgbClr val="000000"/>
                     </a:solidFill>
@@ -11362,7 +11367,7 @@
               </a:ln>
               <a:extLst>
                 <a:ext uri="{91240B29-F687-4f45-9708-019B960494DF}">
-                  <a14:hiddenLine xmlns:a14="http://schemas.microsoft.com/office/drawing/2010/main" xmlns="" w="9525">
+                  <a14:hiddenLine xmlns="" xmlns:a14="http://schemas.microsoft.com/office/drawing/2010/main" w="9525">
                     <a:solidFill>
                       <a:srgbClr val="000000"/>
                     </a:solidFill>
@@ -11459,7 +11464,7 @@
               </a:ln>
               <a:extLst>
                 <a:ext uri="{91240B29-F687-4f45-9708-019B960494DF}">
-                  <a14:hiddenLine xmlns:a14="http://schemas.microsoft.com/office/drawing/2010/main" xmlns="" w="9525">
+                  <a14:hiddenLine xmlns="" xmlns:a14="http://schemas.microsoft.com/office/drawing/2010/main" w="9525">
                     <a:solidFill>
                       <a:srgbClr val="000000"/>
                     </a:solidFill>
@@ -11531,7 +11536,7 @@
               </a:ln>
               <a:extLst>
                 <a:ext uri="{91240B29-F687-4f45-9708-019B960494DF}">
-                  <a14:hiddenLine xmlns:a14="http://schemas.microsoft.com/office/drawing/2010/main" xmlns="" w="9525">
+                  <a14:hiddenLine xmlns="" xmlns:a14="http://schemas.microsoft.com/office/drawing/2010/main" w="9525">
                     <a:solidFill>
                       <a:srgbClr val="000000"/>
                     </a:solidFill>
@@ -11658,7 +11663,7 @@
               </a:ln>
               <a:extLst>
                 <a:ext uri="{91240B29-F687-4f45-9708-019B960494DF}">
-                  <a14:hiddenLine xmlns:a14="http://schemas.microsoft.com/office/drawing/2010/main" xmlns="" w="9525">
+                  <a14:hiddenLine xmlns="" xmlns:a14="http://schemas.microsoft.com/office/drawing/2010/main" w="9525">
                     <a:solidFill>
                       <a:srgbClr val="000000"/>
                     </a:solidFill>
@@ -11763,7 +11768,7 @@
               </a:ln>
               <a:extLst>
                 <a:ext uri="{91240B29-F687-4f45-9708-019B960494DF}">
-                  <a14:hiddenLine xmlns:a14="http://schemas.microsoft.com/office/drawing/2010/main" xmlns="" w="9525">
+                  <a14:hiddenLine xmlns="" xmlns:a14="http://schemas.microsoft.com/office/drawing/2010/main" w="9525">
                     <a:solidFill>
                       <a:srgbClr val="000000"/>
                     </a:solidFill>
@@ -11885,7 +11890,7 @@
               </a:ln>
               <a:extLst>
                 <a:ext uri="{91240B29-F687-4f45-9708-019B960494DF}">
-                  <a14:hiddenLine xmlns:a14="http://schemas.microsoft.com/office/drawing/2010/main" xmlns="" w="9525">
+                  <a14:hiddenLine xmlns="" xmlns:a14="http://schemas.microsoft.com/office/drawing/2010/main" w="9525">
                     <a:solidFill>
                       <a:srgbClr val="000000"/>
                     </a:solidFill>
@@ -11982,7 +11987,7 @@
               </a:ln>
               <a:extLst>
                 <a:ext uri="{91240B29-F687-4f45-9708-019B960494DF}">
-                  <a14:hiddenLine xmlns:a14="http://schemas.microsoft.com/office/drawing/2010/main" xmlns="" w="9525">
+                  <a14:hiddenLine xmlns="" xmlns:a14="http://schemas.microsoft.com/office/drawing/2010/main" w="9525">
                     <a:solidFill>
                       <a:srgbClr val="000000"/>
                     </a:solidFill>
@@ -12054,7 +12059,7 @@
               </a:ln>
               <a:extLst>
                 <a:ext uri="{91240B29-F687-4f45-9708-019B960494DF}">
-                  <a14:hiddenLine xmlns:a14="http://schemas.microsoft.com/office/drawing/2010/main" xmlns="" w="9525">
+                  <a14:hiddenLine xmlns="" xmlns:a14="http://schemas.microsoft.com/office/drawing/2010/main" w="9525">
                     <a:solidFill>
                       <a:srgbClr val="000000"/>
                     </a:solidFill>
@@ -12151,7 +12156,7 @@
               </a:ln>
               <a:extLst>
                 <a:ext uri="{91240B29-F687-4f45-9708-019B960494DF}">
-                  <a14:hiddenLine xmlns:a14="http://schemas.microsoft.com/office/drawing/2010/main" xmlns="" w="9525">
+                  <a14:hiddenLine xmlns="" xmlns:a14="http://schemas.microsoft.com/office/drawing/2010/main" w="9525">
                     <a:solidFill>
                       <a:srgbClr val="000000"/>
                     </a:solidFill>
@@ -12226,7 +12231,7 @@
               </a:ln>
               <a:extLst>
                 <a:ext uri="{91240B29-F687-4f45-9708-019B960494DF}">
-                  <a14:hiddenLine xmlns:a14="http://schemas.microsoft.com/office/drawing/2010/main" xmlns="" w="9525">
+                  <a14:hiddenLine xmlns="" xmlns:a14="http://schemas.microsoft.com/office/drawing/2010/main" w="9525">
                     <a:solidFill>
                       <a:srgbClr val="000000"/>
                     </a:solidFill>
@@ -12323,7 +12328,7 @@
               </a:ln>
               <a:extLst>
                 <a:ext uri="{91240B29-F687-4f45-9708-019B960494DF}">
-                  <a14:hiddenLine xmlns:a14="http://schemas.microsoft.com/office/drawing/2010/main" xmlns="" w="9525">
+                  <a14:hiddenLine xmlns="" xmlns:a14="http://schemas.microsoft.com/office/drawing/2010/main" w="9525">
                     <a:solidFill>
                       <a:srgbClr val="000000"/>
                     </a:solidFill>
@@ -12398,7 +12403,7 @@
               </a:ln>
               <a:extLst>
                 <a:ext uri="{91240B29-F687-4f45-9708-019B960494DF}">
-                  <a14:hiddenLine xmlns:a14="http://schemas.microsoft.com/office/drawing/2010/main" xmlns="" w="9525">
+                  <a14:hiddenLine xmlns="" xmlns:a14="http://schemas.microsoft.com/office/drawing/2010/main" w="9525">
                     <a:solidFill>
                       <a:srgbClr val="000000"/>
                     </a:solidFill>
@@ -12495,7 +12500,7 @@
               </a:ln>
               <a:extLst>
                 <a:ext uri="{91240B29-F687-4f45-9708-019B960494DF}">
-                  <a14:hiddenLine xmlns:a14="http://schemas.microsoft.com/office/drawing/2010/main" xmlns="" w="9525">
+                  <a14:hiddenLine xmlns="" xmlns:a14="http://schemas.microsoft.com/office/drawing/2010/main" w="9525">
                     <a:solidFill>
                       <a:srgbClr val="000000"/>
                     </a:solidFill>
@@ -12536,7 +12541,7 @@
               </a:ln>
               <a:extLst>
                 <a:ext uri="{91240B29-F687-4f45-9708-019B960494DF}">
-                  <a14:hiddenLine xmlns:a14="http://schemas.microsoft.com/office/drawing/2010/main" xmlns="" w="9525">
+                  <a14:hiddenLine xmlns="" xmlns:a14="http://schemas.microsoft.com/office/drawing/2010/main" w="9525">
                     <a:solidFill>
                       <a:srgbClr val="000000"/>
                     </a:solidFill>
@@ -12683,7 +12688,7 @@
           <a:p>
             <a:fld id="{C7CC04FB-86A9-4518-B68C-513A8C480987}" type="datetimeFigureOut">
               <a:rPr lang="it-IT" smtClean="0"/>
-              <a:t>23/12/2025</a:t>
+              <a:t>13/01/2026</a:t>
             </a:fld>
             <a:endParaRPr lang="it-IT"/>
           </a:p>
@@ -12761,7 +12766,7 @@
           <a:p>
             <a:fld id="{53989CFC-89DE-4F17-B3B6-DFC80C736B18}" type="slidenum">
               <a:rPr lang="it-IT" smtClean="0"/>
-              <a:t>‹N›</a:t>
+              <a:t>‹#›</a:t>
             </a:fld>
             <a:endParaRPr lang="it-IT"/>
           </a:p>
@@ -13529,7 +13534,7 @@
             </a:ln>
             <a:extLst>
               <a:ext uri="{91240B29-F687-4f45-9708-019B960494DF}">
-                <a14:hiddenLine xmlns="" xmlns:a16="http://schemas.microsoft.com/office/drawing/2014/main" xmlns:p14="http://schemas.microsoft.com/office/powerpoint/2010/main" xmlns:a14="http://schemas.microsoft.com/office/drawing/2010/main" w="9525">
+                <a14:hiddenLine xmlns:a14="http://schemas.microsoft.com/office/drawing/2010/main" xmlns:p14="http://schemas.microsoft.com/office/powerpoint/2010/main" xmlns:a16="http://schemas.microsoft.com/office/drawing/2014/main" xmlns="" w="9525">
                   <a:solidFill>
                     <a:srgbClr val="000000"/>
                   </a:solidFill>
@@ -13641,7 +13646,7 @@
             </a:ln>
             <a:extLst>
               <a:ext uri="{91240B29-F687-4f45-9708-019B960494DF}">
-                <a14:hiddenLine xmlns="" xmlns:a16="http://schemas.microsoft.com/office/drawing/2014/main" xmlns:p14="http://schemas.microsoft.com/office/powerpoint/2010/main" xmlns:a14="http://schemas.microsoft.com/office/drawing/2010/main" w="9525">
+                <a14:hiddenLine xmlns:a14="http://schemas.microsoft.com/office/drawing/2010/main" xmlns:p14="http://schemas.microsoft.com/office/powerpoint/2010/main" xmlns:a16="http://schemas.microsoft.com/office/drawing/2014/main" xmlns="" w="9525">
                   <a:solidFill>
                     <a:srgbClr val="000000"/>
                   </a:solidFill>
@@ -13753,7 +13758,7 @@
             </a:ln>
             <a:extLst>
               <a:ext uri="{91240B29-F687-4f45-9708-019B960494DF}">
-                <a14:hiddenLine xmlns="" xmlns:a16="http://schemas.microsoft.com/office/drawing/2014/main" xmlns:p14="http://schemas.microsoft.com/office/powerpoint/2010/main" xmlns:a14="http://schemas.microsoft.com/office/drawing/2010/main" w="9525">
+                <a14:hiddenLine xmlns:a14="http://schemas.microsoft.com/office/drawing/2010/main" xmlns:p14="http://schemas.microsoft.com/office/powerpoint/2010/main" xmlns:a16="http://schemas.microsoft.com/office/drawing/2014/main" xmlns="" w="9525">
                   <a:solidFill>
                     <a:srgbClr val="000000"/>
                   </a:solidFill>
@@ -13837,7 +13842,7 @@
             </a:ln>
             <a:extLst>
               <a:ext uri="{91240B29-F687-4f45-9708-019B960494DF}">
-                <a14:hiddenLine xmlns="" xmlns:a16="http://schemas.microsoft.com/office/drawing/2014/main" xmlns:p14="http://schemas.microsoft.com/office/powerpoint/2010/main" xmlns:a14="http://schemas.microsoft.com/office/drawing/2010/main" w="9525">
+                <a14:hiddenLine xmlns:a14="http://schemas.microsoft.com/office/drawing/2010/main" xmlns:p14="http://schemas.microsoft.com/office/powerpoint/2010/main" xmlns:a16="http://schemas.microsoft.com/office/drawing/2014/main" xmlns="" w="9525">
                   <a:solidFill>
                     <a:srgbClr val="000000"/>
                   </a:solidFill>
@@ -13949,7 +13954,7 @@
             </a:ln>
             <a:extLst>
               <a:ext uri="{91240B29-F687-4f45-9708-019B960494DF}">
-                <a14:hiddenLine xmlns="" xmlns:a16="http://schemas.microsoft.com/office/drawing/2014/main" xmlns:p14="http://schemas.microsoft.com/office/powerpoint/2010/main" xmlns:a14="http://schemas.microsoft.com/office/drawing/2010/main" w="9525">
+                <a14:hiddenLine xmlns:a14="http://schemas.microsoft.com/office/drawing/2010/main" xmlns:p14="http://schemas.microsoft.com/office/powerpoint/2010/main" xmlns:a16="http://schemas.microsoft.com/office/drawing/2014/main" xmlns="" w="9525">
                   <a:solidFill>
                     <a:srgbClr val="000000"/>
                   </a:solidFill>
@@ -14033,7 +14038,7 @@
             </a:ln>
             <a:extLst>
               <a:ext uri="{91240B29-F687-4f45-9708-019B960494DF}">
-                <a14:hiddenLine xmlns="" xmlns:a16="http://schemas.microsoft.com/office/drawing/2014/main" xmlns:p14="http://schemas.microsoft.com/office/powerpoint/2010/main" xmlns:a14="http://schemas.microsoft.com/office/drawing/2010/main" w="9525">
+                <a14:hiddenLine xmlns:a14="http://schemas.microsoft.com/office/drawing/2010/main" xmlns:p14="http://schemas.microsoft.com/office/powerpoint/2010/main" xmlns:a16="http://schemas.microsoft.com/office/drawing/2014/main" xmlns="" w="9525">
                   <a:solidFill>
                     <a:srgbClr val="000000"/>
                   </a:solidFill>
@@ -14117,7 +14122,7 @@
             </a:ln>
             <a:extLst>
               <a:ext uri="{91240B29-F687-4f45-9708-019B960494DF}">
-                <a14:hiddenLine xmlns="" xmlns:a16="http://schemas.microsoft.com/office/drawing/2014/main" xmlns:p14="http://schemas.microsoft.com/office/powerpoint/2010/main" xmlns:a14="http://schemas.microsoft.com/office/drawing/2010/main" w="9525">
+                <a14:hiddenLine xmlns:a14="http://schemas.microsoft.com/office/drawing/2010/main" xmlns:p14="http://schemas.microsoft.com/office/powerpoint/2010/main" xmlns:a16="http://schemas.microsoft.com/office/drawing/2014/main" xmlns="" w="9525">
                   <a:solidFill>
                     <a:srgbClr val="000000"/>
                   </a:solidFill>
@@ -14229,7 +14234,7 @@
             </a:ln>
             <a:extLst>
               <a:ext uri="{91240B29-F687-4f45-9708-019B960494DF}">
-                <a14:hiddenLine xmlns="" xmlns:a16="http://schemas.microsoft.com/office/drawing/2014/main" xmlns:p14="http://schemas.microsoft.com/office/powerpoint/2010/main" xmlns:a14="http://schemas.microsoft.com/office/drawing/2010/main" w="9525">
+                <a14:hiddenLine xmlns:a14="http://schemas.microsoft.com/office/drawing/2010/main" xmlns:p14="http://schemas.microsoft.com/office/powerpoint/2010/main" xmlns:a16="http://schemas.microsoft.com/office/drawing/2014/main" xmlns="" w="9525">
                   <a:solidFill>
                     <a:srgbClr val="000000"/>
                   </a:solidFill>
@@ -14341,7 +14346,7 @@
             </a:ln>
             <a:extLst>
               <a:ext uri="{91240B29-F687-4f45-9708-019B960494DF}">
-                <a14:hiddenLine xmlns="" xmlns:a16="http://schemas.microsoft.com/office/drawing/2014/main" xmlns:p14="http://schemas.microsoft.com/office/powerpoint/2010/main" xmlns:a14="http://schemas.microsoft.com/office/drawing/2010/main" w="9525">
+                <a14:hiddenLine xmlns:a14="http://schemas.microsoft.com/office/drawing/2010/main" xmlns:p14="http://schemas.microsoft.com/office/powerpoint/2010/main" xmlns:a16="http://schemas.microsoft.com/office/drawing/2014/main" xmlns="" w="9525">
                   <a:solidFill>
                     <a:srgbClr val="000000"/>
                   </a:solidFill>
@@ -14425,7 +14430,7 @@
             </a:ln>
             <a:extLst>
               <a:ext uri="{91240B29-F687-4f45-9708-019B960494DF}">
-                <a14:hiddenLine xmlns="" xmlns:a16="http://schemas.microsoft.com/office/drawing/2014/main" xmlns:p14="http://schemas.microsoft.com/office/powerpoint/2010/main" xmlns:a14="http://schemas.microsoft.com/office/drawing/2010/main" w="9525">
+                <a14:hiddenLine xmlns:a14="http://schemas.microsoft.com/office/drawing/2010/main" xmlns:p14="http://schemas.microsoft.com/office/powerpoint/2010/main" xmlns:a16="http://schemas.microsoft.com/office/drawing/2014/main" xmlns="" w="9525">
                   <a:solidFill>
                     <a:srgbClr val="000000"/>
                   </a:solidFill>
@@ -14557,7 +14562,7 @@
             </a:ln>
             <a:extLst>
               <a:ext uri="{91240B29-F687-4f45-9708-019B960494DF}">
-                <a14:hiddenLine xmlns="" xmlns:a16="http://schemas.microsoft.com/office/drawing/2014/main" xmlns:p14="http://schemas.microsoft.com/office/powerpoint/2010/main" xmlns:a14="http://schemas.microsoft.com/office/drawing/2010/main" w="9525">
+                <a14:hiddenLine xmlns:a14="http://schemas.microsoft.com/office/drawing/2010/main" xmlns:p14="http://schemas.microsoft.com/office/powerpoint/2010/main" xmlns:a16="http://schemas.microsoft.com/office/drawing/2014/main" xmlns="" w="9525">
                   <a:solidFill>
                     <a:srgbClr val="000000"/>
                   </a:solidFill>
@@ -14685,7 +14690,7 @@
             </a:ln>
             <a:extLst>
               <a:ext uri="{91240B29-F687-4f45-9708-019B960494DF}">
-                <a14:hiddenLine xmlns="" xmlns:a16="http://schemas.microsoft.com/office/drawing/2014/main" xmlns:p14="http://schemas.microsoft.com/office/powerpoint/2010/main" xmlns:a14="http://schemas.microsoft.com/office/drawing/2010/main" w="9525">
+                <a14:hiddenLine xmlns:a14="http://schemas.microsoft.com/office/drawing/2010/main" xmlns:p14="http://schemas.microsoft.com/office/powerpoint/2010/main" xmlns:a16="http://schemas.microsoft.com/office/drawing/2014/main" xmlns="" w="9525">
                   <a:solidFill>
                     <a:srgbClr val="000000"/>
                   </a:solidFill>
@@ -14769,7 +14774,7 @@
             </a:ln>
             <a:extLst>
               <a:ext uri="{91240B29-F687-4f45-9708-019B960494DF}">
-                <a14:hiddenLine xmlns="" xmlns:a16="http://schemas.microsoft.com/office/drawing/2014/main" xmlns:p14="http://schemas.microsoft.com/office/powerpoint/2010/main" xmlns:a14="http://schemas.microsoft.com/office/drawing/2010/main" w="9525">
+                <a14:hiddenLine xmlns:a14="http://schemas.microsoft.com/office/drawing/2010/main" xmlns:p14="http://schemas.microsoft.com/office/powerpoint/2010/main" xmlns:a16="http://schemas.microsoft.com/office/drawing/2014/main" xmlns="" w="9525">
                   <a:solidFill>
                     <a:srgbClr val="000000"/>
                   </a:solidFill>
@@ -14853,7 +14858,7 @@
             </a:ln>
             <a:extLst>
               <a:ext uri="{91240B29-F687-4f45-9708-019B960494DF}">
-                <a14:hiddenLine xmlns="" xmlns:a16="http://schemas.microsoft.com/office/drawing/2014/main" xmlns:p14="http://schemas.microsoft.com/office/powerpoint/2010/main" xmlns:a14="http://schemas.microsoft.com/office/drawing/2010/main" w="9525">
+                <a14:hiddenLine xmlns:a14="http://schemas.microsoft.com/office/drawing/2010/main" xmlns:p14="http://schemas.microsoft.com/office/powerpoint/2010/main" xmlns:a16="http://schemas.microsoft.com/office/drawing/2014/main" xmlns="" w="9525">
                   <a:solidFill>
                     <a:srgbClr val="000000"/>
                   </a:solidFill>
@@ -14965,7 +14970,7 @@
             </a:ln>
             <a:extLst>
               <a:ext uri="{91240B29-F687-4f45-9708-019B960494DF}">
-                <a14:hiddenLine xmlns="" xmlns:a16="http://schemas.microsoft.com/office/drawing/2014/main" xmlns:p14="http://schemas.microsoft.com/office/powerpoint/2010/main" xmlns:a14="http://schemas.microsoft.com/office/drawing/2010/main" w="9525">
+                <a14:hiddenLine xmlns:a14="http://schemas.microsoft.com/office/drawing/2010/main" xmlns:p14="http://schemas.microsoft.com/office/powerpoint/2010/main" xmlns:a16="http://schemas.microsoft.com/office/drawing/2014/main" xmlns="" w="9525">
                   <a:solidFill>
                     <a:srgbClr val="000000"/>
                   </a:solidFill>
@@ -15021,7 +15026,7 @@
             </a:ln>
             <a:extLst>
               <a:ext uri="{91240B29-F687-4f45-9708-019B960494DF}">
-                <a14:hiddenLine xmlns="" xmlns:a16="http://schemas.microsoft.com/office/drawing/2014/main" xmlns:p14="http://schemas.microsoft.com/office/powerpoint/2010/main" xmlns:a14="http://schemas.microsoft.com/office/drawing/2010/main" w="9525">
+                <a14:hiddenLine xmlns:a14="http://schemas.microsoft.com/office/drawing/2010/main" xmlns:p14="http://schemas.microsoft.com/office/powerpoint/2010/main" xmlns:a16="http://schemas.microsoft.com/office/drawing/2014/main" xmlns="" w="9525">
                   <a:solidFill>
                     <a:srgbClr val="000000"/>
                   </a:solidFill>
@@ -15108,7 +15113,7 @@
             </a:ln>
             <a:extLst>
               <a:ext uri="{91240B29-F687-4f45-9708-019B960494DF}">
-                <a14:hiddenLine xmlns="" xmlns:a16="http://schemas.microsoft.com/office/drawing/2014/main" xmlns:p14="http://schemas.microsoft.com/office/powerpoint/2010/main" xmlns:a14="http://schemas.microsoft.com/office/drawing/2010/main" w="9525">
+                <a14:hiddenLine xmlns:a14="http://schemas.microsoft.com/office/drawing/2010/main" xmlns:p14="http://schemas.microsoft.com/office/powerpoint/2010/main" xmlns:a16="http://schemas.microsoft.com/office/drawing/2014/main" xmlns="" w="9525">
                   <a:solidFill>
                     <a:srgbClr val="000000"/>
                   </a:solidFill>
@@ -15220,7 +15225,7 @@
             </a:ln>
             <a:extLst>
               <a:ext uri="{91240B29-F687-4f45-9708-019B960494DF}">
-                <a14:hiddenLine xmlns="" xmlns:a16="http://schemas.microsoft.com/office/drawing/2014/main" xmlns:p14="http://schemas.microsoft.com/office/powerpoint/2010/main" xmlns:a14="http://schemas.microsoft.com/office/drawing/2010/main" w="9525">
+                <a14:hiddenLine xmlns:a14="http://schemas.microsoft.com/office/drawing/2010/main" xmlns:p14="http://schemas.microsoft.com/office/powerpoint/2010/main" xmlns:a16="http://schemas.microsoft.com/office/drawing/2014/main" xmlns="" w="9525">
                   <a:solidFill>
                     <a:srgbClr val="000000"/>
                   </a:solidFill>
@@ -15304,7 +15309,7 @@
             </a:ln>
             <a:extLst>
               <a:ext uri="{91240B29-F687-4f45-9708-019B960494DF}">
-                <a14:hiddenLine xmlns="" xmlns:a16="http://schemas.microsoft.com/office/drawing/2014/main" xmlns:p14="http://schemas.microsoft.com/office/powerpoint/2010/main" xmlns:a14="http://schemas.microsoft.com/office/drawing/2010/main" w="9525">
+                <a14:hiddenLine xmlns:a14="http://schemas.microsoft.com/office/drawing/2010/main" xmlns:p14="http://schemas.microsoft.com/office/powerpoint/2010/main" xmlns:a16="http://schemas.microsoft.com/office/drawing/2014/main" xmlns="" w="9525">
                   <a:solidFill>
                     <a:srgbClr val="000000"/>
                   </a:solidFill>
@@ -15416,7 +15421,7 @@
             </a:ln>
             <a:extLst>
               <a:ext uri="{91240B29-F687-4f45-9708-019B960494DF}">
-                <a14:hiddenLine xmlns="" xmlns:a16="http://schemas.microsoft.com/office/drawing/2014/main" xmlns:p14="http://schemas.microsoft.com/office/powerpoint/2010/main" xmlns:a14="http://schemas.microsoft.com/office/drawing/2010/main" w="9525">
+                <a14:hiddenLine xmlns:a14="http://schemas.microsoft.com/office/drawing/2010/main" xmlns:p14="http://schemas.microsoft.com/office/powerpoint/2010/main" xmlns:a16="http://schemas.microsoft.com/office/drawing/2014/main" xmlns="" w="9525">
                   <a:solidFill>
                     <a:srgbClr val="000000"/>
                   </a:solidFill>
@@ -15503,7 +15508,7 @@
             </a:ln>
             <a:extLst>
               <a:ext uri="{91240B29-F687-4f45-9708-019B960494DF}">
-                <a14:hiddenLine xmlns="" xmlns:a16="http://schemas.microsoft.com/office/drawing/2014/main" xmlns:p14="http://schemas.microsoft.com/office/powerpoint/2010/main" xmlns:a14="http://schemas.microsoft.com/office/drawing/2010/main" w="9525">
+                <a14:hiddenLine xmlns:a14="http://schemas.microsoft.com/office/drawing/2010/main" xmlns:p14="http://schemas.microsoft.com/office/powerpoint/2010/main" xmlns:a16="http://schemas.microsoft.com/office/drawing/2014/main" xmlns="" w="9525">
                   <a:solidFill>
                     <a:srgbClr val="000000"/>
                   </a:solidFill>
@@ -15587,7 +15592,7 @@
             </a:ln>
             <a:extLst>
               <a:ext uri="{91240B29-F687-4f45-9708-019B960494DF}">
-                <a14:hiddenLine xmlns="" xmlns:a16="http://schemas.microsoft.com/office/drawing/2014/main" xmlns:p14="http://schemas.microsoft.com/office/powerpoint/2010/main" xmlns:a14="http://schemas.microsoft.com/office/drawing/2010/main" w="9525">
+                <a14:hiddenLine xmlns:a14="http://schemas.microsoft.com/office/drawing/2010/main" xmlns:p14="http://schemas.microsoft.com/office/powerpoint/2010/main" xmlns:a16="http://schemas.microsoft.com/office/drawing/2014/main" xmlns="" w="9525">
                   <a:solidFill>
                     <a:srgbClr val="000000"/>
                   </a:solidFill>
@@ -15699,7 +15704,7 @@
             </a:ln>
             <a:extLst>
               <a:ext uri="{91240B29-F687-4f45-9708-019B960494DF}">
-                <a14:hiddenLine xmlns="" xmlns:a16="http://schemas.microsoft.com/office/drawing/2014/main" xmlns:p14="http://schemas.microsoft.com/office/powerpoint/2010/main" xmlns:a14="http://schemas.microsoft.com/office/drawing/2010/main" w="9525">
+                <a14:hiddenLine xmlns:a14="http://schemas.microsoft.com/office/drawing/2010/main" xmlns:p14="http://schemas.microsoft.com/office/powerpoint/2010/main" xmlns:a16="http://schemas.microsoft.com/office/drawing/2014/main" xmlns="" w="9525">
                   <a:solidFill>
                     <a:srgbClr val="000000"/>
                   </a:solidFill>
@@ -15811,7 +15816,7 @@
             </a:ln>
             <a:extLst>
               <a:ext uri="{91240B29-F687-4f45-9708-019B960494DF}">
-                <a14:hiddenLine xmlns="" xmlns:a16="http://schemas.microsoft.com/office/drawing/2014/main" xmlns:p14="http://schemas.microsoft.com/office/powerpoint/2010/main" xmlns:a14="http://schemas.microsoft.com/office/drawing/2010/main" w="9525">
+                <a14:hiddenLine xmlns:a14="http://schemas.microsoft.com/office/drawing/2010/main" xmlns:p14="http://schemas.microsoft.com/office/powerpoint/2010/main" xmlns:a16="http://schemas.microsoft.com/office/drawing/2014/main" xmlns="" w="9525">
                   <a:solidFill>
                     <a:srgbClr val="000000"/>
                   </a:solidFill>
@@ -15898,7 +15903,7 @@
             </a:ln>
             <a:extLst>
               <a:ext uri="{91240B29-F687-4f45-9708-019B960494DF}">
-                <a14:hiddenLine xmlns="" xmlns:a16="http://schemas.microsoft.com/office/drawing/2014/main" xmlns:p14="http://schemas.microsoft.com/office/powerpoint/2010/main" xmlns:a14="http://schemas.microsoft.com/office/drawing/2010/main" w="9525">
+                <a14:hiddenLine xmlns:a14="http://schemas.microsoft.com/office/drawing/2010/main" xmlns:p14="http://schemas.microsoft.com/office/powerpoint/2010/main" xmlns:a16="http://schemas.microsoft.com/office/drawing/2014/main" xmlns="" w="9525">
                   <a:solidFill>
                     <a:srgbClr val="000000"/>
                   </a:solidFill>
@@ -16040,7 +16045,7 @@
             </a:ln>
             <a:extLst>
               <a:ext uri="{91240B29-F687-4f45-9708-019B960494DF}">
-                <a14:hiddenLine xmlns="" xmlns:a16="http://schemas.microsoft.com/office/drawing/2014/main" xmlns:p14="http://schemas.microsoft.com/office/powerpoint/2010/main" xmlns:a14="http://schemas.microsoft.com/office/drawing/2010/main" w="9525">
+                <a14:hiddenLine xmlns:a14="http://schemas.microsoft.com/office/drawing/2010/main" xmlns:p14="http://schemas.microsoft.com/office/powerpoint/2010/main" xmlns:a16="http://schemas.microsoft.com/office/drawing/2014/main" xmlns="" w="9525">
                   <a:solidFill>
                     <a:srgbClr val="000000"/>
                   </a:solidFill>
@@ -16089,10 +16094,9 @@
           <a:lstStyle/>
           <a:p>
             <a:r>
-              <a:rPr lang="it-IT" dirty="0" err="1"/>
-              <a:t>enviorment</a:t>
-            </a:r>
-            <a:endParaRPr lang="it-IT" dirty="0"/>
+              <a:rPr lang="it-IT" dirty="0"/>
+              <a:t>enviROnment</a:t>
+            </a:r>
           </a:p>
         </p:txBody>
       </p:sp>
@@ -16746,7 +16750,7 @@
             </a:ln>
             <a:extLst>
               <a:ext uri="{91240B29-F687-4f45-9708-019B960494DF}">
-                <a14:hiddenLine xmlns="" xmlns:a16="http://schemas.microsoft.com/office/drawing/2014/main" xmlns:p14="http://schemas.microsoft.com/office/powerpoint/2010/main" xmlns:a14="http://schemas.microsoft.com/office/drawing/2010/main" w="9525">
+                <a14:hiddenLine xmlns:a14="http://schemas.microsoft.com/office/drawing/2010/main" xmlns:p14="http://schemas.microsoft.com/office/powerpoint/2010/main" xmlns:a16="http://schemas.microsoft.com/office/drawing/2014/main" xmlns="" w="9525">
                   <a:solidFill>
                     <a:srgbClr val="000000"/>
                   </a:solidFill>
@@ -16858,7 +16862,7 @@
             </a:ln>
             <a:extLst>
               <a:ext uri="{91240B29-F687-4f45-9708-019B960494DF}">
-                <a14:hiddenLine xmlns="" xmlns:a16="http://schemas.microsoft.com/office/drawing/2014/main" xmlns:p14="http://schemas.microsoft.com/office/powerpoint/2010/main" xmlns:a14="http://schemas.microsoft.com/office/drawing/2010/main" w="9525">
+                <a14:hiddenLine xmlns:a14="http://schemas.microsoft.com/office/drawing/2010/main" xmlns:p14="http://schemas.microsoft.com/office/powerpoint/2010/main" xmlns:a16="http://schemas.microsoft.com/office/drawing/2014/main" xmlns="" w="9525">
                   <a:solidFill>
                     <a:srgbClr val="000000"/>
                   </a:solidFill>
@@ -16970,7 +16974,7 @@
             </a:ln>
             <a:extLst>
               <a:ext uri="{91240B29-F687-4f45-9708-019B960494DF}">
-                <a14:hiddenLine xmlns="" xmlns:a16="http://schemas.microsoft.com/office/drawing/2014/main" xmlns:p14="http://schemas.microsoft.com/office/powerpoint/2010/main" xmlns:a14="http://schemas.microsoft.com/office/drawing/2010/main" w="9525">
+                <a14:hiddenLine xmlns:a14="http://schemas.microsoft.com/office/drawing/2010/main" xmlns:p14="http://schemas.microsoft.com/office/powerpoint/2010/main" xmlns:a16="http://schemas.microsoft.com/office/drawing/2014/main" xmlns="" w="9525">
                   <a:solidFill>
                     <a:srgbClr val="000000"/>
                   </a:solidFill>
@@ -17054,7 +17058,7 @@
             </a:ln>
             <a:extLst>
               <a:ext uri="{91240B29-F687-4f45-9708-019B960494DF}">
-                <a14:hiddenLine xmlns="" xmlns:a16="http://schemas.microsoft.com/office/drawing/2014/main" xmlns:p14="http://schemas.microsoft.com/office/powerpoint/2010/main" xmlns:a14="http://schemas.microsoft.com/office/drawing/2010/main" w="9525">
+                <a14:hiddenLine xmlns:a14="http://schemas.microsoft.com/office/drawing/2010/main" xmlns:p14="http://schemas.microsoft.com/office/powerpoint/2010/main" xmlns:a16="http://schemas.microsoft.com/office/drawing/2014/main" xmlns="" w="9525">
                   <a:solidFill>
                     <a:srgbClr val="000000"/>
                   </a:solidFill>
@@ -17166,7 +17170,7 @@
             </a:ln>
             <a:extLst>
               <a:ext uri="{91240B29-F687-4f45-9708-019B960494DF}">
-                <a14:hiddenLine xmlns="" xmlns:a16="http://schemas.microsoft.com/office/drawing/2014/main" xmlns:p14="http://schemas.microsoft.com/office/powerpoint/2010/main" xmlns:a14="http://schemas.microsoft.com/office/drawing/2010/main" w="9525">
+                <a14:hiddenLine xmlns:a14="http://schemas.microsoft.com/office/drawing/2010/main" xmlns:p14="http://schemas.microsoft.com/office/powerpoint/2010/main" xmlns:a16="http://schemas.microsoft.com/office/drawing/2014/main" xmlns="" w="9525">
                   <a:solidFill>
                     <a:srgbClr val="000000"/>
                   </a:solidFill>
@@ -17250,7 +17254,7 @@
             </a:ln>
             <a:extLst>
               <a:ext uri="{91240B29-F687-4f45-9708-019B960494DF}">
-                <a14:hiddenLine xmlns="" xmlns:a16="http://schemas.microsoft.com/office/drawing/2014/main" xmlns:p14="http://schemas.microsoft.com/office/powerpoint/2010/main" xmlns:a14="http://schemas.microsoft.com/office/drawing/2010/main" w="9525">
+                <a14:hiddenLine xmlns:a14="http://schemas.microsoft.com/office/drawing/2010/main" xmlns:p14="http://schemas.microsoft.com/office/powerpoint/2010/main" xmlns:a16="http://schemas.microsoft.com/office/drawing/2014/main" xmlns="" w="9525">
                   <a:solidFill>
                     <a:srgbClr val="000000"/>
                   </a:solidFill>
@@ -17334,7 +17338,7 @@
             </a:ln>
             <a:extLst>
               <a:ext uri="{91240B29-F687-4f45-9708-019B960494DF}">
-                <a14:hiddenLine xmlns="" xmlns:a16="http://schemas.microsoft.com/office/drawing/2014/main" xmlns:p14="http://schemas.microsoft.com/office/powerpoint/2010/main" xmlns:a14="http://schemas.microsoft.com/office/drawing/2010/main" w="9525">
+                <a14:hiddenLine xmlns:a14="http://schemas.microsoft.com/office/drawing/2010/main" xmlns:p14="http://schemas.microsoft.com/office/powerpoint/2010/main" xmlns:a16="http://schemas.microsoft.com/office/drawing/2014/main" xmlns="" w="9525">
                   <a:solidFill>
                     <a:srgbClr val="000000"/>
                   </a:solidFill>
@@ -17446,7 +17450,7 @@
             </a:ln>
             <a:extLst>
               <a:ext uri="{91240B29-F687-4f45-9708-019B960494DF}">
-                <a14:hiddenLine xmlns="" xmlns:a16="http://schemas.microsoft.com/office/drawing/2014/main" xmlns:p14="http://schemas.microsoft.com/office/powerpoint/2010/main" xmlns:a14="http://schemas.microsoft.com/office/drawing/2010/main" w="9525">
+                <a14:hiddenLine xmlns:a14="http://schemas.microsoft.com/office/drawing/2010/main" xmlns:p14="http://schemas.microsoft.com/office/powerpoint/2010/main" xmlns:a16="http://schemas.microsoft.com/office/drawing/2014/main" xmlns="" w="9525">
                   <a:solidFill>
                     <a:srgbClr val="000000"/>
                   </a:solidFill>
@@ -17558,7 +17562,7 @@
             </a:ln>
             <a:extLst>
               <a:ext uri="{91240B29-F687-4f45-9708-019B960494DF}">
-                <a14:hiddenLine xmlns="" xmlns:a16="http://schemas.microsoft.com/office/drawing/2014/main" xmlns:p14="http://schemas.microsoft.com/office/powerpoint/2010/main" xmlns:a14="http://schemas.microsoft.com/office/drawing/2010/main" w="9525">
+                <a14:hiddenLine xmlns:a14="http://schemas.microsoft.com/office/drawing/2010/main" xmlns:p14="http://schemas.microsoft.com/office/powerpoint/2010/main" xmlns:a16="http://schemas.microsoft.com/office/drawing/2014/main" xmlns="" w="9525">
                   <a:solidFill>
                     <a:srgbClr val="000000"/>
                   </a:solidFill>
@@ -17642,7 +17646,7 @@
             </a:ln>
             <a:extLst>
               <a:ext uri="{91240B29-F687-4f45-9708-019B960494DF}">
-                <a14:hiddenLine xmlns="" xmlns:a16="http://schemas.microsoft.com/office/drawing/2014/main" xmlns:p14="http://schemas.microsoft.com/office/powerpoint/2010/main" xmlns:a14="http://schemas.microsoft.com/office/drawing/2010/main" w="9525">
+                <a14:hiddenLine xmlns:a14="http://schemas.microsoft.com/office/drawing/2010/main" xmlns:p14="http://schemas.microsoft.com/office/powerpoint/2010/main" xmlns:a16="http://schemas.microsoft.com/office/drawing/2014/main" xmlns="" w="9525">
                   <a:solidFill>
                     <a:srgbClr val="000000"/>
                   </a:solidFill>
@@ -17774,7 +17778,7 @@
             </a:ln>
             <a:extLst>
               <a:ext uri="{91240B29-F687-4f45-9708-019B960494DF}">
-                <a14:hiddenLine xmlns="" xmlns:a16="http://schemas.microsoft.com/office/drawing/2014/main" xmlns:p14="http://schemas.microsoft.com/office/powerpoint/2010/main" xmlns:a14="http://schemas.microsoft.com/office/drawing/2010/main" w="9525">
+                <a14:hiddenLine xmlns:a14="http://schemas.microsoft.com/office/drawing/2010/main" xmlns:p14="http://schemas.microsoft.com/office/powerpoint/2010/main" xmlns:a16="http://schemas.microsoft.com/office/drawing/2014/main" xmlns="" w="9525">
                   <a:solidFill>
                     <a:srgbClr val="000000"/>
                   </a:solidFill>
@@ -17902,7 +17906,7 @@
             </a:ln>
             <a:extLst>
               <a:ext uri="{91240B29-F687-4f45-9708-019B960494DF}">
-                <a14:hiddenLine xmlns="" xmlns:a16="http://schemas.microsoft.com/office/drawing/2014/main" xmlns:p14="http://schemas.microsoft.com/office/powerpoint/2010/main" xmlns:a14="http://schemas.microsoft.com/office/drawing/2010/main" w="9525">
+                <a14:hiddenLine xmlns:a14="http://schemas.microsoft.com/office/drawing/2010/main" xmlns:p14="http://schemas.microsoft.com/office/powerpoint/2010/main" xmlns:a16="http://schemas.microsoft.com/office/drawing/2014/main" xmlns="" w="9525">
                   <a:solidFill>
                     <a:srgbClr val="000000"/>
                   </a:solidFill>
@@ -17986,7 +17990,7 @@
             </a:ln>
             <a:extLst>
               <a:ext uri="{91240B29-F687-4f45-9708-019B960494DF}">
-                <a14:hiddenLine xmlns="" xmlns:a16="http://schemas.microsoft.com/office/drawing/2014/main" xmlns:p14="http://schemas.microsoft.com/office/powerpoint/2010/main" xmlns:a14="http://schemas.microsoft.com/office/drawing/2010/main" w="9525">
+                <a14:hiddenLine xmlns:a14="http://schemas.microsoft.com/office/drawing/2010/main" xmlns:p14="http://schemas.microsoft.com/office/powerpoint/2010/main" xmlns:a16="http://schemas.microsoft.com/office/drawing/2014/main" xmlns="" w="9525">
                   <a:solidFill>
                     <a:srgbClr val="000000"/>
                   </a:solidFill>
@@ -18070,7 +18074,7 @@
             </a:ln>
             <a:extLst>
               <a:ext uri="{91240B29-F687-4f45-9708-019B960494DF}">
-                <a14:hiddenLine xmlns="" xmlns:a16="http://schemas.microsoft.com/office/drawing/2014/main" xmlns:p14="http://schemas.microsoft.com/office/powerpoint/2010/main" xmlns:a14="http://schemas.microsoft.com/office/drawing/2010/main" w="9525">
+                <a14:hiddenLine xmlns:a14="http://schemas.microsoft.com/office/drawing/2010/main" xmlns:p14="http://schemas.microsoft.com/office/powerpoint/2010/main" xmlns:a16="http://schemas.microsoft.com/office/drawing/2014/main" xmlns="" w="9525">
                   <a:solidFill>
                     <a:srgbClr val="000000"/>
                   </a:solidFill>
@@ -18182,7 +18186,7 @@
             </a:ln>
             <a:extLst>
               <a:ext uri="{91240B29-F687-4f45-9708-019B960494DF}">
-                <a14:hiddenLine xmlns="" xmlns:a16="http://schemas.microsoft.com/office/drawing/2014/main" xmlns:p14="http://schemas.microsoft.com/office/powerpoint/2010/main" xmlns:a14="http://schemas.microsoft.com/office/drawing/2010/main" w="9525">
+                <a14:hiddenLine xmlns:a14="http://schemas.microsoft.com/office/drawing/2010/main" xmlns:p14="http://schemas.microsoft.com/office/powerpoint/2010/main" xmlns:a16="http://schemas.microsoft.com/office/drawing/2014/main" xmlns="" w="9525">
                   <a:solidFill>
                     <a:srgbClr val="000000"/>
                   </a:solidFill>
@@ -18238,7 +18242,7 @@
             </a:ln>
             <a:extLst>
               <a:ext uri="{91240B29-F687-4f45-9708-019B960494DF}">
-                <a14:hiddenLine xmlns="" xmlns:a16="http://schemas.microsoft.com/office/drawing/2014/main" xmlns:p14="http://schemas.microsoft.com/office/powerpoint/2010/main" xmlns:a14="http://schemas.microsoft.com/office/drawing/2010/main" w="9525">
+                <a14:hiddenLine xmlns:a14="http://schemas.microsoft.com/office/drawing/2010/main" xmlns:p14="http://schemas.microsoft.com/office/powerpoint/2010/main" xmlns:a16="http://schemas.microsoft.com/office/drawing/2014/main" xmlns="" w="9525">
                   <a:solidFill>
                     <a:srgbClr val="000000"/>
                   </a:solidFill>
@@ -18325,7 +18329,7 @@
             </a:ln>
             <a:extLst>
               <a:ext uri="{91240B29-F687-4f45-9708-019B960494DF}">
-                <a14:hiddenLine xmlns="" xmlns:a16="http://schemas.microsoft.com/office/drawing/2014/main" xmlns:p14="http://schemas.microsoft.com/office/powerpoint/2010/main" xmlns:a14="http://schemas.microsoft.com/office/drawing/2010/main" w="9525">
+                <a14:hiddenLine xmlns:a14="http://schemas.microsoft.com/office/drawing/2010/main" xmlns:p14="http://schemas.microsoft.com/office/powerpoint/2010/main" xmlns:a16="http://schemas.microsoft.com/office/drawing/2014/main" xmlns="" w="9525">
                   <a:solidFill>
                     <a:srgbClr val="000000"/>
                   </a:solidFill>
@@ -18437,7 +18441,7 @@
             </a:ln>
             <a:extLst>
               <a:ext uri="{91240B29-F687-4f45-9708-019B960494DF}">
-                <a14:hiddenLine xmlns="" xmlns:a16="http://schemas.microsoft.com/office/drawing/2014/main" xmlns:p14="http://schemas.microsoft.com/office/powerpoint/2010/main" xmlns:a14="http://schemas.microsoft.com/office/drawing/2010/main" w="9525">
+                <a14:hiddenLine xmlns:a14="http://schemas.microsoft.com/office/drawing/2010/main" xmlns:p14="http://schemas.microsoft.com/office/powerpoint/2010/main" xmlns:a16="http://schemas.microsoft.com/office/drawing/2014/main" xmlns="" w="9525">
                   <a:solidFill>
                     <a:srgbClr val="000000"/>
                   </a:solidFill>
@@ -18521,7 +18525,7 @@
             </a:ln>
             <a:extLst>
               <a:ext uri="{91240B29-F687-4f45-9708-019B960494DF}">
-                <a14:hiddenLine xmlns="" xmlns:a16="http://schemas.microsoft.com/office/drawing/2014/main" xmlns:p14="http://schemas.microsoft.com/office/powerpoint/2010/main" xmlns:a14="http://schemas.microsoft.com/office/drawing/2010/main" w="9525">
+                <a14:hiddenLine xmlns:a14="http://schemas.microsoft.com/office/drawing/2010/main" xmlns:p14="http://schemas.microsoft.com/office/powerpoint/2010/main" xmlns:a16="http://schemas.microsoft.com/office/drawing/2014/main" xmlns="" w="9525">
                   <a:solidFill>
                     <a:srgbClr val="000000"/>
                   </a:solidFill>
@@ -18633,7 +18637,7 @@
             </a:ln>
             <a:extLst>
               <a:ext uri="{91240B29-F687-4f45-9708-019B960494DF}">
-                <a14:hiddenLine xmlns="" xmlns:a16="http://schemas.microsoft.com/office/drawing/2014/main" xmlns:p14="http://schemas.microsoft.com/office/powerpoint/2010/main" xmlns:a14="http://schemas.microsoft.com/office/drawing/2010/main" w="9525">
+                <a14:hiddenLine xmlns:a14="http://schemas.microsoft.com/office/drawing/2010/main" xmlns:p14="http://schemas.microsoft.com/office/powerpoint/2010/main" xmlns:a16="http://schemas.microsoft.com/office/drawing/2014/main" xmlns="" w="9525">
                   <a:solidFill>
                     <a:srgbClr val="000000"/>
                   </a:solidFill>
@@ -18720,7 +18724,7 @@
             </a:ln>
             <a:extLst>
               <a:ext uri="{91240B29-F687-4f45-9708-019B960494DF}">
-                <a14:hiddenLine xmlns="" xmlns:a16="http://schemas.microsoft.com/office/drawing/2014/main" xmlns:p14="http://schemas.microsoft.com/office/powerpoint/2010/main" xmlns:a14="http://schemas.microsoft.com/office/drawing/2010/main" w="9525">
+                <a14:hiddenLine xmlns:a14="http://schemas.microsoft.com/office/drawing/2010/main" xmlns:p14="http://schemas.microsoft.com/office/powerpoint/2010/main" xmlns:a16="http://schemas.microsoft.com/office/drawing/2014/main" xmlns="" w="9525">
                   <a:solidFill>
                     <a:srgbClr val="000000"/>
                   </a:solidFill>
@@ -18804,7 +18808,7 @@
             </a:ln>
             <a:extLst>
               <a:ext uri="{91240B29-F687-4f45-9708-019B960494DF}">
-                <a14:hiddenLine xmlns="" xmlns:a16="http://schemas.microsoft.com/office/drawing/2014/main" xmlns:p14="http://schemas.microsoft.com/office/powerpoint/2010/main" xmlns:a14="http://schemas.microsoft.com/office/drawing/2010/main" w="9525">
+                <a14:hiddenLine xmlns:a14="http://schemas.microsoft.com/office/drawing/2010/main" xmlns:p14="http://schemas.microsoft.com/office/powerpoint/2010/main" xmlns:a16="http://schemas.microsoft.com/office/drawing/2014/main" xmlns="" w="9525">
                   <a:solidFill>
                     <a:srgbClr val="000000"/>
                   </a:solidFill>
@@ -18916,7 +18920,7 @@
             </a:ln>
             <a:extLst>
               <a:ext uri="{91240B29-F687-4f45-9708-019B960494DF}">
-                <a14:hiddenLine xmlns="" xmlns:a16="http://schemas.microsoft.com/office/drawing/2014/main" xmlns:p14="http://schemas.microsoft.com/office/powerpoint/2010/main" xmlns:a14="http://schemas.microsoft.com/office/drawing/2010/main" w="9525">
+                <a14:hiddenLine xmlns:a14="http://schemas.microsoft.com/office/drawing/2010/main" xmlns:p14="http://schemas.microsoft.com/office/powerpoint/2010/main" xmlns:a16="http://schemas.microsoft.com/office/drawing/2014/main" xmlns="" w="9525">
                   <a:solidFill>
                     <a:srgbClr val="000000"/>
                   </a:solidFill>
@@ -19028,7 +19032,7 @@
             </a:ln>
             <a:extLst>
               <a:ext uri="{91240B29-F687-4f45-9708-019B960494DF}">
-                <a14:hiddenLine xmlns="" xmlns:a16="http://schemas.microsoft.com/office/drawing/2014/main" xmlns:p14="http://schemas.microsoft.com/office/powerpoint/2010/main" xmlns:a14="http://schemas.microsoft.com/office/drawing/2010/main" w="9525">
+                <a14:hiddenLine xmlns:a14="http://schemas.microsoft.com/office/drawing/2010/main" xmlns:p14="http://schemas.microsoft.com/office/powerpoint/2010/main" xmlns:a16="http://schemas.microsoft.com/office/drawing/2014/main" xmlns="" w="9525">
                   <a:solidFill>
                     <a:srgbClr val="000000"/>
                   </a:solidFill>
@@ -19115,7 +19119,7 @@
             </a:ln>
             <a:extLst>
               <a:ext uri="{91240B29-F687-4f45-9708-019B960494DF}">
-                <a14:hiddenLine xmlns="" xmlns:a16="http://schemas.microsoft.com/office/drawing/2014/main" xmlns:p14="http://schemas.microsoft.com/office/powerpoint/2010/main" xmlns:a14="http://schemas.microsoft.com/office/drawing/2010/main" w="9525">
+                <a14:hiddenLine xmlns:a14="http://schemas.microsoft.com/office/drawing/2010/main" xmlns:p14="http://schemas.microsoft.com/office/powerpoint/2010/main" xmlns:a16="http://schemas.microsoft.com/office/drawing/2014/main" xmlns="" w="9525">
                   <a:solidFill>
                     <a:srgbClr val="000000"/>
                   </a:solidFill>
@@ -19257,7 +19261,7 @@
             </a:ln>
             <a:extLst>
               <a:ext uri="{91240B29-F687-4f45-9708-019B960494DF}">
-                <a14:hiddenLine xmlns="" xmlns:a16="http://schemas.microsoft.com/office/drawing/2014/main" xmlns:p14="http://schemas.microsoft.com/office/powerpoint/2010/main" xmlns:a14="http://schemas.microsoft.com/office/drawing/2010/main" w="9525">
+                <a14:hiddenLine xmlns:a14="http://schemas.microsoft.com/office/drawing/2010/main" xmlns:p14="http://schemas.microsoft.com/office/powerpoint/2010/main" xmlns:a16="http://schemas.microsoft.com/office/drawing/2014/main" xmlns="" w="9525">
                   <a:solidFill>
                     <a:srgbClr val="000000"/>
                   </a:solidFill>
@@ -19993,7 +19997,7 @@
             </a:ln>
             <a:extLst>
               <a:ext uri="{91240B29-F687-4f45-9708-019B960494DF}">
-                <a14:hiddenLine xmlns="" xmlns:a16="http://schemas.microsoft.com/office/drawing/2014/main" xmlns:p14="http://schemas.microsoft.com/office/powerpoint/2010/main" xmlns:a14="http://schemas.microsoft.com/office/drawing/2010/main" w="9525">
+                <a14:hiddenLine xmlns:a14="http://schemas.microsoft.com/office/drawing/2010/main" xmlns:p14="http://schemas.microsoft.com/office/powerpoint/2010/main" xmlns:a16="http://schemas.microsoft.com/office/drawing/2014/main" xmlns="" w="9525">
                   <a:solidFill>
                     <a:srgbClr val="000000"/>
                   </a:solidFill>
@@ -20105,7 +20109,7 @@
             </a:ln>
             <a:extLst>
               <a:ext uri="{91240B29-F687-4f45-9708-019B960494DF}">
-                <a14:hiddenLine xmlns="" xmlns:a16="http://schemas.microsoft.com/office/drawing/2014/main" xmlns:p14="http://schemas.microsoft.com/office/powerpoint/2010/main" xmlns:a14="http://schemas.microsoft.com/office/drawing/2010/main" w="9525">
+                <a14:hiddenLine xmlns:a14="http://schemas.microsoft.com/office/drawing/2010/main" xmlns:p14="http://schemas.microsoft.com/office/powerpoint/2010/main" xmlns:a16="http://schemas.microsoft.com/office/drawing/2014/main" xmlns="" w="9525">
                   <a:solidFill>
                     <a:srgbClr val="000000"/>
                   </a:solidFill>
@@ -20217,7 +20221,7 @@
             </a:ln>
             <a:extLst>
               <a:ext uri="{91240B29-F687-4f45-9708-019B960494DF}">
-                <a14:hiddenLine xmlns="" xmlns:a16="http://schemas.microsoft.com/office/drawing/2014/main" xmlns:p14="http://schemas.microsoft.com/office/powerpoint/2010/main" xmlns:a14="http://schemas.microsoft.com/office/drawing/2010/main" w="9525">
+                <a14:hiddenLine xmlns:a14="http://schemas.microsoft.com/office/drawing/2010/main" xmlns:p14="http://schemas.microsoft.com/office/powerpoint/2010/main" xmlns:a16="http://schemas.microsoft.com/office/drawing/2014/main" xmlns="" w="9525">
                   <a:solidFill>
                     <a:srgbClr val="000000"/>
                   </a:solidFill>
@@ -20301,7 +20305,7 @@
             </a:ln>
             <a:extLst>
               <a:ext uri="{91240B29-F687-4f45-9708-019B960494DF}">
-                <a14:hiddenLine xmlns="" xmlns:a16="http://schemas.microsoft.com/office/drawing/2014/main" xmlns:p14="http://schemas.microsoft.com/office/powerpoint/2010/main" xmlns:a14="http://schemas.microsoft.com/office/drawing/2010/main" w="9525">
+                <a14:hiddenLine xmlns:a14="http://schemas.microsoft.com/office/drawing/2010/main" xmlns:p14="http://schemas.microsoft.com/office/powerpoint/2010/main" xmlns:a16="http://schemas.microsoft.com/office/drawing/2014/main" xmlns="" w="9525">
                   <a:solidFill>
                     <a:srgbClr val="000000"/>
                   </a:solidFill>
@@ -20413,7 +20417,7 @@
             </a:ln>
             <a:extLst>
               <a:ext uri="{91240B29-F687-4f45-9708-019B960494DF}">
-                <a14:hiddenLine xmlns="" xmlns:a16="http://schemas.microsoft.com/office/drawing/2014/main" xmlns:p14="http://schemas.microsoft.com/office/powerpoint/2010/main" xmlns:a14="http://schemas.microsoft.com/office/drawing/2010/main" w="9525">
+                <a14:hiddenLine xmlns:a14="http://schemas.microsoft.com/office/drawing/2010/main" xmlns:p14="http://schemas.microsoft.com/office/powerpoint/2010/main" xmlns:a16="http://schemas.microsoft.com/office/drawing/2014/main" xmlns="" w="9525">
                   <a:solidFill>
                     <a:srgbClr val="000000"/>
                   </a:solidFill>
@@ -20497,7 +20501,7 @@
             </a:ln>
             <a:extLst>
               <a:ext uri="{91240B29-F687-4f45-9708-019B960494DF}">
-                <a14:hiddenLine xmlns="" xmlns:a16="http://schemas.microsoft.com/office/drawing/2014/main" xmlns:p14="http://schemas.microsoft.com/office/powerpoint/2010/main" xmlns:a14="http://schemas.microsoft.com/office/drawing/2010/main" w="9525">
+                <a14:hiddenLine xmlns:a14="http://schemas.microsoft.com/office/drawing/2010/main" xmlns:p14="http://schemas.microsoft.com/office/powerpoint/2010/main" xmlns:a16="http://schemas.microsoft.com/office/drawing/2014/main" xmlns="" w="9525">
                   <a:solidFill>
                     <a:srgbClr val="000000"/>
                   </a:solidFill>
@@ -20581,7 +20585,7 @@
             </a:ln>
             <a:extLst>
               <a:ext uri="{91240B29-F687-4f45-9708-019B960494DF}">
-                <a14:hiddenLine xmlns="" xmlns:a16="http://schemas.microsoft.com/office/drawing/2014/main" xmlns:p14="http://schemas.microsoft.com/office/powerpoint/2010/main" xmlns:a14="http://schemas.microsoft.com/office/drawing/2010/main" w="9525">
+                <a14:hiddenLine xmlns:a14="http://schemas.microsoft.com/office/drawing/2010/main" xmlns:p14="http://schemas.microsoft.com/office/powerpoint/2010/main" xmlns:a16="http://schemas.microsoft.com/office/drawing/2014/main" xmlns="" w="9525">
                   <a:solidFill>
                     <a:srgbClr val="000000"/>
                   </a:solidFill>
@@ -20693,7 +20697,7 @@
             </a:ln>
             <a:extLst>
               <a:ext uri="{91240B29-F687-4f45-9708-019B960494DF}">
-                <a14:hiddenLine xmlns="" xmlns:a16="http://schemas.microsoft.com/office/drawing/2014/main" xmlns:p14="http://schemas.microsoft.com/office/powerpoint/2010/main" xmlns:a14="http://schemas.microsoft.com/office/drawing/2010/main" w="9525">
+                <a14:hiddenLine xmlns:a14="http://schemas.microsoft.com/office/drawing/2010/main" xmlns:p14="http://schemas.microsoft.com/office/powerpoint/2010/main" xmlns:a16="http://schemas.microsoft.com/office/drawing/2014/main" xmlns="" w="9525">
                   <a:solidFill>
                     <a:srgbClr val="000000"/>
                   </a:solidFill>
@@ -20805,7 +20809,7 @@
             </a:ln>
             <a:extLst>
               <a:ext uri="{91240B29-F687-4f45-9708-019B960494DF}">
-                <a14:hiddenLine xmlns="" xmlns:a16="http://schemas.microsoft.com/office/drawing/2014/main" xmlns:p14="http://schemas.microsoft.com/office/powerpoint/2010/main" xmlns:a14="http://schemas.microsoft.com/office/drawing/2010/main" w="9525">
+                <a14:hiddenLine xmlns:a14="http://schemas.microsoft.com/office/drawing/2010/main" xmlns:p14="http://schemas.microsoft.com/office/powerpoint/2010/main" xmlns:a16="http://schemas.microsoft.com/office/drawing/2014/main" xmlns="" w="9525">
                   <a:solidFill>
                     <a:srgbClr val="000000"/>
                   </a:solidFill>
@@ -20889,7 +20893,7 @@
             </a:ln>
             <a:extLst>
               <a:ext uri="{91240B29-F687-4f45-9708-019B960494DF}">
-                <a14:hiddenLine xmlns="" xmlns:a16="http://schemas.microsoft.com/office/drawing/2014/main" xmlns:p14="http://schemas.microsoft.com/office/powerpoint/2010/main" xmlns:a14="http://schemas.microsoft.com/office/drawing/2010/main" w="9525">
+                <a14:hiddenLine xmlns:a14="http://schemas.microsoft.com/office/drawing/2010/main" xmlns:p14="http://schemas.microsoft.com/office/powerpoint/2010/main" xmlns:a16="http://schemas.microsoft.com/office/drawing/2014/main" xmlns="" w="9525">
                   <a:solidFill>
                     <a:srgbClr val="000000"/>
                   </a:solidFill>
@@ -21021,7 +21025,7 @@
             </a:ln>
             <a:extLst>
               <a:ext uri="{91240B29-F687-4f45-9708-019B960494DF}">
-                <a14:hiddenLine xmlns="" xmlns:a16="http://schemas.microsoft.com/office/drawing/2014/main" xmlns:p14="http://schemas.microsoft.com/office/powerpoint/2010/main" xmlns:a14="http://schemas.microsoft.com/office/drawing/2010/main" w="9525">
+                <a14:hiddenLine xmlns:a14="http://schemas.microsoft.com/office/drawing/2010/main" xmlns:p14="http://schemas.microsoft.com/office/powerpoint/2010/main" xmlns:a16="http://schemas.microsoft.com/office/drawing/2014/main" xmlns="" w="9525">
                   <a:solidFill>
                     <a:srgbClr val="000000"/>
                   </a:solidFill>
@@ -21149,7 +21153,7 @@
             </a:ln>
             <a:extLst>
               <a:ext uri="{91240B29-F687-4f45-9708-019B960494DF}">
-                <a14:hiddenLine xmlns="" xmlns:a16="http://schemas.microsoft.com/office/drawing/2014/main" xmlns:p14="http://schemas.microsoft.com/office/powerpoint/2010/main" xmlns:a14="http://schemas.microsoft.com/office/drawing/2010/main" w="9525">
+                <a14:hiddenLine xmlns:a14="http://schemas.microsoft.com/office/drawing/2010/main" xmlns:p14="http://schemas.microsoft.com/office/powerpoint/2010/main" xmlns:a16="http://schemas.microsoft.com/office/drawing/2014/main" xmlns="" w="9525">
                   <a:solidFill>
                     <a:srgbClr val="000000"/>
                   </a:solidFill>
@@ -21233,7 +21237,7 @@
             </a:ln>
             <a:extLst>
               <a:ext uri="{91240B29-F687-4f45-9708-019B960494DF}">
-                <a14:hiddenLine xmlns="" xmlns:a16="http://schemas.microsoft.com/office/drawing/2014/main" xmlns:p14="http://schemas.microsoft.com/office/powerpoint/2010/main" xmlns:a14="http://schemas.microsoft.com/office/drawing/2010/main" w="9525">
+                <a14:hiddenLine xmlns:a14="http://schemas.microsoft.com/office/drawing/2010/main" xmlns:p14="http://schemas.microsoft.com/office/powerpoint/2010/main" xmlns:a16="http://schemas.microsoft.com/office/drawing/2014/main" xmlns="" w="9525">
                   <a:solidFill>
                     <a:srgbClr val="000000"/>
                   </a:solidFill>
@@ -21317,7 +21321,7 @@
             </a:ln>
             <a:extLst>
               <a:ext uri="{91240B29-F687-4f45-9708-019B960494DF}">
-                <a14:hiddenLine xmlns="" xmlns:a16="http://schemas.microsoft.com/office/drawing/2014/main" xmlns:p14="http://schemas.microsoft.com/office/powerpoint/2010/main" xmlns:a14="http://schemas.microsoft.com/office/drawing/2010/main" w="9525">
+                <a14:hiddenLine xmlns:a14="http://schemas.microsoft.com/office/drawing/2010/main" xmlns:p14="http://schemas.microsoft.com/office/powerpoint/2010/main" xmlns:a16="http://schemas.microsoft.com/office/drawing/2014/main" xmlns="" w="9525">
                   <a:solidFill>
                     <a:srgbClr val="000000"/>
                   </a:solidFill>
@@ -21429,7 +21433,7 @@
             </a:ln>
             <a:extLst>
               <a:ext uri="{91240B29-F687-4f45-9708-019B960494DF}">
-                <a14:hiddenLine xmlns="" xmlns:a16="http://schemas.microsoft.com/office/drawing/2014/main" xmlns:p14="http://schemas.microsoft.com/office/powerpoint/2010/main" xmlns:a14="http://schemas.microsoft.com/office/drawing/2010/main" w="9525">
+                <a14:hiddenLine xmlns:a14="http://schemas.microsoft.com/office/drawing/2010/main" xmlns:p14="http://schemas.microsoft.com/office/powerpoint/2010/main" xmlns:a16="http://schemas.microsoft.com/office/drawing/2014/main" xmlns="" w="9525">
                   <a:solidFill>
                     <a:srgbClr val="000000"/>
                   </a:solidFill>
@@ -21485,7 +21489,7 @@
             </a:ln>
             <a:extLst>
               <a:ext uri="{91240B29-F687-4f45-9708-019B960494DF}">
-                <a14:hiddenLine xmlns="" xmlns:a16="http://schemas.microsoft.com/office/drawing/2014/main" xmlns:p14="http://schemas.microsoft.com/office/powerpoint/2010/main" xmlns:a14="http://schemas.microsoft.com/office/drawing/2010/main" w="9525">
+                <a14:hiddenLine xmlns:a14="http://schemas.microsoft.com/office/drawing/2010/main" xmlns:p14="http://schemas.microsoft.com/office/powerpoint/2010/main" xmlns:a16="http://schemas.microsoft.com/office/drawing/2014/main" xmlns="" w="9525">
                   <a:solidFill>
                     <a:srgbClr val="000000"/>
                   </a:solidFill>
@@ -21572,7 +21576,7 @@
             </a:ln>
             <a:extLst>
               <a:ext uri="{91240B29-F687-4f45-9708-019B960494DF}">
-                <a14:hiddenLine xmlns="" xmlns:a16="http://schemas.microsoft.com/office/drawing/2014/main" xmlns:p14="http://schemas.microsoft.com/office/powerpoint/2010/main" xmlns:a14="http://schemas.microsoft.com/office/drawing/2010/main" w="9525">
+                <a14:hiddenLine xmlns:a14="http://schemas.microsoft.com/office/drawing/2010/main" xmlns:p14="http://schemas.microsoft.com/office/powerpoint/2010/main" xmlns:a16="http://schemas.microsoft.com/office/drawing/2014/main" xmlns="" w="9525">
                   <a:solidFill>
                     <a:srgbClr val="000000"/>
                   </a:solidFill>
@@ -21684,7 +21688,7 @@
             </a:ln>
             <a:extLst>
               <a:ext uri="{91240B29-F687-4f45-9708-019B960494DF}">
-                <a14:hiddenLine xmlns="" xmlns:a16="http://schemas.microsoft.com/office/drawing/2014/main" xmlns:p14="http://schemas.microsoft.com/office/powerpoint/2010/main" xmlns:a14="http://schemas.microsoft.com/office/drawing/2010/main" w="9525">
+                <a14:hiddenLine xmlns:a14="http://schemas.microsoft.com/office/drawing/2010/main" xmlns:p14="http://schemas.microsoft.com/office/powerpoint/2010/main" xmlns:a16="http://schemas.microsoft.com/office/drawing/2014/main" xmlns="" w="9525">
                   <a:solidFill>
                     <a:srgbClr val="000000"/>
                   </a:solidFill>
@@ -21768,7 +21772,7 @@
             </a:ln>
             <a:extLst>
               <a:ext uri="{91240B29-F687-4f45-9708-019B960494DF}">
-                <a14:hiddenLine xmlns="" xmlns:a16="http://schemas.microsoft.com/office/drawing/2014/main" xmlns:p14="http://schemas.microsoft.com/office/powerpoint/2010/main" xmlns:a14="http://schemas.microsoft.com/office/drawing/2010/main" w="9525">
+                <a14:hiddenLine xmlns:a14="http://schemas.microsoft.com/office/drawing/2010/main" xmlns:p14="http://schemas.microsoft.com/office/powerpoint/2010/main" xmlns:a16="http://schemas.microsoft.com/office/drawing/2014/main" xmlns="" w="9525">
                   <a:solidFill>
                     <a:srgbClr val="000000"/>
                   </a:solidFill>
@@ -21880,7 +21884,7 @@
             </a:ln>
             <a:extLst>
               <a:ext uri="{91240B29-F687-4f45-9708-019B960494DF}">
-                <a14:hiddenLine xmlns="" xmlns:a16="http://schemas.microsoft.com/office/drawing/2014/main" xmlns:p14="http://schemas.microsoft.com/office/powerpoint/2010/main" xmlns:a14="http://schemas.microsoft.com/office/drawing/2010/main" w="9525">
+                <a14:hiddenLine xmlns:a14="http://schemas.microsoft.com/office/drawing/2010/main" xmlns:p14="http://schemas.microsoft.com/office/powerpoint/2010/main" xmlns:a16="http://schemas.microsoft.com/office/drawing/2014/main" xmlns="" w="9525">
                   <a:solidFill>
                     <a:srgbClr val="000000"/>
                   </a:solidFill>
@@ -21967,7 +21971,7 @@
             </a:ln>
             <a:extLst>
               <a:ext uri="{91240B29-F687-4f45-9708-019B960494DF}">
-                <a14:hiddenLine xmlns="" xmlns:a16="http://schemas.microsoft.com/office/drawing/2014/main" xmlns:p14="http://schemas.microsoft.com/office/powerpoint/2010/main" xmlns:a14="http://schemas.microsoft.com/office/drawing/2010/main" w="9525">
+                <a14:hiddenLine xmlns:a14="http://schemas.microsoft.com/office/drawing/2010/main" xmlns:p14="http://schemas.microsoft.com/office/powerpoint/2010/main" xmlns:a16="http://schemas.microsoft.com/office/drawing/2014/main" xmlns="" w="9525">
                   <a:solidFill>
                     <a:srgbClr val="000000"/>
                   </a:solidFill>
@@ -22051,7 +22055,7 @@
             </a:ln>
             <a:extLst>
               <a:ext uri="{91240B29-F687-4f45-9708-019B960494DF}">
-                <a14:hiddenLine xmlns="" xmlns:a16="http://schemas.microsoft.com/office/drawing/2014/main" xmlns:p14="http://schemas.microsoft.com/office/powerpoint/2010/main" xmlns:a14="http://schemas.microsoft.com/office/drawing/2010/main" w="9525">
+                <a14:hiddenLine xmlns:a14="http://schemas.microsoft.com/office/drawing/2010/main" xmlns:p14="http://schemas.microsoft.com/office/powerpoint/2010/main" xmlns:a16="http://schemas.microsoft.com/office/drawing/2014/main" xmlns="" w="9525">
                   <a:solidFill>
                     <a:srgbClr val="000000"/>
                   </a:solidFill>
@@ -22163,7 +22167,7 @@
             </a:ln>
             <a:extLst>
               <a:ext uri="{91240B29-F687-4f45-9708-019B960494DF}">
-                <a14:hiddenLine xmlns="" xmlns:a16="http://schemas.microsoft.com/office/drawing/2014/main" xmlns:p14="http://schemas.microsoft.com/office/powerpoint/2010/main" xmlns:a14="http://schemas.microsoft.com/office/drawing/2010/main" w="9525">
+                <a14:hiddenLine xmlns:a14="http://schemas.microsoft.com/office/drawing/2010/main" xmlns:p14="http://schemas.microsoft.com/office/powerpoint/2010/main" xmlns:a16="http://schemas.microsoft.com/office/drawing/2014/main" xmlns="" w="9525">
                   <a:solidFill>
                     <a:srgbClr val="000000"/>
                   </a:solidFill>
@@ -22275,7 +22279,7 @@
             </a:ln>
             <a:extLst>
               <a:ext uri="{91240B29-F687-4f45-9708-019B960494DF}">
-                <a14:hiddenLine xmlns="" xmlns:a16="http://schemas.microsoft.com/office/drawing/2014/main" xmlns:p14="http://schemas.microsoft.com/office/powerpoint/2010/main" xmlns:a14="http://schemas.microsoft.com/office/drawing/2010/main" w="9525">
+                <a14:hiddenLine xmlns:a14="http://schemas.microsoft.com/office/drawing/2010/main" xmlns:p14="http://schemas.microsoft.com/office/powerpoint/2010/main" xmlns:a16="http://schemas.microsoft.com/office/drawing/2014/main" xmlns="" w="9525">
                   <a:solidFill>
                     <a:srgbClr val="000000"/>
                   </a:solidFill>
@@ -22362,7 +22366,7 @@
             </a:ln>
             <a:extLst>
               <a:ext uri="{91240B29-F687-4f45-9708-019B960494DF}">
-                <a14:hiddenLine xmlns="" xmlns:a16="http://schemas.microsoft.com/office/drawing/2014/main" xmlns:p14="http://schemas.microsoft.com/office/powerpoint/2010/main" xmlns:a14="http://schemas.microsoft.com/office/drawing/2010/main" w="9525">
+                <a14:hiddenLine xmlns:a14="http://schemas.microsoft.com/office/drawing/2010/main" xmlns:p14="http://schemas.microsoft.com/office/powerpoint/2010/main" xmlns:a16="http://schemas.microsoft.com/office/drawing/2014/main" xmlns="" w="9525">
                   <a:solidFill>
                     <a:srgbClr val="000000"/>
                   </a:solidFill>
@@ -22504,7 +22508,7 @@
             </a:ln>
             <a:extLst>
               <a:ext uri="{91240B29-F687-4f45-9708-019B960494DF}">
-                <a14:hiddenLine xmlns="" xmlns:a16="http://schemas.microsoft.com/office/drawing/2014/main" xmlns:p14="http://schemas.microsoft.com/office/powerpoint/2010/main" xmlns:a14="http://schemas.microsoft.com/office/drawing/2010/main" w="9525">
+                <a14:hiddenLine xmlns:a14="http://schemas.microsoft.com/office/drawing/2010/main" xmlns:p14="http://schemas.microsoft.com/office/powerpoint/2010/main" xmlns:a16="http://schemas.microsoft.com/office/drawing/2014/main" xmlns="" w="9525">
                   <a:solidFill>
                     <a:srgbClr val="000000"/>
                   </a:solidFill>
@@ -23269,7 +23273,7 @@
             </a:ln>
             <a:extLst>
               <a:ext uri="{91240B29-F687-4f45-9708-019B960494DF}">
-                <a14:hiddenLine xmlns="" xmlns:a16="http://schemas.microsoft.com/office/drawing/2014/main" xmlns:p14="http://schemas.microsoft.com/office/powerpoint/2010/main" xmlns:a14="http://schemas.microsoft.com/office/drawing/2010/main" w="9525">
+                <a14:hiddenLine xmlns:a14="http://schemas.microsoft.com/office/drawing/2010/main" xmlns:p14="http://schemas.microsoft.com/office/powerpoint/2010/main" xmlns:a16="http://schemas.microsoft.com/office/drawing/2014/main" xmlns="" w="9525">
                   <a:solidFill>
                     <a:srgbClr val="000000"/>
                   </a:solidFill>
@@ -23381,7 +23385,7 @@
             </a:ln>
             <a:extLst>
               <a:ext uri="{91240B29-F687-4f45-9708-019B960494DF}">
-                <a14:hiddenLine xmlns="" xmlns:a16="http://schemas.microsoft.com/office/drawing/2014/main" xmlns:p14="http://schemas.microsoft.com/office/powerpoint/2010/main" xmlns:a14="http://schemas.microsoft.com/office/drawing/2010/main" w="9525">
+                <a14:hiddenLine xmlns:a14="http://schemas.microsoft.com/office/drawing/2010/main" xmlns:p14="http://schemas.microsoft.com/office/powerpoint/2010/main" xmlns:a16="http://schemas.microsoft.com/office/drawing/2014/main" xmlns="" w="9525">
                   <a:solidFill>
                     <a:srgbClr val="000000"/>
                   </a:solidFill>
@@ -23493,7 +23497,7 @@
             </a:ln>
             <a:extLst>
               <a:ext uri="{91240B29-F687-4f45-9708-019B960494DF}">
-                <a14:hiddenLine xmlns="" xmlns:a16="http://schemas.microsoft.com/office/drawing/2014/main" xmlns:p14="http://schemas.microsoft.com/office/powerpoint/2010/main" xmlns:a14="http://schemas.microsoft.com/office/drawing/2010/main" w="9525">
+                <a14:hiddenLine xmlns:a14="http://schemas.microsoft.com/office/drawing/2010/main" xmlns:p14="http://schemas.microsoft.com/office/powerpoint/2010/main" xmlns:a16="http://schemas.microsoft.com/office/drawing/2014/main" xmlns="" w="9525">
                   <a:solidFill>
                     <a:srgbClr val="000000"/>
                   </a:solidFill>
@@ -23577,7 +23581,7 @@
             </a:ln>
             <a:extLst>
               <a:ext uri="{91240B29-F687-4f45-9708-019B960494DF}">
-                <a14:hiddenLine xmlns="" xmlns:a16="http://schemas.microsoft.com/office/drawing/2014/main" xmlns:p14="http://schemas.microsoft.com/office/powerpoint/2010/main" xmlns:a14="http://schemas.microsoft.com/office/drawing/2010/main" w="9525">
+                <a14:hiddenLine xmlns:a14="http://schemas.microsoft.com/office/drawing/2010/main" xmlns:p14="http://schemas.microsoft.com/office/powerpoint/2010/main" xmlns:a16="http://schemas.microsoft.com/office/drawing/2014/main" xmlns="" w="9525">
                   <a:solidFill>
                     <a:srgbClr val="000000"/>
                   </a:solidFill>
@@ -23689,7 +23693,7 @@
             </a:ln>
             <a:extLst>
               <a:ext uri="{91240B29-F687-4f45-9708-019B960494DF}">
-                <a14:hiddenLine xmlns="" xmlns:a16="http://schemas.microsoft.com/office/drawing/2014/main" xmlns:p14="http://schemas.microsoft.com/office/powerpoint/2010/main" xmlns:a14="http://schemas.microsoft.com/office/drawing/2010/main" w="9525">
+                <a14:hiddenLine xmlns:a14="http://schemas.microsoft.com/office/drawing/2010/main" xmlns:p14="http://schemas.microsoft.com/office/powerpoint/2010/main" xmlns:a16="http://schemas.microsoft.com/office/drawing/2014/main" xmlns="" w="9525">
                   <a:solidFill>
                     <a:srgbClr val="000000"/>
                   </a:solidFill>
@@ -23773,7 +23777,7 @@
             </a:ln>
             <a:extLst>
               <a:ext uri="{91240B29-F687-4f45-9708-019B960494DF}">
-                <a14:hiddenLine xmlns="" xmlns:a16="http://schemas.microsoft.com/office/drawing/2014/main" xmlns:p14="http://schemas.microsoft.com/office/powerpoint/2010/main" xmlns:a14="http://schemas.microsoft.com/office/drawing/2010/main" w="9525">
+                <a14:hiddenLine xmlns:a14="http://schemas.microsoft.com/office/drawing/2010/main" xmlns:p14="http://schemas.microsoft.com/office/powerpoint/2010/main" xmlns:a16="http://schemas.microsoft.com/office/drawing/2014/main" xmlns="" w="9525">
                   <a:solidFill>
                     <a:srgbClr val="000000"/>
                   </a:solidFill>
@@ -23857,7 +23861,7 @@
             </a:ln>
             <a:extLst>
               <a:ext uri="{91240B29-F687-4f45-9708-019B960494DF}">
-                <a14:hiddenLine xmlns="" xmlns:a16="http://schemas.microsoft.com/office/drawing/2014/main" xmlns:p14="http://schemas.microsoft.com/office/powerpoint/2010/main" xmlns:a14="http://schemas.microsoft.com/office/drawing/2010/main" w="9525">
+                <a14:hiddenLine xmlns:a14="http://schemas.microsoft.com/office/drawing/2010/main" xmlns:p14="http://schemas.microsoft.com/office/powerpoint/2010/main" xmlns:a16="http://schemas.microsoft.com/office/drawing/2014/main" xmlns="" w="9525">
                   <a:solidFill>
                     <a:srgbClr val="000000"/>
                   </a:solidFill>
@@ -23969,7 +23973,7 @@
             </a:ln>
             <a:extLst>
               <a:ext uri="{91240B29-F687-4f45-9708-019B960494DF}">
-                <a14:hiddenLine xmlns="" xmlns:a16="http://schemas.microsoft.com/office/drawing/2014/main" xmlns:p14="http://schemas.microsoft.com/office/powerpoint/2010/main" xmlns:a14="http://schemas.microsoft.com/office/drawing/2010/main" w="9525">
+                <a14:hiddenLine xmlns:a14="http://schemas.microsoft.com/office/drawing/2010/main" xmlns:p14="http://schemas.microsoft.com/office/powerpoint/2010/main" xmlns:a16="http://schemas.microsoft.com/office/drawing/2014/main" xmlns="" w="9525">
                   <a:solidFill>
                     <a:srgbClr val="000000"/>
                   </a:solidFill>
@@ -24081,7 +24085,7 @@
             </a:ln>
             <a:extLst>
               <a:ext uri="{91240B29-F687-4f45-9708-019B960494DF}">
-                <a14:hiddenLine xmlns="" xmlns:a16="http://schemas.microsoft.com/office/drawing/2014/main" xmlns:p14="http://schemas.microsoft.com/office/powerpoint/2010/main" xmlns:a14="http://schemas.microsoft.com/office/drawing/2010/main" w="9525">
+                <a14:hiddenLine xmlns:a14="http://schemas.microsoft.com/office/drawing/2010/main" xmlns:p14="http://schemas.microsoft.com/office/powerpoint/2010/main" xmlns:a16="http://schemas.microsoft.com/office/drawing/2014/main" xmlns="" w="9525">
                   <a:solidFill>
                     <a:srgbClr val="000000"/>
                   </a:solidFill>
@@ -24165,7 +24169,7 @@
             </a:ln>
             <a:extLst>
               <a:ext uri="{91240B29-F687-4f45-9708-019B960494DF}">
-                <a14:hiddenLine xmlns="" xmlns:a16="http://schemas.microsoft.com/office/drawing/2014/main" xmlns:p14="http://schemas.microsoft.com/office/powerpoint/2010/main" xmlns:a14="http://schemas.microsoft.com/office/drawing/2010/main" w="9525">
+                <a14:hiddenLine xmlns:a14="http://schemas.microsoft.com/office/drawing/2010/main" xmlns:p14="http://schemas.microsoft.com/office/powerpoint/2010/main" xmlns:a16="http://schemas.microsoft.com/office/drawing/2014/main" xmlns="" w="9525">
                   <a:solidFill>
                     <a:srgbClr val="000000"/>
                   </a:solidFill>
@@ -24297,7 +24301,7 @@
             </a:ln>
             <a:extLst>
               <a:ext uri="{91240B29-F687-4f45-9708-019B960494DF}">
-                <a14:hiddenLine xmlns="" xmlns:a16="http://schemas.microsoft.com/office/drawing/2014/main" xmlns:p14="http://schemas.microsoft.com/office/powerpoint/2010/main" xmlns:a14="http://schemas.microsoft.com/office/drawing/2010/main" w="9525">
+                <a14:hiddenLine xmlns:a14="http://schemas.microsoft.com/office/drawing/2010/main" xmlns:p14="http://schemas.microsoft.com/office/powerpoint/2010/main" xmlns:a16="http://schemas.microsoft.com/office/drawing/2014/main" xmlns="" w="9525">
                   <a:solidFill>
                     <a:srgbClr val="000000"/>
                   </a:solidFill>
@@ -24425,7 +24429,7 @@
             </a:ln>
             <a:extLst>
               <a:ext uri="{91240B29-F687-4f45-9708-019B960494DF}">
-                <a14:hiddenLine xmlns="" xmlns:a16="http://schemas.microsoft.com/office/drawing/2014/main" xmlns:p14="http://schemas.microsoft.com/office/powerpoint/2010/main" xmlns:a14="http://schemas.microsoft.com/office/drawing/2010/main" w="9525">
+                <a14:hiddenLine xmlns:a14="http://schemas.microsoft.com/office/drawing/2010/main" xmlns:p14="http://schemas.microsoft.com/office/powerpoint/2010/main" xmlns:a16="http://schemas.microsoft.com/office/drawing/2014/main" xmlns="" w="9525">
                   <a:solidFill>
                     <a:srgbClr val="000000"/>
                   </a:solidFill>
@@ -24509,7 +24513,7 @@
             </a:ln>
             <a:extLst>
               <a:ext uri="{91240B29-F687-4f45-9708-019B960494DF}">
-                <a14:hiddenLine xmlns="" xmlns:a16="http://schemas.microsoft.com/office/drawing/2014/main" xmlns:p14="http://schemas.microsoft.com/office/powerpoint/2010/main" xmlns:a14="http://schemas.microsoft.com/office/drawing/2010/main" w="9525">
+                <a14:hiddenLine xmlns:a14="http://schemas.microsoft.com/office/drawing/2010/main" xmlns:p14="http://schemas.microsoft.com/office/powerpoint/2010/main" xmlns:a16="http://schemas.microsoft.com/office/drawing/2014/main" xmlns="" w="9525">
                   <a:solidFill>
                     <a:srgbClr val="000000"/>
                   </a:solidFill>
@@ -24593,7 +24597,7 @@
             </a:ln>
             <a:extLst>
               <a:ext uri="{91240B29-F687-4f45-9708-019B960494DF}">
-                <a14:hiddenLine xmlns="" xmlns:a16="http://schemas.microsoft.com/office/drawing/2014/main" xmlns:p14="http://schemas.microsoft.com/office/powerpoint/2010/main" xmlns:a14="http://schemas.microsoft.com/office/drawing/2010/main" w="9525">
+                <a14:hiddenLine xmlns:a14="http://schemas.microsoft.com/office/drawing/2010/main" xmlns:p14="http://schemas.microsoft.com/office/powerpoint/2010/main" xmlns:a16="http://schemas.microsoft.com/office/drawing/2014/main" xmlns="" w="9525">
                   <a:solidFill>
                     <a:srgbClr val="000000"/>
                   </a:solidFill>
@@ -24705,7 +24709,7 @@
             </a:ln>
             <a:extLst>
               <a:ext uri="{91240B29-F687-4f45-9708-019B960494DF}">
-                <a14:hiddenLine xmlns="" xmlns:a16="http://schemas.microsoft.com/office/drawing/2014/main" xmlns:p14="http://schemas.microsoft.com/office/powerpoint/2010/main" xmlns:a14="http://schemas.microsoft.com/office/drawing/2010/main" w="9525">
+                <a14:hiddenLine xmlns:a14="http://schemas.microsoft.com/office/drawing/2010/main" xmlns:p14="http://schemas.microsoft.com/office/powerpoint/2010/main" xmlns:a16="http://schemas.microsoft.com/office/drawing/2014/main" xmlns="" w="9525">
                   <a:solidFill>
                     <a:srgbClr val="000000"/>
                   </a:solidFill>
@@ -24761,7 +24765,7 @@
             </a:ln>
             <a:extLst>
               <a:ext uri="{91240B29-F687-4f45-9708-019B960494DF}">
-                <a14:hiddenLine xmlns="" xmlns:a16="http://schemas.microsoft.com/office/drawing/2014/main" xmlns:p14="http://schemas.microsoft.com/office/powerpoint/2010/main" xmlns:a14="http://schemas.microsoft.com/office/drawing/2010/main" w="9525">
+                <a14:hiddenLine xmlns:a14="http://schemas.microsoft.com/office/drawing/2010/main" xmlns:p14="http://schemas.microsoft.com/office/powerpoint/2010/main" xmlns:a16="http://schemas.microsoft.com/office/drawing/2014/main" xmlns="" w="9525">
                   <a:solidFill>
                     <a:srgbClr val="000000"/>
                   </a:solidFill>
@@ -24848,7 +24852,7 @@
             </a:ln>
             <a:extLst>
               <a:ext uri="{91240B29-F687-4f45-9708-019B960494DF}">
-                <a14:hiddenLine xmlns="" xmlns:a16="http://schemas.microsoft.com/office/drawing/2014/main" xmlns:p14="http://schemas.microsoft.com/office/powerpoint/2010/main" xmlns:a14="http://schemas.microsoft.com/office/drawing/2010/main" w="9525">
+                <a14:hiddenLine xmlns:a14="http://schemas.microsoft.com/office/drawing/2010/main" xmlns:p14="http://schemas.microsoft.com/office/powerpoint/2010/main" xmlns:a16="http://schemas.microsoft.com/office/drawing/2014/main" xmlns="" w="9525">
                   <a:solidFill>
                     <a:srgbClr val="000000"/>
                   </a:solidFill>
@@ -24960,7 +24964,7 @@
             </a:ln>
             <a:extLst>
               <a:ext uri="{91240B29-F687-4f45-9708-019B960494DF}">
-                <a14:hiddenLine xmlns="" xmlns:a16="http://schemas.microsoft.com/office/drawing/2014/main" xmlns:p14="http://schemas.microsoft.com/office/powerpoint/2010/main" xmlns:a14="http://schemas.microsoft.com/office/drawing/2010/main" w="9525">
+                <a14:hiddenLine xmlns:a14="http://schemas.microsoft.com/office/drawing/2010/main" xmlns:p14="http://schemas.microsoft.com/office/powerpoint/2010/main" xmlns:a16="http://schemas.microsoft.com/office/drawing/2014/main" xmlns="" w="9525">
                   <a:solidFill>
                     <a:srgbClr val="000000"/>
                   </a:solidFill>
@@ -25044,7 +25048,7 @@
             </a:ln>
             <a:extLst>
               <a:ext uri="{91240B29-F687-4f45-9708-019B960494DF}">
-                <a14:hiddenLine xmlns="" xmlns:a16="http://schemas.microsoft.com/office/drawing/2014/main" xmlns:p14="http://schemas.microsoft.com/office/powerpoint/2010/main" xmlns:a14="http://schemas.microsoft.com/office/drawing/2010/main" w="9525">
+                <a14:hiddenLine xmlns:a14="http://schemas.microsoft.com/office/drawing/2010/main" xmlns:p14="http://schemas.microsoft.com/office/powerpoint/2010/main" xmlns:a16="http://schemas.microsoft.com/office/drawing/2014/main" xmlns="" w="9525">
                   <a:solidFill>
                     <a:srgbClr val="000000"/>
                   </a:solidFill>
@@ -25156,7 +25160,7 @@
             </a:ln>
             <a:extLst>
               <a:ext uri="{91240B29-F687-4f45-9708-019B960494DF}">
-                <a14:hiddenLine xmlns="" xmlns:a16="http://schemas.microsoft.com/office/drawing/2014/main" xmlns:p14="http://schemas.microsoft.com/office/powerpoint/2010/main" xmlns:a14="http://schemas.microsoft.com/office/drawing/2010/main" w="9525">
+                <a14:hiddenLine xmlns:a14="http://schemas.microsoft.com/office/drawing/2010/main" xmlns:p14="http://schemas.microsoft.com/office/powerpoint/2010/main" xmlns:a16="http://schemas.microsoft.com/office/drawing/2014/main" xmlns="" w="9525">
                   <a:solidFill>
                     <a:srgbClr val="000000"/>
                   </a:solidFill>
@@ -25243,7 +25247,7 @@
             </a:ln>
             <a:extLst>
               <a:ext uri="{91240B29-F687-4f45-9708-019B960494DF}">
-                <a14:hiddenLine xmlns="" xmlns:a16="http://schemas.microsoft.com/office/drawing/2014/main" xmlns:p14="http://schemas.microsoft.com/office/powerpoint/2010/main" xmlns:a14="http://schemas.microsoft.com/office/drawing/2010/main" w="9525">
+                <a14:hiddenLine xmlns:a14="http://schemas.microsoft.com/office/drawing/2010/main" xmlns:p14="http://schemas.microsoft.com/office/powerpoint/2010/main" xmlns:a16="http://schemas.microsoft.com/office/drawing/2014/main" xmlns="" w="9525">
                   <a:solidFill>
                     <a:srgbClr val="000000"/>
                   </a:solidFill>
@@ -25327,7 +25331,7 @@
             </a:ln>
             <a:extLst>
               <a:ext uri="{91240B29-F687-4f45-9708-019B960494DF}">
-                <a14:hiddenLine xmlns="" xmlns:a16="http://schemas.microsoft.com/office/drawing/2014/main" xmlns:p14="http://schemas.microsoft.com/office/powerpoint/2010/main" xmlns:a14="http://schemas.microsoft.com/office/drawing/2010/main" w="9525">
+                <a14:hiddenLine xmlns:a14="http://schemas.microsoft.com/office/drawing/2010/main" xmlns:p14="http://schemas.microsoft.com/office/powerpoint/2010/main" xmlns:a16="http://schemas.microsoft.com/office/drawing/2014/main" xmlns="" w="9525">
                   <a:solidFill>
                     <a:srgbClr val="000000"/>
                   </a:solidFill>
@@ -25439,7 +25443,7 @@
             </a:ln>
             <a:extLst>
               <a:ext uri="{91240B29-F687-4f45-9708-019B960494DF}">
-                <a14:hiddenLine xmlns="" xmlns:a16="http://schemas.microsoft.com/office/drawing/2014/main" xmlns:p14="http://schemas.microsoft.com/office/powerpoint/2010/main" xmlns:a14="http://schemas.microsoft.com/office/drawing/2010/main" w="9525">
+                <a14:hiddenLine xmlns:a14="http://schemas.microsoft.com/office/drawing/2010/main" xmlns:p14="http://schemas.microsoft.com/office/powerpoint/2010/main" xmlns:a16="http://schemas.microsoft.com/office/drawing/2014/main" xmlns="" w="9525">
                   <a:solidFill>
                     <a:srgbClr val="000000"/>
                   </a:solidFill>
@@ -25551,7 +25555,7 @@
             </a:ln>
             <a:extLst>
               <a:ext uri="{91240B29-F687-4f45-9708-019B960494DF}">
-                <a14:hiddenLine xmlns="" xmlns:a16="http://schemas.microsoft.com/office/drawing/2014/main" xmlns:p14="http://schemas.microsoft.com/office/powerpoint/2010/main" xmlns:a14="http://schemas.microsoft.com/office/drawing/2010/main" w="9525">
+                <a14:hiddenLine xmlns:a14="http://schemas.microsoft.com/office/drawing/2010/main" xmlns:p14="http://schemas.microsoft.com/office/powerpoint/2010/main" xmlns:a16="http://schemas.microsoft.com/office/drawing/2014/main" xmlns="" w="9525">
                   <a:solidFill>
                     <a:srgbClr val="000000"/>
                   </a:solidFill>
@@ -25638,7 +25642,7 @@
             </a:ln>
             <a:extLst>
               <a:ext uri="{91240B29-F687-4f45-9708-019B960494DF}">
-                <a14:hiddenLine xmlns="" xmlns:a16="http://schemas.microsoft.com/office/drawing/2014/main" xmlns:p14="http://schemas.microsoft.com/office/powerpoint/2010/main" xmlns:a14="http://schemas.microsoft.com/office/drawing/2010/main" w="9525">
+                <a14:hiddenLine xmlns:a14="http://schemas.microsoft.com/office/drawing/2010/main" xmlns:p14="http://schemas.microsoft.com/office/powerpoint/2010/main" xmlns:a16="http://schemas.microsoft.com/office/drawing/2014/main" xmlns="" w="9525">
                   <a:solidFill>
                     <a:srgbClr val="000000"/>
                   </a:solidFill>
@@ -25780,7 +25784,7 @@
             </a:ln>
             <a:extLst>
               <a:ext uri="{91240B29-F687-4f45-9708-019B960494DF}">
-                <a14:hiddenLine xmlns="" xmlns:a16="http://schemas.microsoft.com/office/drawing/2014/main" xmlns:p14="http://schemas.microsoft.com/office/powerpoint/2010/main" xmlns:a14="http://schemas.microsoft.com/office/drawing/2010/main" w="9525">
+                <a14:hiddenLine xmlns:a14="http://schemas.microsoft.com/office/drawing/2010/main" xmlns:p14="http://schemas.microsoft.com/office/powerpoint/2010/main" xmlns:a16="http://schemas.microsoft.com/office/drawing/2014/main" xmlns="" w="9525">
                   <a:solidFill>
                     <a:srgbClr val="000000"/>
                   </a:solidFill>
@@ -26141,7 +26145,7 @@
             </a:ln>
             <a:extLst>
               <a:ext uri="{91240B29-F687-4f45-9708-019B960494DF}">
-                <a14:hiddenLine xmlns="" xmlns:a16="http://schemas.microsoft.com/office/drawing/2014/main" xmlns:p14="http://schemas.microsoft.com/office/powerpoint/2010/main" xmlns:a14="http://schemas.microsoft.com/office/drawing/2010/main" w="9525">
+                <a14:hiddenLine xmlns:a14="http://schemas.microsoft.com/office/drawing/2010/main" xmlns:p14="http://schemas.microsoft.com/office/powerpoint/2010/main" xmlns:a16="http://schemas.microsoft.com/office/drawing/2014/main" xmlns="" w="9525">
                   <a:solidFill>
                     <a:srgbClr val="000000"/>
                   </a:solidFill>
@@ -26253,7 +26257,7 @@
             </a:ln>
             <a:extLst>
               <a:ext uri="{91240B29-F687-4f45-9708-019B960494DF}">
-                <a14:hiddenLine xmlns="" xmlns:a16="http://schemas.microsoft.com/office/drawing/2014/main" xmlns:p14="http://schemas.microsoft.com/office/powerpoint/2010/main" xmlns:a14="http://schemas.microsoft.com/office/drawing/2010/main" w="9525">
+                <a14:hiddenLine xmlns:a14="http://schemas.microsoft.com/office/drawing/2010/main" xmlns:p14="http://schemas.microsoft.com/office/powerpoint/2010/main" xmlns:a16="http://schemas.microsoft.com/office/drawing/2014/main" xmlns="" w="9525">
                   <a:solidFill>
                     <a:srgbClr val="000000"/>
                   </a:solidFill>
@@ -26365,7 +26369,7 @@
             </a:ln>
             <a:extLst>
               <a:ext uri="{91240B29-F687-4f45-9708-019B960494DF}">
-                <a14:hiddenLine xmlns="" xmlns:a16="http://schemas.microsoft.com/office/drawing/2014/main" xmlns:p14="http://schemas.microsoft.com/office/powerpoint/2010/main" xmlns:a14="http://schemas.microsoft.com/office/drawing/2010/main" w="9525">
+                <a14:hiddenLine xmlns:a14="http://schemas.microsoft.com/office/drawing/2010/main" xmlns:p14="http://schemas.microsoft.com/office/powerpoint/2010/main" xmlns:a16="http://schemas.microsoft.com/office/drawing/2014/main" xmlns="" w="9525">
                   <a:solidFill>
                     <a:srgbClr val="000000"/>
                   </a:solidFill>
@@ -26449,7 +26453,7 @@
             </a:ln>
             <a:extLst>
               <a:ext uri="{91240B29-F687-4f45-9708-019B960494DF}">
-                <a14:hiddenLine xmlns="" xmlns:a16="http://schemas.microsoft.com/office/drawing/2014/main" xmlns:p14="http://schemas.microsoft.com/office/powerpoint/2010/main" xmlns:a14="http://schemas.microsoft.com/office/drawing/2010/main" w="9525">
+                <a14:hiddenLine xmlns:a14="http://schemas.microsoft.com/office/drawing/2010/main" xmlns:p14="http://schemas.microsoft.com/office/powerpoint/2010/main" xmlns:a16="http://schemas.microsoft.com/office/drawing/2014/main" xmlns="" w="9525">
                   <a:solidFill>
                     <a:srgbClr val="000000"/>
                   </a:solidFill>
@@ -26561,7 +26565,7 @@
             </a:ln>
             <a:extLst>
               <a:ext uri="{91240B29-F687-4f45-9708-019B960494DF}">
-                <a14:hiddenLine xmlns="" xmlns:a16="http://schemas.microsoft.com/office/drawing/2014/main" xmlns:p14="http://schemas.microsoft.com/office/powerpoint/2010/main" xmlns:a14="http://schemas.microsoft.com/office/drawing/2010/main" w="9525">
+                <a14:hiddenLine xmlns:a14="http://schemas.microsoft.com/office/drawing/2010/main" xmlns:p14="http://schemas.microsoft.com/office/powerpoint/2010/main" xmlns:a16="http://schemas.microsoft.com/office/drawing/2014/main" xmlns="" w="9525">
                   <a:solidFill>
                     <a:srgbClr val="000000"/>
                   </a:solidFill>
@@ -26645,7 +26649,7 @@
             </a:ln>
             <a:extLst>
               <a:ext uri="{91240B29-F687-4f45-9708-019B960494DF}">
-                <a14:hiddenLine xmlns="" xmlns:a16="http://schemas.microsoft.com/office/drawing/2014/main" xmlns:p14="http://schemas.microsoft.com/office/powerpoint/2010/main" xmlns:a14="http://schemas.microsoft.com/office/drawing/2010/main" w="9525">
+                <a14:hiddenLine xmlns:a14="http://schemas.microsoft.com/office/drawing/2010/main" xmlns:p14="http://schemas.microsoft.com/office/powerpoint/2010/main" xmlns:a16="http://schemas.microsoft.com/office/drawing/2014/main" xmlns="" w="9525">
                   <a:solidFill>
                     <a:srgbClr val="000000"/>
                   </a:solidFill>
@@ -26729,7 +26733,7 @@
             </a:ln>
             <a:extLst>
               <a:ext uri="{91240B29-F687-4f45-9708-019B960494DF}">
-                <a14:hiddenLine xmlns="" xmlns:a16="http://schemas.microsoft.com/office/drawing/2014/main" xmlns:p14="http://schemas.microsoft.com/office/powerpoint/2010/main" xmlns:a14="http://schemas.microsoft.com/office/drawing/2010/main" w="9525">
+                <a14:hiddenLine xmlns:a14="http://schemas.microsoft.com/office/drawing/2010/main" xmlns:p14="http://schemas.microsoft.com/office/powerpoint/2010/main" xmlns:a16="http://schemas.microsoft.com/office/drawing/2014/main" xmlns="" w="9525">
                   <a:solidFill>
                     <a:srgbClr val="000000"/>
                   </a:solidFill>
@@ -26841,7 +26845,7 @@
             </a:ln>
             <a:extLst>
               <a:ext uri="{91240B29-F687-4f45-9708-019B960494DF}">
-                <a14:hiddenLine xmlns="" xmlns:a16="http://schemas.microsoft.com/office/drawing/2014/main" xmlns:p14="http://schemas.microsoft.com/office/powerpoint/2010/main" xmlns:a14="http://schemas.microsoft.com/office/drawing/2010/main" w="9525">
+                <a14:hiddenLine xmlns:a14="http://schemas.microsoft.com/office/drawing/2010/main" xmlns:p14="http://schemas.microsoft.com/office/powerpoint/2010/main" xmlns:a16="http://schemas.microsoft.com/office/drawing/2014/main" xmlns="" w="9525">
                   <a:solidFill>
                     <a:srgbClr val="000000"/>
                   </a:solidFill>
@@ -26953,7 +26957,7 @@
             </a:ln>
             <a:extLst>
               <a:ext uri="{91240B29-F687-4f45-9708-019B960494DF}">
-                <a14:hiddenLine xmlns="" xmlns:a16="http://schemas.microsoft.com/office/drawing/2014/main" xmlns:p14="http://schemas.microsoft.com/office/powerpoint/2010/main" xmlns:a14="http://schemas.microsoft.com/office/drawing/2010/main" w="9525">
+                <a14:hiddenLine xmlns:a14="http://schemas.microsoft.com/office/drawing/2010/main" xmlns:p14="http://schemas.microsoft.com/office/powerpoint/2010/main" xmlns:a16="http://schemas.microsoft.com/office/drawing/2014/main" xmlns="" w="9525">
                   <a:solidFill>
                     <a:srgbClr val="000000"/>
                   </a:solidFill>
@@ -27037,7 +27041,7 @@
             </a:ln>
             <a:extLst>
               <a:ext uri="{91240B29-F687-4f45-9708-019B960494DF}">
-                <a14:hiddenLine xmlns="" xmlns:a16="http://schemas.microsoft.com/office/drawing/2014/main" xmlns:p14="http://schemas.microsoft.com/office/powerpoint/2010/main" xmlns:a14="http://schemas.microsoft.com/office/drawing/2010/main" w="9525">
+                <a14:hiddenLine xmlns:a14="http://schemas.microsoft.com/office/drawing/2010/main" xmlns:p14="http://schemas.microsoft.com/office/powerpoint/2010/main" xmlns:a16="http://schemas.microsoft.com/office/drawing/2014/main" xmlns="" w="9525">
                   <a:solidFill>
                     <a:srgbClr val="000000"/>
                   </a:solidFill>
@@ -27169,7 +27173,7 @@
             </a:ln>
             <a:extLst>
               <a:ext uri="{91240B29-F687-4f45-9708-019B960494DF}">
-                <a14:hiddenLine xmlns="" xmlns:a16="http://schemas.microsoft.com/office/drawing/2014/main" xmlns:p14="http://schemas.microsoft.com/office/powerpoint/2010/main" xmlns:a14="http://schemas.microsoft.com/office/drawing/2010/main" w="9525">
+                <a14:hiddenLine xmlns:a14="http://schemas.microsoft.com/office/drawing/2010/main" xmlns:p14="http://schemas.microsoft.com/office/powerpoint/2010/main" xmlns:a16="http://schemas.microsoft.com/office/drawing/2014/main" xmlns="" w="9525">
                   <a:solidFill>
                     <a:srgbClr val="000000"/>
                   </a:solidFill>
@@ -27297,7 +27301,7 @@
             </a:ln>
             <a:extLst>
               <a:ext uri="{91240B29-F687-4f45-9708-019B960494DF}">
-                <a14:hiddenLine xmlns="" xmlns:a16="http://schemas.microsoft.com/office/drawing/2014/main" xmlns:p14="http://schemas.microsoft.com/office/powerpoint/2010/main" xmlns:a14="http://schemas.microsoft.com/office/drawing/2010/main" w="9525">
+                <a14:hiddenLine xmlns:a14="http://schemas.microsoft.com/office/drawing/2010/main" xmlns:p14="http://schemas.microsoft.com/office/powerpoint/2010/main" xmlns:a16="http://schemas.microsoft.com/office/drawing/2014/main" xmlns="" w="9525">
                   <a:solidFill>
                     <a:srgbClr val="000000"/>
                   </a:solidFill>
@@ -27381,7 +27385,7 @@
             </a:ln>
             <a:extLst>
               <a:ext uri="{91240B29-F687-4f45-9708-019B960494DF}">
-                <a14:hiddenLine xmlns="" xmlns:a16="http://schemas.microsoft.com/office/drawing/2014/main" xmlns:p14="http://schemas.microsoft.com/office/powerpoint/2010/main" xmlns:a14="http://schemas.microsoft.com/office/drawing/2010/main" w="9525">
+                <a14:hiddenLine xmlns:a14="http://schemas.microsoft.com/office/drawing/2010/main" xmlns:p14="http://schemas.microsoft.com/office/powerpoint/2010/main" xmlns:a16="http://schemas.microsoft.com/office/drawing/2014/main" xmlns="" w="9525">
                   <a:solidFill>
                     <a:srgbClr val="000000"/>
                   </a:solidFill>
@@ -27465,7 +27469,7 @@
             </a:ln>
             <a:extLst>
               <a:ext uri="{91240B29-F687-4f45-9708-019B960494DF}">
-                <a14:hiddenLine xmlns="" xmlns:a16="http://schemas.microsoft.com/office/drawing/2014/main" xmlns:p14="http://schemas.microsoft.com/office/powerpoint/2010/main" xmlns:a14="http://schemas.microsoft.com/office/drawing/2010/main" w="9525">
+                <a14:hiddenLine xmlns:a14="http://schemas.microsoft.com/office/drawing/2010/main" xmlns:p14="http://schemas.microsoft.com/office/powerpoint/2010/main" xmlns:a16="http://schemas.microsoft.com/office/drawing/2014/main" xmlns="" w="9525">
                   <a:solidFill>
                     <a:srgbClr val="000000"/>
                   </a:solidFill>
@@ -27577,7 +27581,7 @@
             </a:ln>
             <a:extLst>
               <a:ext uri="{91240B29-F687-4f45-9708-019B960494DF}">
-                <a14:hiddenLine xmlns="" xmlns:a16="http://schemas.microsoft.com/office/drawing/2014/main" xmlns:p14="http://schemas.microsoft.com/office/powerpoint/2010/main" xmlns:a14="http://schemas.microsoft.com/office/drawing/2010/main" w="9525">
+                <a14:hiddenLine xmlns:a14="http://schemas.microsoft.com/office/drawing/2010/main" xmlns:p14="http://schemas.microsoft.com/office/powerpoint/2010/main" xmlns:a16="http://schemas.microsoft.com/office/drawing/2014/main" xmlns="" w="9525">
                   <a:solidFill>
                     <a:srgbClr val="000000"/>
                   </a:solidFill>
@@ -27633,7 +27637,7 @@
             </a:ln>
             <a:extLst>
               <a:ext uri="{91240B29-F687-4f45-9708-019B960494DF}">
-                <a14:hiddenLine xmlns="" xmlns:a16="http://schemas.microsoft.com/office/drawing/2014/main" xmlns:p14="http://schemas.microsoft.com/office/powerpoint/2010/main" xmlns:a14="http://schemas.microsoft.com/office/drawing/2010/main" w="9525">
+                <a14:hiddenLine xmlns:a14="http://schemas.microsoft.com/office/drawing/2010/main" xmlns:p14="http://schemas.microsoft.com/office/powerpoint/2010/main" xmlns:a16="http://schemas.microsoft.com/office/drawing/2014/main" xmlns="" w="9525">
                   <a:solidFill>
                     <a:srgbClr val="000000"/>
                   </a:solidFill>
@@ -27720,7 +27724,7 @@
             </a:ln>
             <a:extLst>
               <a:ext uri="{91240B29-F687-4f45-9708-019B960494DF}">
-                <a14:hiddenLine xmlns="" xmlns:a16="http://schemas.microsoft.com/office/drawing/2014/main" xmlns:p14="http://schemas.microsoft.com/office/powerpoint/2010/main" xmlns:a14="http://schemas.microsoft.com/office/drawing/2010/main" w="9525">
+                <a14:hiddenLine xmlns:a14="http://schemas.microsoft.com/office/drawing/2010/main" xmlns:p14="http://schemas.microsoft.com/office/powerpoint/2010/main" xmlns:a16="http://schemas.microsoft.com/office/drawing/2014/main" xmlns="" w="9525">
                   <a:solidFill>
                     <a:srgbClr val="000000"/>
                   </a:solidFill>
@@ -27832,7 +27836,7 @@
             </a:ln>
             <a:extLst>
               <a:ext uri="{91240B29-F687-4f45-9708-019B960494DF}">
-                <a14:hiddenLine xmlns="" xmlns:a16="http://schemas.microsoft.com/office/drawing/2014/main" xmlns:p14="http://schemas.microsoft.com/office/powerpoint/2010/main" xmlns:a14="http://schemas.microsoft.com/office/drawing/2010/main" w="9525">
+                <a14:hiddenLine xmlns:a14="http://schemas.microsoft.com/office/drawing/2010/main" xmlns:p14="http://schemas.microsoft.com/office/powerpoint/2010/main" xmlns:a16="http://schemas.microsoft.com/office/drawing/2014/main" xmlns="" w="9525">
                   <a:solidFill>
                     <a:srgbClr val="000000"/>
                   </a:solidFill>
@@ -27916,7 +27920,7 @@
             </a:ln>
             <a:extLst>
               <a:ext uri="{91240B29-F687-4f45-9708-019B960494DF}">
-                <a14:hiddenLine xmlns="" xmlns:a16="http://schemas.microsoft.com/office/drawing/2014/main" xmlns:p14="http://schemas.microsoft.com/office/powerpoint/2010/main" xmlns:a14="http://schemas.microsoft.com/office/drawing/2010/main" w="9525">
+                <a14:hiddenLine xmlns:a14="http://schemas.microsoft.com/office/drawing/2010/main" xmlns:p14="http://schemas.microsoft.com/office/powerpoint/2010/main" xmlns:a16="http://schemas.microsoft.com/office/drawing/2014/main" xmlns="" w="9525">
                   <a:solidFill>
                     <a:srgbClr val="000000"/>
                   </a:solidFill>
@@ -28028,7 +28032,7 @@
             </a:ln>
             <a:extLst>
               <a:ext uri="{91240B29-F687-4f45-9708-019B960494DF}">
-                <a14:hiddenLine xmlns="" xmlns:a16="http://schemas.microsoft.com/office/drawing/2014/main" xmlns:p14="http://schemas.microsoft.com/office/powerpoint/2010/main" xmlns:a14="http://schemas.microsoft.com/office/drawing/2010/main" w="9525">
+                <a14:hiddenLine xmlns:a14="http://schemas.microsoft.com/office/drawing/2010/main" xmlns:p14="http://schemas.microsoft.com/office/powerpoint/2010/main" xmlns:a16="http://schemas.microsoft.com/office/drawing/2014/main" xmlns="" w="9525">
                   <a:solidFill>
                     <a:srgbClr val="000000"/>
                   </a:solidFill>
@@ -28115,7 +28119,7 @@
             </a:ln>
             <a:extLst>
               <a:ext uri="{91240B29-F687-4f45-9708-019B960494DF}">
-                <a14:hiddenLine xmlns="" xmlns:a16="http://schemas.microsoft.com/office/drawing/2014/main" xmlns:p14="http://schemas.microsoft.com/office/powerpoint/2010/main" xmlns:a14="http://schemas.microsoft.com/office/drawing/2010/main" w="9525">
+                <a14:hiddenLine xmlns:a14="http://schemas.microsoft.com/office/drawing/2010/main" xmlns:p14="http://schemas.microsoft.com/office/powerpoint/2010/main" xmlns:a16="http://schemas.microsoft.com/office/drawing/2014/main" xmlns="" w="9525">
                   <a:solidFill>
                     <a:srgbClr val="000000"/>
                   </a:solidFill>
@@ -28199,7 +28203,7 @@
             </a:ln>
             <a:extLst>
               <a:ext uri="{91240B29-F687-4f45-9708-019B960494DF}">
-                <a14:hiddenLine xmlns="" xmlns:a16="http://schemas.microsoft.com/office/drawing/2014/main" xmlns:p14="http://schemas.microsoft.com/office/powerpoint/2010/main" xmlns:a14="http://schemas.microsoft.com/office/drawing/2010/main" w="9525">
+                <a14:hiddenLine xmlns:a14="http://schemas.microsoft.com/office/drawing/2010/main" xmlns:p14="http://schemas.microsoft.com/office/powerpoint/2010/main" xmlns:a16="http://schemas.microsoft.com/office/drawing/2014/main" xmlns="" w="9525">
                   <a:solidFill>
                     <a:srgbClr val="000000"/>
                   </a:solidFill>
@@ -28311,7 +28315,7 @@
             </a:ln>
             <a:extLst>
               <a:ext uri="{91240B29-F687-4f45-9708-019B960494DF}">
-                <a14:hiddenLine xmlns="" xmlns:a16="http://schemas.microsoft.com/office/drawing/2014/main" xmlns:p14="http://schemas.microsoft.com/office/powerpoint/2010/main" xmlns:a14="http://schemas.microsoft.com/office/drawing/2010/main" w="9525">
+                <a14:hiddenLine xmlns:a14="http://schemas.microsoft.com/office/drawing/2010/main" xmlns:p14="http://schemas.microsoft.com/office/powerpoint/2010/main" xmlns:a16="http://schemas.microsoft.com/office/drawing/2014/main" xmlns="" w="9525">
                   <a:solidFill>
                     <a:srgbClr val="000000"/>
                   </a:solidFill>
@@ -28423,7 +28427,7 @@
             </a:ln>
             <a:extLst>
               <a:ext uri="{91240B29-F687-4f45-9708-019B960494DF}">
-                <a14:hiddenLine xmlns="" xmlns:a16="http://schemas.microsoft.com/office/drawing/2014/main" xmlns:p14="http://schemas.microsoft.com/office/powerpoint/2010/main" xmlns:a14="http://schemas.microsoft.com/office/drawing/2010/main" w="9525">
+                <a14:hiddenLine xmlns:a14="http://schemas.microsoft.com/office/drawing/2010/main" xmlns:p14="http://schemas.microsoft.com/office/powerpoint/2010/main" xmlns:a16="http://schemas.microsoft.com/office/drawing/2014/main" xmlns="" w="9525">
                   <a:solidFill>
                     <a:srgbClr val="000000"/>
                   </a:solidFill>
@@ -28510,7 +28514,7 @@
             </a:ln>
             <a:extLst>
               <a:ext uri="{91240B29-F687-4f45-9708-019B960494DF}">
-                <a14:hiddenLine xmlns="" xmlns:a16="http://schemas.microsoft.com/office/drawing/2014/main" xmlns:p14="http://schemas.microsoft.com/office/powerpoint/2010/main" xmlns:a14="http://schemas.microsoft.com/office/drawing/2010/main" w="9525">
+                <a14:hiddenLine xmlns:a14="http://schemas.microsoft.com/office/drawing/2010/main" xmlns:p14="http://schemas.microsoft.com/office/powerpoint/2010/main" xmlns:a16="http://schemas.microsoft.com/office/drawing/2014/main" xmlns="" w="9525">
                   <a:solidFill>
                     <a:srgbClr val="000000"/>
                   </a:solidFill>
@@ -28652,7 +28656,7 @@
             </a:ln>
             <a:extLst>
               <a:ext uri="{91240B29-F687-4f45-9708-019B960494DF}">
-                <a14:hiddenLine xmlns="" xmlns:a16="http://schemas.microsoft.com/office/drawing/2014/main" xmlns:p14="http://schemas.microsoft.com/office/powerpoint/2010/main" xmlns:a14="http://schemas.microsoft.com/office/drawing/2010/main" w="9525">
+                <a14:hiddenLine xmlns:a14="http://schemas.microsoft.com/office/drawing/2010/main" xmlns:p14="http://schemas.microsoft.com/office/powerpoint/2010/main" xmlns:a16="http://schemas.microsoft.com/office/drawing/2014/main" xmlns="" w="9525">
                   <a:solidFill>
                     <a:srgbClr val="000000"/>
                   </a:solidFill>
@@ -29560,7 +29564,7 @@
             </a:ln>
             <a:extLst>
               <a:ext uri="{91240B29-F687-4f45-9708-019B960494DF}">
-                <a14:hiddenLine xmlns="" xmlns:a16="http://schemas.microsoft.com/office/drawing/2014/main" xmlns:p14="http://schemas.microsoft.com/office/powerpoint/2010/main" xmlns:a14="http://schemas.microsoft.com/office/drawing/2010/main" w="9525">
+                <a14:hiddenLine xmlns:a14="http://schemas.microsoft.com/office/drawing/2010/main" xmlns:p14="http://schemas.microsoft.com/office/powerpoint/2010/main" xmlns:a16="http://schemas.microsoft.com/office/drawing/2014/main" xmlns="" w="9525">
                   <a:solidFill>
                     <a:srgbClr val="000000"/>
                   </a:solidFill>
@@ -29672,7 +29676,7 @@
             </a:ln>
             <a:extLst>
               <a:ext uri="{91240B29-F687-4f45-9708-019B960494DF}">
-                <a14:hiddenLine xmlns="" xmlns:a16="http://schemas.microsoft.com/office/drawing/2014/main" xmlns:p14="http://schemas.microsoft.com/office/powerpoint/2010/main" xmlns:a14="http://schemas.microsoft.com/office/drawing/2010/main" w="9525">
+                <a14:hiddenLine xmlns:a14="http://schemas.microsoft.com/office/drawing/2010/main" xmlns:p14="http://schemas.microsoft.com/office/powerpoint/2010/main" xmlns:a16="http://schemas.microsoft.com/office/drawing/2014/main" xmlns="" w="9525">
                   <a:solidFill>
                     <a:srgbClr val="000000"/>
                   </a:solidFill>
@@ -29784,7 +29788,7 @@
             </a:ln>
             <a:extLst>
               <a:ext uri="{91240B29-F687-4f45-9708-019B960494DF}">
-                <a14:hiddenLine xmlns="" xmlns:a16="http://schemas.microsoft.com/office/drawing/2014/main" xmlns:p14="http://schemas.microsoft.com/office/powerpoint/2010/main" xmlns:a14="http://schemas.microsoft.com/office/drawing/2010/main" w="9525">
+                <a14:hiddenLine xmlns:a14="http://schemas.microsoft.com/office/drawing/2010/main" xmlns:p14="http://schemas.microsoft.com/office/powerpoint/2010/main" xmlns:a16="http://schemas.microsoft.com/office/drawing/2014/main" xmlns="" w="9525">
                   <a:solidFill>
                     <a:srgbClr val="000000"/>
                   </a:solidFill>
@@ -29868,7 +29872,7 @@
             </a:ln>
             <a:extLst>
               <a:ext uri="{91240B29-F687-4f45-9708-019B960494DF}">
-                <a14:hiddenLine xmlns="" xmlns:a16="http://schemas.microsoft.com/office/drawing/2014/main" xmlns:p14="http://schemas.microsoft.com/office/powerpoint/2010/main" xmlns:a14="http://schemas.microsoft.com/office/drawing/2010/main" w="9525">
+                <a14:hiddenLine xmlns:a14="http://schemas.microsoft.com/office/drawing/2010/main" xmlns:p14="http://schemas.microsoft.com/office/powerpoint/2010/main" xmlns:a16="http://schemas.microsoft.com/office/drawing/2014/main" xmlns="" w="9525">
                   <a:solidFill>
                     <a:srgbClr val="000000"/>
                   </a:solidFill>
@@ -29980,7 +29984,7 @@
             </a:ln>
             <a:extLst>
               <a:ext uri="{91240B29-F687-4f45-9708-019B960494DF}">
-                <a14:hiddenLine xmlns="" xmlns:a16="http://schemas.microsoft.com/office/drawing/2014/main" xmlns:p14="http://schemas.microsoft.com/office/powerpoint/2010/main" xmlns:a14="http://schemas.microsoft.com/office/drawing/2010/main" w="9525">
+                <a14:hiddenLine xmlns:a14="http://schemas.microsoft.com/office/drawing/2010/main" xmlns:p14="http://schemas.microsoft.com/office/powerpoint/2010/main" xmlns:a16="http://schemas.microsoft.com/office/drawing/2014/main" xmlns="" w="9525">
                   <a:solidFill>
                     <a:srgbClr val="000000"/>
                   </a:solidFill>
@@ -30064,7 +30068,7 @@
             </a:ln>
             <a:extLst>
               <a:ext uri="{91240B29-F687-4f45-9708-019B960494DF}">
-                <a14:hiddenLine xmlns="" xmlns:a16="http://schemas.microsoft.com/office/drawing/2014/main" xmlns:p14="http://schemas.microsoft.com/office/powerpoint/2010/main" xmlns:a14="http://schemas.microsoft.com/office/drawing/2010/main" w="9525">
+                <a14:hiddenLine xmlns:a14="http://schemas.microsoft.com/office/drawing/2010/main" xmlns:p14="http://schemas.microsoft.com/office/powerpoint/2010/main" xmlns:a16="http://schemas.microsoft.com/office/drawing/2014/main" xmlns="" w="9525">
                   <a:solidFill>
                     <a:srgbClr val="000000"/>
                   </a:solidFill>
@@ -30148,7 +30152,7 @@
             </a:ln>
             <a:extLst>
               <a:ext uri="{91240B29-F687-4f45-9708-019B960494DF}">
-                <a14:hiddenLine xmlns="" xmlns:a16="http://schemas.microsoft.com/office/drawing/2014/main" xmlns:p14="http://schemas.microsoft.com/office/powerpoint/2010/main" xmlns:a14="http://schemas.microsoft.com/office/drawing/2010/main" w="9525">
+                <a14:hiddenLine xmlns:a14="http://schemas.microsoft.com/office/drawing/2010/main" xmlns:p14="http://schemas.microsoft.com/office/powerpoint/2010/main" xmlns:a16="http://schemas.microsoft.com/office/drawing/2014/main" xmlns="" w="9525">
                   <a:solidFill>
                     <a:srgbClr val="000000"/>
                   </a:solidFill>
@@ -30260,7 +30264,7 @@
             </a:ln>
             <a:extLst>
               <a:ext uri="{91240B29-F687-4f45-9708-019B960494DF}">
-                <a14:hiddenLine xmlns="" xmlns:a16="http://schemas.microsoft.com/office/drawing/2014/main" xmlns:p14="http://schemas.microsoft.com/office/powerpoint/2010/main" xmlns:a14="http://schemas.microsoft.com/office/drawing/2010/main" w="9525">
+                <a14:hiddenLine xmlns:a14="http://schemas.microsoft.com/office/drawing/2010/main" xmlns:p14="http://schemas.microsoft.com/office/powerpoint/2010/main" xmlns:a16="http://schemas.microsoft.com/office/drawing/2014/main" xmlns="" w="9525">
                   <a:solidFill>
                     <a:srgbClr val="000000"/>
                   </a:solidFill>
@@ -30372,7 +30376,7 @@
             </a:ln>
             <a:extLst>
               <a:ext uri="{91240B29-F687-4f45-9708-019B960494DF}">
-                <a14:hiddenLine xmlns="" xmlns:a16="http://schemas.microsoft.com/office/drawing/2014/main" xmlns:p14="http://schemas.microsoft.com/office/powerpoint/2010/main" xmlns:a14="http://schemas.microsoft.com/office/drawing/2010/main" w="9525">
+                <a14:hiddenLine xmlns:a14="http://schemas.microsoft.com/office/drawing/2010/main" xmlns:p14="http://schemas.microsoft.com/office/powerpoint/2010/main" xmlns:a16="http://schemas.microsoft.com/office/drawing/2014/main" xmlns="" w="9525">
                   <a:solidFill>
                     <a:srgbClr val="000000"/>
                   </a:solidFill>
@@ -30456,7 +30460,7 @@
             </a:ln>
             <a:extLst>
               <a:ext uri="{91240B29-F687-4f45-9708-019B960494DF}">
-                <a14:hiddenLine xmlns="" xmlns:a16="http://schemas.microsoft.com/office/drawing/2014/main" xmlns:p14="http://schemas.microsoft.com/office/powerpoint/2010/main" xmlns:a14="http://schemas.microsoft.com/office/drawing/2010/main" w="9525">
+                <a14:hiddenLine xmlns:a14="http://schemas.microsoft.com/office/drawing/2010/main" xmlns:p14="http://schemas.microsoft.com/office/powerpoint/2010/main" xmlns:a16="http://schemas.microsoft.com/office/drawing/2014/main" xmlns="" w="9525">
                   <a:solidFill>
                     <a:srgbClr val="000000"/>
                   </a:solidFill>
@@ -30588,7 +30592,7 @@
             </a:ln>
             <a:extLst>
               <a:ext uri="{91240B29-F687-4f45-9708-019B960494DF}">
-                <a14:hiddenLine xmlns="" xmlns:a16="http://schemas.microsoft.com/office/drawing/2014/main" xmlns:p14="http://schemas.microsoft.com/office/powerpoint/2010/main" xmlns:a14="http://schemas.microsoft.com/office/drawing/2010/main" w="9525">
+                <a14:hiddenLine xmlns:a14="http://schemas.microsoft.com/office/drawing/2010/main" xmlns:p14="http://schemas.microsoft.com/office/powerpoint/2010/main" xmlns:a16="http://schemas.microsoft.com/office/drawing/2014/main" xmlns="" w="9525">
                   <a:solidFill>
                     <a:srgbClr val="000000"/>
                   </a:solidFill>
@@ -30716,7 +30720,7 @@
             </a:ln>
             <a:extLst>
               <a:ext uri="{91240B29-F687-4f45-9708-019B960494DF}">
-                <a14:hiddenLine xmlns="" xmlns:a16="http://schemas.microsoft.com/office/drawing/2014/main" xmlns:p14="http://schemas.microsoft.com/office/powerpoint/2010/main" xmlns:a14="http://schemas.microsoft.com/office/drawing/2010/main" w="9525">
+                <a14:hiddenLine xmlns:a14="http://schemas.microsoft.com/office/drawing/2010/main" xmlns:p14="http://schemas.microsoft.com/office/powerpoint/2010/main" xmlns:a16="http://schemas.microsoft.com/office/drawing/2014/main" xmlns="" w="9525">
                   <a:solidFill>
                     <a:srgbClr val="000000"/>
                   </a:solidFill>
@@ -30800,7 +30804,7 @@
             </a:ln>
             <a:extLst>
               <a:ext uri="{91240B29-F687-4f45-9708-019B960494DF}">
-                <a14:hiddenLine xmlns="" xmlns:a16="http://schemas.microsoft.com/office/drawing/2014/main" xmlns:p14="http://schemas.microsoft.com/office/powerpoint/2010/main" xmlns:a14="http://schemas.microsoft.com/office/drawing/2010/main" w="9525">
+                <a14:hiddenLine xmlns:a14="http://schemas.microsoft.com/office/drawing/2010/main" xmlns:p14="http://schemas.microsoft.com/office/powerpoint/2010/main" xmlns:a16="http://schemas.microsoft.com/office/drawing/2014/main" xmlns="" w="9525">
                   <a:solidFill>
                     <a:srgbClr val="000000"/>
                   </a:solidFill>
@@ -30884,7 +30888,7 @@
             </a:ln>
             <a:extLst>
               <a:ext uri="{91240B29-F687-4f45-9708-019B960494DF}">
-                <a14:hiddenLine xmlns="" xmlns:a16="http://schemas.microsoft.com/office/drawing/2014/main" xmlns:p14="http://schemas.microsoft.com/office/powerpoint/2010/main" xmlns:a14="http://schemas.microsoft.com/office/drawing/2010/main" w="9525">
+                <a14:hiddenLine xmlns:a14="http://schemas.microsoft.com/office/drawing/2010/main" xmlns:p14="http://schemas.microsoft.com/office/powerpoint/2010/main" xmlns:a16="http://schemas.microsoft.com/office/drawing/2014/main" xmlns="" w="9525">
                   <a:solidFill>
                     <a:srgbClr val="000000"/>
                   </a:solidFill>
@@ -30996,7 +31000,7 @@
             </a:ln>
             <a:extLst>
               <a:ext uri="{91240B29-F687-4f45-9708-019B960494DF}">
-                <a14:hiddenLine xmlns="" xmlns:a16="http://schemas.microsoft.com/office/drawing/2014/main" xmlns:p14="http://schemas.microsoft.com/office/powerpoint/2010/main" xmlns:a14="http://schemas.microsoft.com/office/drawing/2010/main" w="9525">
+                <a14:hiddenLine xmlns:a14="http://schemas.microsoft.com/office/drawing/2010/main" xmlns:p14="http://schemas.microsoft.com/office/powerpoint/2010/main" xmlns:a16="http://schemas.microsoft.com/office/drawing/2014/main" xmlns="" w="9525">
                   <a:solidFill>
                     <a:srgbClr val="000000"/>
                   </a:solidFill>
@@ -31052,7 +31056,7 @@
             </a:ln>
             <a:extLst>
               <a:ext uri="{91240B29-F687-4f45-9708-019B960494DF}">
-                <a14:hiddenLine xmlns="" xmlns:a16="http://schemas.microsoft.com/office/drawing/2014/main" xmlns:p14="http://schemas.microsoft.com/office/powerpoint/2010/main" xmlns:a14="http://schemas.microsoft.com/office/drawing/2010/main" w="9525">
+                <a14:hiddenLine xmlns:a14="http://schemas.microsoft.com/office/drawing/2010/main" xmlns:p14="http://schemas.microsoft.com/office/powerpoint/2010/main" xmlns:a16="http://schemas.microsoft.com/office/drawing/2014/main" xmlns="" w="9525">
                   <a:solidFill>
                     <a:srgbClr val="000000"/>
                   </a:solidFill>
@@ -31139,7 +31143,7 @@
             </a:ln>
             <a:extLst>
               <a:ext uri="{91240B29-F687-4f45-9708-019B960494DF}">
-                <a14:hiddenLine xmlns="" xmlns:a16="http://schemas.microsoft.com/office/drawing/2014/main" xmlns:p14="http://schemas.microsoft.com/office/powerpoint/2010/main" xmlns:a14="http://schemas.microsoft.com/office/drawing/2010/main" w="9525">
+                <a14:hiddenLine xmlns:a14="http://schemas.microsoft.com/office/drawing/2010/main" xmlns:p14="http://schemas.microsoft.com/office/powerpoint/2010/main" xmlns:a16="http://schemas.microsoft.com/office/drawing/2014/main" xmlns="" w="9525">
                   <a:solidFill>
                     <a:srgbClr val="000000"/>
                   </a:solidFill>
@@ -31251,7 +31255,7 @@
             </a:ln>
             <a:extLst>
               <a:ext uri="{91240B29-F687-4f45-9708-019B960494DF}">
-                <a14:hiddenLine xmlns="" xmlns:a16="http://schemas.microsoft.com/office/drawing/2014/main" xmlns:p14="http://schemas.microsoft.com/office/powerpoint/2010/main" xmlns:a14="http://schemas.microsoft.com/office/drawing/2010/main" w="9525">
+                <a14:hiddenLine xmlns:a14="http://schemas.microsoft.com/office/drawing/2010/main" xmlns:p14="http://schemas.microsoft.com/office/powerpoint/2010/main" xmlns:a16="http://schemas.microsoft.com/office/drawing/2014/main" xmlns="" w="9525">
                   <a:solidFill>
                     <a:srgbClr val="000000"/>
                   </a:solidFill>
@@ -31335,7 +31339,7 @@
             </a:ln>
             <a:extLst>
               <a:ext uri="{91240B29-F687-4f45-9708-019B960494DF}">
-                <a14:hiddenLine xmlns="" xmlns:a16="http://schemas.microsoft.com/office/drawing/2014/main" xmlns:p14="http://schemas.microsoft.com/office/powerpoint/2010/main" xmlns:a14="http://schemas.microsoft.com/office/drawing/2010/main" w="9525">
+                <a14:hiddenLine xmlns:a14="http://schemas.microsoft.com/office/drawing/2010/main" xmlns:p14="http://schemas.microsoft.com/office/powerpoint/2010/main" xmlns:a16="http://schemas.microsoft.com/office/drawing/2014/main" xmlns="" w="9525">
                   <a:solidFill>
                     <a:srgbClr val="000000"/>
                   </a:solidFill>
@@ -31447,7 +31451,7 @@
             </a:ln>
             <a:extLst>
               <a:ext uri="{91240B29-F687-4f45-9708-019B960494DF}">
-                <a14:hiddenLine xmlns="" xmlns:a16="http://schemas.microsoft.com/office/drawing/2014/main" xmlns:p14="http://schemas.microsoft.com/office/powerpoint/2010/main" xmlns:a14="http://schemas.microsoft.com/office/drawing/2010/main" w="9525">
+                <a14:hiddenLine xmlns:a14="http://schemas.microsoft.com/office/drawing/2010/main" xmlns:p14="http://schemas.microsoft.com/office/powerpoint/2010/main" xmlns:a16="http://schemas.microsoft.com/office/drawing/2014/main" xmlns="" w="9525">
                   <a:solidFill>
                     <a:srgbClr val="000000"/>
                   </a:solidFill>
@@ -31534,7 +31538,7 @@
             </a:ln>
             <a:extLst>
               <a:ext uri="{91240B29-F687-4f45-9708-019B960494DF}">
-                <a14:hiddenLine xmlns="" xmlns:a16="http://schemas.microsoft.com/office/drawing/2014/main" xmlns:p14="http://schemas.microsoft.com/office/powerpoint/2010/main" xmlns:a14="http://schemas.microsoft.com/office/drawing/2010/main" w="9525">
+                <a14:hiddenLine xmlns:a14="http://schemas.microsoft.com/office/drawing/2010/main" xmlns:p14="http://schemas.microsoft.com/office/powerpoint/2010/main" xmlns:a16="http://schemas.microsoft.com/office/drawing/2014/main" xmlns="" w="9525">
                   <a:solidFill>
                     <a:srgbClr val="000000"/>
                   </a:solidFill>
@@ -31618,7 +31622,7 @@
             </a:ln>
             <a:extLst>
               <a:ext uri="{91240B29-F687-4f45-9708-019B960494DF}">
-                <a14:hiddenLine xmlns="" xmlns:a16="http://schemas.microsoft.com/office/drawing/2014/main" xmlns:p14="http://schemas.microsoft.com/office/powerpoint/2010/main" xmlns:a14="http://schemas.microsoft.com/office/drawing/2010/main" w="9525">
+                <a14:hiddenLine xmlns:a14="http://schemas.microsoft.com/office/drawing/2010/main" xmlns:p14="http://schemas.microsoft.com/office/powerpoint/2010/main" xmlns:a16="http://schemas.microsoft.com/office/drawing/2014/main" xmlns="" w="9525">
                   <a:solidFill>
                     <a:srgbClr val="000000"/>
                   </a:solidFill>
@@ -31730,7 +31734,7 @@
             </a:ln>
             <a:extLst>
               <a:ext uri="{91240B29-F687-4f45-9708-019B960494DF}">
-                <a14:hiddenLine xmlns="" xmlns:a16="http://schemas.microsoft.com/office/drawing/2014/main" xmlns:p14="http://schemas.microsoft.com/office/powerpoint/2010/main" xmlns:a14="http://schemas.microsoft.com/office/drawing/2010/main" w="9525">
+                <a14:hiddenLine xmlns:a14="http://schemas.microsoft.com/office/drawing/2010/main" xmlns:p14="http://schemas.microsoft.com/office/powerpoint/2010/main" xmlns:a16="http://schemas.microsoft.com/office/drawing/2014/main" xmlns="" w="9525">
                   <a:solidFill>
                     <a:srgbClr val="000000"/>
                   </a:solidFill>
@@ -31842,7 +31846,7 @@
             </a:ln>
             <a:extLst>
               <a:ext uri="{91240B29-F687-4f45-9708-019B960494DF}">
-                <a14:hiddenLine xmlns="" xmlns:a16="http://schemas.microsoft.com/office/drawing/2014/main" xmlns:p14="http://schemas.microsoft.com/office/powerpoint/2010/main" xmlns:a14="http://schemas.microsoft.com/office/drawing/2010/main" w="9525">
+                <a14:hiddenLine xmlns:a14="http://schemas.microsoft.com/office/drawing/2010/main" xmlns:p14="http://schemas.microsoft.com/office/powerpoint/2010/main" xmlns:a16="http://schemas.microsoft.com/office/drawing/2014/main" xmlns="" w="9525">
                   <a:solidFill>
                     <a:srgbClr val="000000"/>
                   </a:solidFill>
@@ -31929,7 +31933,7 @@
             </a:ln>
             <a:extLst>
               <a:ext uri="{91240B29-F687-4f45-9708-019B960494DF}">
-                <a14:hiddenLine xmlns="" xmlns:a16="http://schemas.microsoft.com/office/drawing/2014/main" xmlns:p14="http://schemas.microsoft.com/office/powerpoint/2010/main" xmlns:a14="http://schemas.microsoft.com/office/drawing/2010/main" w="9525">
+                <a14:hiddenLine xmlns:a14="http://schemas.microsoft.com/office/drawing/2010/main" xmlns:p14="http://schemas.microsoft.com/office/powerpoint/2010/main" xmlns:a16="http://schemas.microsoft.com/office/drawing/2014/main" xmlns="" w="9525">
                   <a:solidFill>
                     <a:srgbClr val="000000"/>
                   </a:solidFill>
@@ -32071,7 +32075,7 @@
             </a:ln>
             <a:extLst>
               <a:ext uri="{91240B29-F687-4f45-9708-019B960494DF}">
-                <a14:hiddenLine xmlns="" xmlns:a16="http://schemas.microsoft.com/office/drawing/2014/main" xmlns:p14="http://schemas.microsoft.com/office/powerpoint/2010/main" xmlns:a14="http://schemas.microsoft.com/office/drawing/2010/main" w="9525">
+                <a14:hiddenLine xmlns:a14="http://schemas.microsoft.com/office/drawing/2010/main" xmlns:p14="http://schemas.microsoft.com/office/powerpoint/2010/main" xmlns:a16="http://schemas.microsoft.com/office/drawing/2014/main" xmlns="" w="9525">
                   <a:solidFill>
                     <a:srgbClr val="000000"/>
                   </a:solidFill>
@@ -33151,7 +33155,7 @@
             </a:ln>
             <a:extLst>
               <a:ext uri="{91240B29-F687-4f45-9708-019B960494DF}">
-                <a14:hiddenLine xmlns="" xmlns:a16="http://schemas.microsoft.com/office/drawing/2014/main" xmlns:p14="http://schemas.microsoft.com/office/powerpoint/2010/main" xmlns:a14="http://schemas.microsoft.com/office/drawing/2010/main" w="9525">
+                <a14:hiddenLine xmlns:a14="http://schemas.microsoft.com/office/drawing/2010/main" xmlns:p14="http://schemas.microsoft.com/office/powerpoint/2010/main" xmlns:a16="http://schemas.microsoft.com/office/drawing/2014/main" xmlns="" w="9525">
                   <a:solidFill>
                     <a:srgbClr val="000000"/>
                   </a:solidFill>
@@ -33263,7 +33267,7 @@
             </a:ln>
             <a:extLst>
               <a:ext uri="{91240B29-F687-4f45-9708-019B960494DF}">
-                <a14:hiddenLine xmlns="" xmlns:a16="http://schemas.microsoft.com/office/drawing/2014/main" xmlns:p14="http://schemas.microsoft.com/office/powerpoint/2010/main" xmlns:a14="http://schemas.microsoft.com/office/drawing/2010/main" w="9525">
+                <a14:hiddenLine xmlns:a14="http://schemas.microsoft.com/office/drawing/2010/main" xmlns:p14="http://schemas.microsoft.com/office/powerpoint/2010/main" xmlns:a16="http://schemas.microsoft.com/office/drawing/2014/main" xmlns="" w="9525">
                   <a:solidFill>
                     <a:srgbClr val="000000"/>
                   </a:solidFill>
@@ -33375,7 +33379,7 @@
             </a:ln>
             <a:extLst>
               <a:ext uri="{91240B29-F687-4f45-9708-019B960494DF}">
-                <a14:hiddenLine xmlns="" xmlns:a16="http://schemas.microsoft.com/office/drawing/2014/main" xmlns:p14="http://schemas.microsoft.com/office/powerpoint/2010/main" xmlns:a14="http://schemas.microsoft.com/office/drawing/2010/main" w="9525">
+                <a14:hiddenLine xmlns:a14="http://schemas.microsoft.com/office/drawing/2010/main" xmlns:p14="http://schemas.microsoft.com/office/powerpoint/2010/main" xmlns:a16="http://schemas.microsoft.com/office/drawing/2014/main" xmlns="" w="9525">
                   <a:solidFill>
                     <a:srgbClr val="000000"/>
                   </a:solidFill>
@@ -33459,7 +33463,7 @@
             </a:ln>
             <a:extLst>
               <a:ext uri="{91240B29-F687-4f45-9708-019B960494DF}">
-                <a14:hiddenLine xmlns="" xmlns:a16="http://schemas.microsoft.com/office/drawing/2014/main" xmlns:p14="http://schemas.microsoft.com/office/powerpoint/2010/main" xmlns:a14="http://schemas.microsoft.com/office/drawing/2010/main" w="9525">
+                <a14:hiddenLine xmlns:a14="http://schemas.microsoft.com/office/drawing/2010/main" xmlns:p14="http://schemas.microsoft.com/office/powerpoint/2010/main" xmlns:a16="http://schemas.microsoft.com/office/drawing/2014/main" xmlns="" w="9525">
                   <a:solidFill>
                     <a:srgbClr val="000000"/>
                   </a:solidFill>
@@ -33571,7 +33575,7 @@
             </a:ln>
             <a:extLst>
               <a:ext uri="{91240B29-F687-4f45-9708-019B960494DF}">
-                <a14:hiddenLine xmlns="" xmlns:a16="http://schemas.microsoft.com/office/drawing/2014/main" xmlns:p14="http://schemas.microsoft.com/office/powerpoint/2010/main" xmlns:a14="http://schemas.microsoft.com/office/drawing/2010/main" w="9525">
+                <a14:hiddenLine xmlns:a14="http://schemas.microsoft.com/office/drawing/2010/main" xmlns:p14="http://schemas.microsoft.com/office/powerpoint/2010/main" xmlns:a16="http://schemas.microsoft.com/office/drawing/2014/main" xmlns="" w="9525">
                   <a:solidFill>
                     <a:srgbClr val="000000"/>
                   </a:solidFill>
@@ -33655,7 +33659,7 @@
             </a:ln>
             <a:extLst>
               <a:ext uri="{91240B29-F687-4f45-9708-019B960494DF}">
-                <a14:hiddenLine xmlns="" xmlns:a16="http://schemas.microsoft.com/office/drawing/2014/main" xmlns:p14="http://schemas.microsoft.com/office/powerpoint/2010/main" xmlns:a14="http://schemas.microsoft.com/office/drawing/2010/main" w="9525">
+                <a14:hiddenLine xmlns:a14="http://schemas.microsoft.com/office/drawing/2010/main" xmlns:p14="http://schemas.microsoft.com/office/powerpoint/2010/main" xmlns:a16="http://schemas.microsoft.com/office/drawing/2014/main" xmlns="" w="9525">
                   <a:solidFill>
                     <a:srgbClr val="000000"/>
                   </a:solidFill>
@@ -33739,7 +33743,7 @@
             </a:ln>
             <a:extLst>
               <a:ext uri="{91240B29-F687-4f45-9708-019B960494DF}">
-                <a14:hiddenLine xmlns="" xmlns:a16="http://schemas.microsoft.com/office/drawing/2014/main" xmlns:p14="http://schemas.microsoft.com/office/powerpoint/2010/main" xmlns:a14="http://schemas.microsoft.com/office/drawing/2010/main" w="9525">
+                <a14:hiddenLine xmlns:a14="http://schemas.microsoft.com/office/drawing/2010/main" xmlns:p14="http://schemas.microsoft.com/office/powerpoint/2010/main" xmlns:a16="http://schemas.microsoft.com/office/drawing/2014/main" xmlns="" w="9525">
                   <a:solidFill>
                     <a:srgbClr val="000000"/>
                   </a:solidFill>
@@ -33851,7 +33855,7 @@
             </a:ln>
             <a:extLst>
               <a:ext uri="{91240B29-F687-4f45-9708-019B960494DF}">
-                <a14:hiddenLine xmlns="" xmlns:a16="http://schemas.microsoft.com/office/drawing/2014/main" xmlns:p14="http://schemas.microsoft.com/office/powerpoint/2010/main" xmlns:a14="http://schemas.microsoft.com/office/drawing/2010/main" w="9525">
+                <a14:hiddenLine xmlns:a14="http://schemas.microsoft.com/office/drawing/2010/main" xmlns:p14="http://schemas.microsoft.com/office/powerpoint/2010/main" xmlns:a16="http://schemas.microsoft.com/office/drawing/2014/main" xmlns="" w="9525">
                   <a:solidFill>
                     <a:srgbClr val="000000"/>
                   </a:solidFill>
@@ -33963,7 +33967,7 @@
             </a:ln>
             <a:extLst>
               <a:ext uri="{91240B29-F687-4f45-9708-019B960494DF}">
-                <a14:hiddenLine xmlns="" xmlns:a16="http://schemas.microsoft.com/office/drawing/2014/main" xmlns:p14="http://schemas.microsoft.com/office/powerpoint/2010/main" xmlns:a14="http://schemas.microsoft.com/office/drawing/2010/main" w="9525">
+                <a14:hiddenLine xmlns:a14="http://schemas.microsoft.com/office/drawing/2010/main" xmlns:p14="http://schemas.microsoft.com/office/powerpoint/2010/main" xmlns:a16="http://schemas.microsoft.com/office/drawing/2014/main" xmlns="" w="9525">
                   <a:solidFill>
                     <a:srgbClr val="000000"/>
                   </a:solidFill>
@@ -34047,7 +34051,7 @@
             </a:ln>
             <a:extLst>
               <a:ext uri="{91240B29-F687-4f45-9708-019B960494DF}">
-                <a14:hiddenLine xmlns="" xmlns:a16="http://schemas.microsoft.com/office/drawing/2014/main" xmlns:p14="http://schemas.microsoft.com/office/powerpoint/2010/main" xmlns:a14="http://schemas.microsoft.com/office/drawing/2010/main" w="9525">
+                <a14:hiddenLine xmlns:a14="http://schemas.microsoft.com/office/drawing/2010/main" xmlns:p14="http://schemas.microsoft.com/office/powerpoint/2010/main" xmlns:a16="http://schemas.microsoft.com/office/drawing/2014/main" xmlns="" w="9525">
                   <a:solidFill>
                     <a:srgbClr val="000000"/>
                   </a:solidFill>
@@ -34179,7 +34183,7 @@
             </a:ln>
             <a:extLst>
               <a:ext uri="{91240B29-F687-4f45-9708-019B960494DF}">
-                <a14:hiddenLine xmlns="" xmlns:a16="http://schemas.microsoft.com/office/drawing/2014/main" xmlns:p14="http://schemas.microsoft.com/office/powerpoint/2010/main" xmlns:a14="http://schemas.microsoft.com/office/drawing/2010/main" w="9525">
+                <a14:hiddenLine xmlns:a14="http://schemas.microsoft.com/office/drawing/2010/main" xmlns:p14="http://schemas.microsoft.com/office/powerpoint/2010/main" xmlns:a16="http://schemas.microsoft.com/office/drawing/2014/main" xmlns="" w="9525">
                   <a:solidFill>
                     <a:srgbClr val="000000"/>
                   </a:solidFill>
@@ -34307,7 +34311,7 @@
             </a:ln>
             <a:extLst>
               <a:ext uri="{91240B29-F687-4f45-9708-019B960494DF}">
-                <a14:hiddenLine xmlns="" xmlns:a16="http://schemas.microsoft.com/office/drawing/2014/main" xmlns:p14="http://schemas.microsoft.com/office/powerpoint/2010/main" xmlns:a14="http://schemas.microsoft.com/office/drawing/2010/main" w="9525">
+                <a14:hiddenLine xmlns:a14="http://schemas.microsoft.com/office/drawing/2010/main" xmlns:p14="http://schemas.microsoft.com/office/powerpoint/2010/main" xmlns:a16="http://schemas.microsoft.com/office/drawing/2014/main" xmlns="" w="9525">
                   <a:solidFill>
                     <a:srgbClr val="000000"/>
                   </a:solidFill>
@@ -34391,7 +34395,7 @@
             </a:ln>
             <a:extLst>
               <a:ext uri="{91240B29-F687-4f45-9708-019B960494DF}">
-                <a14:hiddenLine xmlns="" xmlns:a16="http://schemas.microsoft.com/office/drawing/2014/main" xmlns:p14="http://schemas.microsoft.com/office/powerpoint/2010/main" xmlns:a14="http://schemas.microsoft.com/office/drawing/2010/main" w="9525">
+                <a14:hiddenLine xmlns:a14="http://schemas.microsoft.com/office/drawing/2010/main" xmlns:p14="http://schemas.microsoft.com/office/powerpoint/2010/main" xmlns:a16="http://schemas.microsoft.com/office/drawing/2014/main" xmlns="" w="9525">
                   <a:solidFill>
                     <a:srgbClr val="000000"/>
                   </a:solidFill>
@@ -34475,7 +34479,7 @@
             </a:ln>
             <a:extLst>
               <a:ext uri="{91240B29-F687-4f45-9708-019B960494DF}">
-                <a14:hiddenLine xmlns="" xmlns:a16="http://schemas.microsoft.com/office/drawing/2014/main" xmlns:p14="http://schemas.microsoft.com/office/powerpoint/2010/main" xmlns:a14="http://schemas.microsoft.com/office/drawing/2010/main" w="9525">
+                <a14:hiddenLine xmlns:a14="http://schemas.microsoft.com/office/drawing/2010/main" xmlns:p14="http://schemas.microsoft.com/office/powerpoint/2010/main" xmlns:a16="http://schemas.microsoft.com/office/drawing/2014/main" xmlns="" w="9525">
                   <a:solidFill>
                     <a:srgbClr val="000000"/>
                   </a:solidFill>
@@ -34587,7 +34591,7 @@
             </a:ln>
             <a:extLst>
               <a:ext uri="{91240B29-F687-4f45-9708-019B960494DF}">
-                <a14:hiddenLine xmlns="" xmlns:a16="http://schemas.microsoft.com/office/drawing/2014/main" xmlns:p14="http://schemas.microsoft.com/office/powerpoint/2010/main" xmlns:a14="http://schemas.microsoft.com/office/drawing/2010/main" w="9525">
+                <a14:hiddenLine xmlns:a14="http://schemas.microsoft.com/office/drawing/2010/main" xmlns:p14="http://schemas.microsoft.com/office/powerpoint/2010/main" xmlns:a16="http://schemas.microsoft.com/office/drawing/2014/main" xmlns="" w="9525">
                   <a:solidFill>
                     <a:srgbClr val="000000"/>
                   </a:solidFill>
@@ -34643,7 +34647,7 @@
             </a:ln>
             <a:extLst>
               <a:ext uri="{91240B29-F687-4f45-9708-019B960494DF}">
-                <a14:hiddenLine xmlns="" xmlns:a16="http://schemas.microsoft.com/office/drawing/2014/main" xmlns:p14="http://schemas.microsoft.com/office/powerpoint/2010/main" xmlns:a14="http://schemas.microsoft.com/office/drawing/2010/main" w="9525">
+                <a14:hiddenLine xmlns:a14="http://schemas.microsoft.com/office/drawing/2010/main" xmlns:p14="http://schemas.microsoft.com/office/powerpoint/2010/main" xmlns:a16="http://schemas.microsoft.com/office/drawing/2014/main" xmlns="" w="9525">
                   <a:solidFill>
                     <a:srgbClr val="000000"/>
                   </a:solidFill>
@@ -34730,7 +34734,7 @@
             </a:ln>
             <a:extLst>
               <a:ext uri="{91240B29-F687-4f45-9708-019B960494DF}">
-                <a14:hiddenLine xmlns="" xmlns:a16="http://schemas.microsoft.com/office/drawing/2014/main" xmlns:p14="http://schemas.microsoft.com/office/powerpoint/2010/main" xmlns:a14="http://schemas.microsoft.com/office/drawing/2010/main" w="9525">
+                <a14:hiddenLine xmlns:a14="http://schemas.microsoft.com/office/drawing/2010/main" xmlns:p14="http://schemas.microsoft.com/office/powerpoint/2010/main" xmlns:a16="http://schemas.microsoft.com/office/drawing/2014/main" xmlns="" w="9525">
                   <a:solidFill>
                     <a:srgbClr val="000000"/>
                   </a:solidFill>
@@ -34842,7 +34846,7 @@
             </a:ln>
             <a:extLst>
               <a:ext uri="{91240B29-F687-4f45-9708-019B960494DF}">
-                <a14:hiddenLine xmlns="" xmlns:a16="http://schemas.microsoft.com/office/drawing/2014/main" xmlns:p14="http://schemas.microsoft.com/office/powerpoint/2010/main" xmlns:a14="http://schemas.microsoft.com/office/drawing/2010/main" w="9525">
+                <a14:hiddenLine xmlns:a14="http://schemas.microsoft.com/office/drawing/2010/main" xmlns:p14="http://schemas.microsoft.com/office/powerpoint/2010/main" xmlns:a16="http://schemas.microsoft.com/office/drawing/2014/main" xmlns="" w="9525">
                   <a:solidFill>
                     <a:srgbClr val="000000"/>
                   </a:solidFill>
@@ -34926,7 +34930,7 @@
             </a:ln>
             <a:extLst>
               <a:ext uri="{91240B29-F687-4f45-9708-019B960494DF}">
-                <a14:hiddenLine xmlns="" xmlns:a16="http://schemas.microsoft.com/office/drawing/2014/main" xmlns:p14="http://schemas.microsoft.com/office/powerpoint/2010/main" xmlns:a14="http://schemas.microsoft.com/office/drawing/2010/main" w="9525">
+                <a14:hiddenLine xmlns:a14="http://schemas.microsoft.com/office/drawing/2010/main" xmlns:p14="http://schemas.microsoft.com/office/powerpoint/2010/main" xmlns:a16="http://schemas.microsoft.com/office/drawing/2014/main" xmlns="" w="9525">
                   <a:solidFill>
                     <a:srgbClr val="000000"/>
                   </a:solidFill>
@@ -35038,7 +35042,7 @@
             </a:ln>
             <a:extLst>
               <a:ext uri="{91240B29-F687-4f45-9708-019B960494DF}">
-                <a14:hiddenLine xmlns="" xmlns:a16="http://schemas.microsoft.com/office/drawing/2014/main" xmlns:p14="http://schemas.microsoft.com/office/powerpoint/2010/main" xmlns:a14="http://schemas.microsoft.com/office/drawing/2010/main" w="9525">
+                <a14:hiddenLine xmlns:a14="http://schemas.microsoft.com/office/drawing/2010/main" xmlns:p14="http://schemas.microsoft.com/office/powerpoint/2010/main" xmlns:a16="http://schemas.microsoft.com/office/drawing/2014/main" xmlns="" w="9525">
                   <a:solidFill>
                     <a:srgbClr val="000000"/>
                   </a:solidFill>
@@ -35125,7 +35129,7 @@
             </a:ln>
             <a:extLst>
               <a:ext uri="{91240B29-F687-4f45-9708-019B960494DF}">
-                <a14:hiddenLine xmlns="" xmlns:a16="http://schemas.microsoft.com/office/drawing/2014/main" xmlns:p14="http://schemas.microsoft.com/office/powerpoint/2010/main" xmlns:a14="http://schemas.microsoft.com/office/drawing/2010/main" w="9525">
+                <a14:hiddenLine xmlns:a14="http://schemas.microsoft.com/office/drawing/2010/main" xmlns:p14="http://schemas.microsoft.com/office/powerpoint/2010/main" xmlns:a16="http://schemas.microsoft.com/office/drawing/2014/main" xmlns="" w="9525">
                   <a:solidFill>
                     <a:srgbClr val="000000"/>
                   </a:solidFill>
@@ -35209,7 +35213,7 @@
             </a:ln>
             <a:extLst>
               <a:ext uri="{91240B29-F687-4f45-9708-019B960494DF}">
-                <a14:hiddenLine xmlns="" xmlns:a16="http://schemas.microsoft.com/office/drawing/2014/main" xmlns:p14="http://schemas.microsoft.com/office/powerpoint/2010/main" xmlns:a14="http://schemas.microsoft.com/office/drawing/2010/main" w="9525">
+                <a14:hiddenLine xmlns:a14="http://schemas.microsoft.com/office/drawing/2010/main" xmlns:p14="http://schemas.microsoft.com/office/powerpoint/2010/main" xmlns:a16="http://schemas.microsoft.com/office/drawing/2014/main" xmlns="" w="9525">
                   <a:solidFill>
                     <a:srgbClr val="000000"/>
                   </a:solidFill>
@@ -35321,7 +35325,7 @@
             </a:ln>
             <a:extLst>
               <a:ext uri="{91240B29-F687-4f45-9708-019B960494DF}">
-                <a14:hiddenLine xmlns="" xmlns:a16="http://schemas.microsoft.com/office/drawing/2014/main" xmlns:p14="http://schemas.microsoft.com/office/powerpoint/2010/main" xmlns:a14="http://schemas.microsoft.com/office/drawing/2010/main" w="9525">
+                <a14:hiddenLine xmlns:a14="http://schemas.microsoft.com/office/drawing/2010/main" xmlns:p14="http://schemas.microsoft.com/office/powerpoint/2010/main" xmlns:a16="http://schemas.microsoft.com/office/drawing/2014/main" xmlns="" w="9525">
                   <a:solidFill>
                     <a:srgbClr val="000000"/>
                   </a:solidFill>
@@ -35433,7 +35437,7 @@
             </a:ln>
             <a:extLst>
               <a:ext uri="{91240B29-F687-4f45-9708-019B960494DF}">
-                <a14:hiddenLine xmlns="" xmlns:a16="http://schemas.microsoft.com/office/drawing/2014/main" xmlns:p14="http://schemas.microsoft.com/office/powerpoint/2010/main" xmlns:a14="http://schemas.microsoft.com/office/drawing/2010/main" w="9525">
+                <a14:hiddenLine xmlns:a14="http://schemas.microsoft.com/office/drawing/2010/main" xmlns:p14="http://schemas.microsoft.com/office/powerpoint/2010/main" xmlns:a16="http://schemas.microsoft.com/office/drawing/2014/main" xmlns="" w="9525">
                   <a:solidFill>
                     <a:srgbClr val="000000"/>
                   </a:solidFill>
@@ -35520,7 +35524,7 @@
             </a:ln>
             <a:extLst>
               <a:ext uri="{91240B29-F687-4f45-9708-019B960494DF}">
-                <a14:hiddenLine xmlns="" xmlns:a16="http://schemas.microsoft.com/office/drawing/2014/main" xmlns:p14="http://schemas.microsoft.com/office/powerpoint/2010/main" xmlns:a14="http://schemas.microsoft.com/office/drawing/2010/main" w="9525">
+                <a14:hiddenLine xmlns:a14="http://schemas.microsoft.com/office/drawing/2010/main" xmlns:p14="http://schemas.microsoft.com/office/powerpoint/2010/main" xmlns:a16="http://schemas.microsoft.com/office/drawing/2014/main" xmlns="" w="9525">
                   <a:solidFill>
                     <a:srgbClr val="000000"/>
                   </a:solidFill>
@@ -35662,7 +35666,7 @@
             </a:ln>
             <a:extLst>
               <a:ext uri="{91240B29-F687-4f45-9708-019B960494DF}">
-                <a14:hiddenLine xmlns="" xmlns:a16="http://schemas.microsoft.com/office/drawing/2014/main" xmlns:p14="http://schemas.microsoft.com/office/powerpoint/2010/main" xmlns:a14="http://schemas.microsoft.com/office/drawing/2010/main" w="9525">
+                <a14:hiddenLine xmlns:a14="http://schemas.microsoft.com/office/drawing/2010/main" xmlns:p14="http://schemas.microsoft.com/office/powerpoint/2010/main" xmlns:a16="http://schemas.microsoft.com/office/drawing/2014/main" xmlns="" w="9525">
                   <a:solidFill>
                     <a:srgbClr val="000000"/>
                   </a:solidFill>

</xml_diff>